<commit_message>
Updated extracted data and ppt presentation
</commit_message>
<xml_diff>
--- a/VBite2019_WGPres.pptx
+++ b/VBite2019_WGPres.pptx
@@ -115,6 +115,11 @@
       </a:defRPr>
     </a:lvl9pPr>
   </p:defaultTextStyle>
+  <p:extLst>
+    <p:ext uri="{EFAFB233-063F-42B5-8137-9DF3F51BA10A}">
+      <p15:sldGuideLst xmlns:p15="http://schemas.microsoft.com/office/powerpoint/2012/main"/>
+    </p:ext>
+  </p:extLst>
 </p:presentation>
 </file>
 
@@ -265,7 +270,7 @@
           <a:p>
             <a:fld id="{5ABA3254-B489-4843-B477-2A714F347B69}" type="datetimeFigureOut">
               <a:rPr lang="en-US" smtClean="0"/>
-              <a:t>6/11/19</a:t>
+              <a:t>6/12/19</a:t>
             </a:fld>
             <a:endParaRPr lang="en-US"/>
           </a:p>
@@ -463,7 +468,7 @@
           <a:p>
             <a:fld id="{5ABA3254-B489-4843-B477-2A714F347B69}" type="datetimeFigureOut">
               <a:rPr lang="en-US" smtClean="0"/>
-              <a:t>6/11/19</a:t>
+              <a:t>6/12/19</a:t>
             </a:fld>
             <a:endParaRPr lang="en-US"/>
           </a:p>
@@ -671,7 +676,7 @@
           <a:p>
             <a:fld id="{5ABA3254-B489-4843-B477-2A714F347B69}" type="datetimeFigureOut">
               <a:rPr lang="en-US" smtClean="0"/>
-              <a:t>6/11/19</a:t>
+              <a:t>6/12/19</a:t>
             </a:fld>
             <a:endParaRPr lang="en-US"/>
           </a:p>
@@ -869,7 +874,7 @@
           <a:p>
             <a:fld id="{5ABA3254-B489-4843-B477-2A714F347B69}" type="datetimeFigureOut">
               <a:rPr lang="en-US" smtClean="0"/>
-              <a:t>6/11/19</a:t>
+              <a:t>6/12/19</a:t>
             </a:fld>
             <a:endParaRPr lang="en-US"/>
           </a:p>
@@ -1144,7 +1149,7 @@
           <a:p>
             <a:fld id="{5ABA3254-B489-4843-B477-2A714F347B69}" type="datetimeFigureOut">
               <a:rPr lang="en-US" smtClean="0"/>
-              <a:t>6/11/19</a:t>
+              <a:t>6/12/19</a:t>
             </a:fld>
             <a:endParaRPr lang="en-US"/>
           </a:p>
@@ -1409,7 +1414,7 @@
           <a:p>
             <a:fld id="{5ABA3254-B489-4843-B477-2A714F347B69}" type="datetimeFigureOut">
               <a:rPr lang="en-US" smtClean="0"/>
-              <a:t>6/11/19</a:t>
+              <a:t>6/12/19</a:t>
             </a:fld>
             <a:endParaRPr lang="en-US"/>
           </a:p>
@@ -1821,7 +1826,7 @@
           <a:p>
             <a:fld id="{5ABA3254-B489-4843-B477-2A714F347B69}" type="datetimeFigureOut">
               <a:rPr lang="en-US" smtClean="0"/>
-              <a:t>6/11/19</a:t>
+              <a:t>6/12/19</a:t>
             </a:fld>
             <a:endParaRPr lang="en-US"/>
           </a:p>
@@ -1962,7 +1967,7 @@
           <a:p>
             <a:fld id="{5ABA3254-B489-4843-B477-2A714F347B69}" type="datetimeFigureOut">
               <a:rPr lang="en-US" smtClean="0"/>
-              <a:t>6/11/19</a:t>
+              <a:t>6/12/19</a:t>
             </a:fld>
             <a:endParaRPr lang="en-US"/>
           </a:p>
@@ -2075,7 +2080,7 @@
           <a:p>
             <a:fld id="{5ABA3254-B489-4843-B477-2A714F347B69}" type="datetimeFigureOut">
               <a:rPr lang="en-US" smtClean="0"/>
-              <a:t>6/11/19</a:t>
+              <a:t>6/12/19</a:t>
             </a:fld>
             <a:endParaRPr lang="en-US"/>
           </a:p>
@@ -2386,7 +2391,7 @@
           <a:p>
             <a:fld id="{5ABA3254-B489-4843-B477-2A714F347B69}" type="datetimeFigureOut">
               <a:rPr lang="en-US" smtClean="0"/>
-              <a:t>6/11/19</a:t>
+              <a:t>6/12/19</a:t>
             </a:fld>
             <a:endParaRPr lang="en-US"/>
           </a:p>
@@ -2674,7 +2679,7 @@
           <a:p>
             <a:fld id="{5ABA3254-B489-4843-B477-2A714F347B69}" type="datetimeFigureOut">
               <a:rPr lang="en-US" smtClean="0"/>
-              <a:t>6/11/19</a:t>
+              <a:t>6/12/19</a:t>
             </a:fld>
             <a:endParaRPr lang="en-US"/>
           </a:p>
@@ -2915,7 +2920,7 @@
           <a:p>
             <a:fld id="{5ABA3254-B489-4843-B477-2A714F347B69}" type="datetimeFigureOut">
               <a:rPr lang="en-US" smtClean="0"/>
-              <a:t>6/11/19</a:t>
+              <a:t>6/12/19</a:t>
             </a:fld>
             <a:endParaRPr lang="en-US"/>
           </a:p>
@@ -3891,7 +3896,7 @@
               <a:rPr lang="en-US" dirty="0">
                 <a:latin typeface="Avenir Roman" panose="02000503020000020003" pitchFamily="2" charset="0"/>
               </a:rPr>
-              <a:t>Studies to exclude</a:t>
+              <a:t>Excluded studies</a:t>
             </a:r>
           </a:p>
         </p:txBody>
@@ -3911,14 +3916,14 @@
           <p:nvPr>
             <p:extLst>
               <p:ext uri="{D42A27DB-BD31-4B8C-83A1-F6EECF244321}">
-                <p14:modId xmlns:p14="http://schemas.microsoft.com/office/powerpoint/2010/main" val="198605607"/>
+                <p14:modId xmlns:p14="http://schemas.microsoft.com/office/powerpoint/2010/main" val="1792123387"/>
               </p:ext>
             </p:extLst>
           </p:nvPr>
         </p:nvGraphicFramePr>
         <p:xfrm>
           <a:off x="637310" y="1493114"/>
-          <a:ext cx="10716490" cy="1315874"/>
+          <a:ext cx="10716490" cy="4693933"/>
         </p:xfrm>
         <a:graphic>
           <a:graphicData uri="http://schemas.openxmlformats.org/drawingml/2006/table">
@@ -4526,7 +4531,7 @@
                           <a:effectLst/>
                           <a:latin typeface="Calibri" panose="020F0502020204030204" pitchFamily="34" charset="0"/>
                         </a:rPr>
-                        <a:t>No way to get temp profiles (varying outdoor temps across locations and dates; MS followed up with author &amp; they did not collect temp data)</a:t>
+                        <a:t>No way to get temp profiles for varying temp treatments (naturally varying outdoor temps across locations and dates; MS followed up with author &amp; they did not collect temp data)</a:t>
                       </a:r>
                     </a:p>
                   </a:txBody>
@@ -4572,6 +4577,1244 @@
                 <a:extLst>
                   <a:ext uri="{0D108BD9-81ED-4DB2-BD59-A6C34878D82A}">
                     <a16:rowId xmlns:a16="http://schemas.microsoft.com/office/drawing/2014/main" val="366754895"/>
+                  </a:ext>
+                </a:extLst>
+              </a:tr>
+              <a:tr h="243131">
+                <a:tc>
+                  <a:txBody>
+                    <a:bodyPr/>
+                    <a:lstStyle/>
+                    <a:p>
+                      <a:pPr algn="r" rtl="0" fontAlgn="b"/>
+                      <a:r>
+                        <a:rPr lang="en-US" sz="1400" b="0" dirty="0">
+                          <a:solidFill>
+                            <a:srgbClr val="000000"/>
+                          </a:solidFill>
+                          <a:effectLst/>
+                          <a:latin typeface="Calibri" panose="020F0502020204030204" pitchFamily="34" charset="0"/>
+                        </a:rPr>
+                        <a:t>86</a:t>
+                      </a:r>
+                    </a:p>
+                  </a:txBody>
+                  <a:tcPr marL="27106" marR="27106" marT="18070" marB="18070" anchor="b">
+                    <a:lnL w="9525" cap="flat" cmpd="sng" algn="ctr">
+                      <a:solidFill>
+                        <a:srgbClr val="CCCCCC"/>
+                      </a:solidFill>
+                      <a:prstDash val="solid"/>
+                      <a:round/>
+                      <a:headEnd type="none" w="med" len="med"/>
+                      <a:tailEnd type="none" w="med" len="med"/>
+                    </a:lnL>
+                    <a:lnR w="9525" cap="flat" cmpd="sng" algn="ctr">
+                      <a:solidFill>
+                        <a:srgbClr val="CCCCCC"/>
+                      </a:solidFill>
+                      <a:prstDash val="solid"/>
+                      <a:round/>
+                      <a:headEnd type="none" w="med" len="med"/>
+                      <a:tailEnd type="none" w="med" len="med"/>
+                    </a:lnR>
+                    <a:lnT w="9525" cap="flat" cmpd="sng" algn="ctr">
+                      <a:solidFill>
+                        <a:srgbClr val="CCCCCC"/>
+                      </a:solidFill>
+                      <a:prstDash val="solid"/>
+                      <a:round/>
+                      <a:headEnd type="none" w="med" len="med"/>
+                      <a:tailEnd type="none" w="med" len="med"/>
+                    </a:lnT>
+                    <a:lnB w="9525" cap="flat" cmpd="sng" algn="ctr">
+                      <a:solidFill>
+                        <a:srgbClr val="CCCCCC"/>
+                      </a:solidFill>
+                      <a:prstDash val="solid"/>
+                      <a:round/>
+                      <a:headEnd type="none" w="med" len="med"/>
+                      <a:tailEnd type="none" w="med" len="med"/>
+                    </a:lnB>
+                  </a:tcPr>
+                </a:tc>
+                <a:tc>
+                  <a:txBody>
+                    <a:bodyPr/>
+                    <a:lstStyle/>
+                    <a:p>
+                      <a:pPr rtl="0" fontAlgn="b"/>
+                      <a:r>
+                        <a:rPr lang="en-US" sz="1400" b="0" dirty="0" err="1">
+                          <a:solidFill>
+                            <a:srgbClr val="000000"/>
+                          </a:solidFill>
+                          <a:effectLst/>
+                          <a:latin typeface="Calibri" panose="020F0502020204030204" pitchFamily="34" charset="0"/>
+                        </a:rPr>
+                        <a:t>Klepsatel</a:t>
+                      </a:r>
+                      <a:r>
+                        <a:rPr lang="en-US" sz="1400" b="0" dirty="0">
+                          <a:solidFill>
+                            <a:srgbClr val="000000"/>
+                          </a:solidFill>
+                          <a:effectLst/>
+                          <a:latin typeface="Calibri" panose="020F0502020204030204" pitchFamily="34" charset="0"/>
+                        </a:rPr>
+                        <a:t> et al. 2013</a:t>
+                      </a:r>
+                    </a:p>
+                  </a:txBody>
+                  <a:tcPr marL="27106" marR="27106" marT="18070" marB="18070" anchor="b">
+                    <a:lnL w="9525" cap="flat" cmpd="sng" algn="ctr">
+                      <a:solidFill>
+                        <a:srgbClr val="CCCCCC"/>
+                      </a:solidFill>
+                      <a:prstDash val="solid"/>
+                      <a:round/>
+                      <a:headEnd type="none" w="med" len="med"/>
+                      <a:tailEnd type="none" w="med" len="med"/>
+                    </a:lnL>
+                    <a:lnR w="9525" cap="flat" cmpd="sng" algn="ctr">
+                      <a:solidFill>
+                        <a:srgbClr val="CCCCCC"/>
+                      </a:solidFill>
+                      <a:prstDash val="solid"/>
+                      <a:round/>
+                      <a:headEnd type="none" w="med" len="med"/>
+                      <a:tailEnd type="none" w="med" len="med"/>
+                    </a:lnR>
+                    <a:lnT w="9525" cap="flat" cmpd="sng" algn="ctr">
+                      <a:solidFill>
+                        <a:srgbClr val="CCCCCC"/>
+                      </a:solidFill>
+                      <a:prstDash val="solid"/>
+                      <a:round/>
+                      <a:headEnd type="none" w="med" len="med"/>
+                      <a:tailEnd type="none" w="med" len="med"/>
+                    </a:lnT>
+                    <a:lnB w="9525" cap="flat" cmpd="sng" algn="ctr">
+                      <a:solidFill>
+                        <a:srgbClr val="CCCCCC"/>
+                      </a:solidFill>
+                      <a:prstDash val="solid"/>
+                      <a:round/>
+                      <a:headEnd type="none" w="med" len="med"/>
+                      <a:tailEnd type="none" w="med" len="med"/>
+                    </a:lnB>
+                  </a:tcPr>
+                </a:tc>
+                <a:tc>
+                  <a:txBody>
+                    <a:bodyPr/>
+                    <a:lstStyle/>
+                    <a:p>
+                      <a:pPr rtl="0" fontAlgn="b"/>
+                      <a:r>
+                        <a:rPr lang="en-US" sz="1400" b="0" dirty="0">
+                          <a:solidFill>
+                            <a:srgbClr val="000000"/>
+                          </a:solidFill>
+                          <a:effectLst/>
+                          <a:latin typeface="Calibri" panose="020F0502020204030204" pitchFamily="34" charset="0"/>
+                        </a:rPr>
+                        <a:t>No</a:t>
+                      </a:r>
+                    </a:p>
+                  </a:txBody>
+                  <a:tcPr marL="27106" marR="27106" marT="18070" marB="18070" anchor="b">
+                    <a:lnL w="9525" cap="flat" cmpd="sng" algn="ctr">
+                      <a:solidFill>
+                        <a:srgbClr val="CCCCCC"/>
+                      </a:solidFill>
+                      <a:prstDash val="solid"/>
+                      <a:round/>
+                      <a:headEnd type="none" w="med" len="med"/>
+                      <a:tailEnd type="none" w="med" len="med"/>
+                    </a:lnL>
+                    <a:lnR w="9525" cap="flat" cmpd="sng" algn="ctr">
+                      <a:solidFill>
+                        <a:srgbClr val="CCCCCC"/>
+                      </a:solidFill>
+                      <a:prstDash val="solid"/>
+                      <a:round/>
+                      <a:headEnd type="none" w="med" len="med"/>
+                      <a:tailEnd type="none" w="med" len="med"/>
+                    </a:lnR>
+                    <a:lnT w="9525" cap="flat" cmpd="sng" algn="ctr">
+                      <a:solidFill>
+                        <a:srgbClr val="CCCCCC"/>
+                      </a:solidFill>
+                      <a:prstDash val="solid"/>
+                      <a:round/>
+                      <a:headEnd type="none" w="med" len="med"/>
+                      <a:tailEnd type="none" w="med" len="med"/>
+                    </a:lnT>
+                    <a:lnB w="9525" cap="flat" cmpd="sng" algn="ctr">
+                      <a:solidFill>
+                        <a:srgbClr val="CCCCCC"/>
+                      </a:solidFill>
+                      <a:prstDash val="solid"/>
+                      <a:round/>
+                      <a:headEnd type="none" w="med" len="med"/>
+                      <a:tailEnd type="none" w="med" len="med"/>
+                    </a:lnB>
+                  </a:tcPr>
+                </a:tc>
+                <a:tc>
+                  <a:txBody>
+                    <a:bodyPr/>
+                    <a:lstStyle/>
+                    <a:p>
+                      <a:pPr rtl="0" fontAlgn="b"/>
+                      <a:r>
+                        <a:rPr lang="en-US" sz="1400" b="0" dirty="0">
+                          <a:solidFill>
+                            <a:srgbClr val="000000"/>
+                          </a:solidFill>
+                          <a:effectLst/>
+                          <a:latin typeface="Calibri" panose="020F0502020204030204" pitchFamily="34" charset="0"/>
+                        </a:rPr>
+                        <a:t>Drosophila melanogaster</a:t>
+                      </a:r>
+                    </a:p>
+                  </a:txBody>
+                  <a:tcPr marL="27106" marR="27106" marT="18070" marB="18070" anchor="b">
+                    <a:lnL w="9525" cap="flat" cmpd="sng" algn="ctr">
+                      <a:solidFill>
+                        <a:srgbClr val="CCCCCC"/>
+                      </a:solidFill>
+                      <a:prstDash val="solid"/>
+                      <a:round/>
+                      <a:headEnd type="none" w="med" len="med"/>
+                      <a:tailEnd type="none" w="med" len="med"/>
+                    </a:lnL>
+                    <a:lnR w="9525" cap="flat" cmpd="sng" algn="ctr">
+                      <a:solidFill>
+                        <a:srgbClr val="CCCCCC"/>
+                      </a:solidFill>
+                      <a:prstDash val="solid"/>
+                      <a:round/>
+                      <a:headEnd type="none" w="med" len="med"/>
+                      <a:tailEnd type="none" w="med" len="med"/>
+                    </a:lnR>
+                    <a:lnT w="9525" cap="flat" cmpd="sng" algn="ctr">
+                      <a:solidFill>
+                        <a:srgbClr val="CCCCCC"/>
+                      </a:solidFill>
+                      <a:prstDash val="solid"/>
+                      <a:round/>
+                      <a:headEnd type="none" w="med" len="med"/>
+                      <a:tailEnd type="none" w="med" len="med"/>
+                    </a:lnT>
+                    <a:lnB w="9525" cap="flat" cmpd="sng" algn="ctr">
+                      <a:solidFill>
+                        <a:srgbClr val="CCCCCC"/>
+                      </a:solidFill>
+                      <a:prstDash val="solid"/>
+                      <a:round/>
+                      <a:headEnd type="none" w="med" len="med"/>
+                      <a:tailEnd type="none" w="med" len="med"/>
+                    </a:lnB>
+                  </a:tcPr>
+                </a:tc>
+                <a:tc>
+                  <a:txBody>
+                    <a:bodyPr/>
+                    <a:lstStyle/>
+                    <a:p>
+                      <a:pPr rtl="0" fontAlgn="b"/>
+                      <a:r>
+                        <a:rPr lang="en-US" sz="1400" b="0" dirty="0">
+                          <a:solidFill>
+                            <a:srgbClr val="000000"/>
+                          </a:solidFill>
+                          <a:effectLst/>
+                          <a:latin typeface="Calibri" panose="020F0502020204030204" pitchFamily="34" charset="0"/>
+                        </a:rPr>
+                        <a:t>No constant temperatures, only varying temperatures</a:t>
+                      </a:r>
+                    </a:p>
+                  </a:txBody>
+                  <a:tcPr marL="27106" marR="27106" marT="18070" marB="18070" anchor="b">
+                    <a:lnL w="9525" cap="flat" cmpd="sng" algn="ctr">
+                      <a:solidFill>
+                        <a:srgbClr val="CCCCCC"/>
+                      </a:solidFill>
+                      <a:prstDash val="solid"/>
+                      <a:round/>
+                      <a:headEnd type="none" w="med" len="med"/>
+                      <a:tailEnd type="none" w="med" len="med"/>
+                    </a:lnL>
+                    <a:lnR w="9525" cap="flat" cmpd="sng" algn="ctr">
+                      <a:solidFill>
+                        <a:srgbClr val="CCCCCC"/>
+                      </a:solidFill>
+                      <a:prstDash val="solid"/>
+                      <a:round/>
+                      <a:headEnd type="none" w="med" len="med"/>
+                      <a:tailEnd type="none" w="med" len="med"/>
+                    </a:lnR>
+                    <a:lnT w="9525" cap="flat" cmpd="sng" algn="ctr">
+                      <a:solidFill>
+                        <a:srgbClr val="CCCCCC"/>
+                      </a:solidFill>
+                      <a:prstDash val="solid"/>
+                      <a:round/>
+                      <a:headEnd type="none" w="med" len="med"/>
+                      <a:tailEnd type="none" w="med" len="med"/>
+                    </a:lnT>
+                    <a:lnB w="9525" cap="flat" cmpd="sng" algn="ctr">
+                      <a:solidFill>
+                        <a:srgbClr val="CCCCCC"/>
+                      </a:solidFill>
+                      <a:prstDash val="solid"/>
+                      <a:round/>
+                      <a:headEnd type="none" w="med" len="med"/>
+                      <a:tailEnd type="none" w="med" len="med"/>
+                    </a:lnB>
+                  </a:tcPr>
+                </a:tc>
+                <a:extLst>
+                  <a:ext uri="{0D108BD9-81ED-4DB2-BD59-A6C34878D82A}">
+                    <a16:rowId xmlns:a16="http://schemas.microsoft.com/office/drawing/2014/main" val="1614122174"/>
+                  </a:ext>
+                </a:extLst>
+              </a:tr>
+              <a:tr h="709319">
+                <a:tc>
+                  <a:txBody>
+                    <a:bodyPr/>
+                    <a:lstStyle/>
+                    <a:p>
+                      <a:pPr algn="r" rtl="0" fontAlgn="b"/>
+                      <a:r>
+                        <a:rPr lang="en-US" sz="1400" b="0" dirty="0">
+                          <a:solidFill>
+                            <a:srgbClr val="000000"/>
+                          </a:solidFill>
+                          <a:effectLst/>
+                          <a:latin typeface="Calibri" panose="020F0502020204030204" pitchFamily="34" charset="0"/>
+                        </a:rPr>
+                        <a:t>90</a:t>
+                      </a:r>
+                    </a:p>
+                  </a:txBody>
+                  <a:tcPr marL="27106" marR="27106" marT="18070" marB="18070" anchor="b">
+                    <a:lnL w="9525" cap="flat" cmpd="sng" algn="ctr">
+                      <a:solidFill>
+                        <a:srgbClr val="CCCCCC"/>
+                      </a:solidFill>
+                      <a:prstDash val="solid"/>
+                      <a:round/>
+                      <a:headEnd type="none" w="med" len="med"/>
+                      <a:tailEnd type="none" w="med" len="med"/>
+                    </a:lnL>
+                    <a:lnR w="9525" cap="flat" cmpd="sng" algn="ctr">
+                      <a:solidFill>
+                        <a:srgbClr val="CCCCCC"/>
+                      </a:solidFill>
+                      <a:prstDash val="solid"/>
+                      <a:round/>
+                      <a:headEnd type="none" w="med" len="med"/>
+                      <a:tailEnd type="none" w="med" len="med"/>
+                    </a:lnR>
+                    <a:lnT w="9525" cap="flat" cmpd="sng" algn="ctr">
+                      <a:solidFill>
+                        <a:srgbClr val="CCCCCC"/>
+                      </a:solidFill>
+                      <a:prstDash val="solid"/>
+                      <a:round/>
+                      <a:headEnd type="none" w="med" len="med"/>
+                      <a:tailEnd type="none" w="med" len="med"/>
+                    </a:lnT>
+                    <a:lnB w="9525" cap="flat" cmpd="sng" algn="ctr">
+                      <a:solidFill>
+                        <a:srgbClr val="CCCCCC"/>
+                      </a:solidFill>
+                      <a:prstDash val="solid"/>
+                      <a:round/>
+                      <a:headEnd type="none" w="med" len="med"/>
+                      <a:tailEnd type="none" w="med" len="med"/>
+                    </a:lnB>
+                  </a:tcPr>
+                </a:tc>
+                <a:tc>
+                  <a:txBody>
+                    <a:bodyPr/>
+                    <a:lstStyle/>
+                    <a:p>
+                      <a:pPr rtl="0" fontAlgn="b"/>
+                      <a:r>
+                        <a:rPr lang="en-US" sz="1400" b="0" dirty="0">
+                          <a:solidFill>
+                            <a:srgbClr val="000000"/>
+                          </a:solidFill>
+                          <a:effectLst/>
+                          <a:latin typeface="Calibri" panose="020F0502020204030204" pitchFamily="34" charset="0"/>
+                        </a:rPr>
+                        <a:t>Duncan et al. 2011</a:t>
+                      </a:r>
+                    </a:p>
+                  </a:txBody>
+                  <a:tcPr marL="27106" marR="27106" marT="18070" marB="18070" anchor="b">
+                    <a:lnL w="9525" cap="flat" cmpd="sng" algn="ctr">
+                      <a:solidFill>
+                        <a:srgbClr val="CCCCCC"/>
+                      </a:solidFill>
+                      <a:prstDash val="solid"/>
+                      <a:round/>
+                      <a:headEnd type="none" w="med" len="med"/>
+                      <a:tailEnd type="none" w="med" len="med"/>
+                    </a:lnL>
+                    <a:lnR w="9525" cap="flat" cmpd="sng" algn="ctr">
+                      <a:solidFill>
+                        <a:srgbClr val="CCCCCC"/>
+                      </a:solidFill>
+                      <a:prstDash val="solid"/>
+                      <a:round/>
+                      <a:headEnd type="none" w="med" len="med"/>
+                      <a:tailEnd type="none" w="med" len="med"/>
+                    </a:lnR>
+                    <a:lnT w="9525" cap="flat" cmpd="sng" algn="ctr">
+                      <a:solidFill>
+                        <a:srgbClr val="CCCCCC"/>
+                      </a:solidFill>
+                      <a:prstDash val="solid"/>
+                      <a:round/>
+                      <a:headEnd type="none" w="med" len="med"/>
+                      <a:tailEnd type="none" w="med" len="med"/>
+                    </a:lnT>
+                    <a:lnB w="9525" cap="flat" cmpd="sng" algn="ctr">
+                      <a:solidFill>
+                        <a:srgbClr val="CCCCCC"/>
+                      </a:solidFill>
+                      <a:prstDash val="solid"/>
+                      <a:round/>
+                      <a:headEnd type="none" w="med" len="med"/>
+                      <a:tailEnd type="none" w="med" len="med"/>
+                    </a:lnB>
+                  </a:tcPr>
+                </a:tc>
+                <a:tc>
+                  <a:txBody>
+                    <a:bodyPr/>
+                    <a:lstStyle/>
+                    <a:p>
+                      <a:pPr rtl="0" fontAlgn="b"/>
+                      <a:r>
+                        <a:rPr lang="en-US" sz="1400" b="0">
+                          <a:solidFill>
+                            <a:srgbClr val="000000"/>
+                          </a:solidFill>
+                          <a:effectLst/>
+                          <a:latin typeface="Calibri" panose="020F0502020204030204" pitchFamily="34" charset="0"/>
+                        </a:rPr>
+                        <a:t>Yes</a:t>
+                      </a:r>
+                    </a:p>
+                  </a:txBody>
+                  <a:tcPr marL="27106" marR="27106" marT="18070" marB="18070" anchor="b">
+                    <a:lnL w="9525" cap="flat" cmpd="sng" algn="ctr">
+                      <a:solidFill>
+                        <a:srgbClr val="CCCCCC"/>
+                      </a:solidFill>
+                      <a:prstDash val="solid"/>
+                      <a:round/>
+                      <a:headEnd type="none" w="med" len="med"/>
+                      <a:tailEnd type="none" w="med" len="med"/>
+                    </a:lnL>
+                    <a:lnR w="9525" cap="flat" cmpd="sng" algn="ctr">
+                      <a:solidFill>
+                        <a:srgbClr val="CCCCCC"/>
+                      </a:solidFill>
+                      <a:prstDash val="solid"/>
+                      <a:round/>
+                      <a:headEnd type="none" w="med" len="med"/>
+                      <a:tailEnd type="none" w="med" len="med"/>
+                    </a:lnR>
+                    <a:lnT w="9525" cap="flat" cmpd="sng" algn="ctr">
+                      <a:solidFill>
+                        <a:srgbClr val="CCCCCC"/>
+                      </a:solidFill>
+                      <a:prstDash val="solid"/>
+                      <a:round/>
+                      <a:headEnd type="none" w="med" len="med"/>
+                      <a:tailEnd type="none" w="med" len="med"/>
+                    </a:lnT>
+                    <a:lnB w="9525" cap="flat" cmpd="sng" algn="ctr">
+                      <a:solidFill>
+                        <a:srgbClr val="CCCCCC"/>
+                      </a:solidFill>
+                      <a:prstDash val="solid"/>
+                      <a:round/>
+                      <a:headEnd type="none" w="med" len="med"/>
+                      <a:tailEnd type="none" w="med" len="med"/>
+                    </a:lnB>
+                  </a:tcPr>
+                </a:tc>
+                <a:tc>
+                  <a:txBody>
+                    <a:bodyPr/>
+                    <a:lstStyle/>
+                    <a:p>
+                      <a:pPr rtl="0" fontAlgn="b"/>
+                      <a:r>
+                        <a:rPr lang="en-US" sz="1400" b="0" dirty="0">
+                          <a:solidFill>
+                            <a:srgbClr val="000000"/>
+                          </a:solidFill>
+                          <a:effectLst/>
+                          <a:latin typeface="Calibri" panose="020F0502020204030204" pitchFamily="34" charset="0"/>
+                        </a:rPr>
+                        <a:t>Paramecium</a:t>
+                      </a:r>
+                    </a:p>
+                  </a:txBody>
+                  <a:tcPr marL="27106" marR="27106" marT="18070" marB="18070" anchor="b">
+                    <a:lnL w="9525" cap="flat" cmpd="sng" algn="ctr">
+                      <a:solidFill>
+                        <a:srgbClr val="CCCCCC"/>
+                      </a:solidFill>
+                      <a:prstDash val="solid"/>
+                      <a:round/>
+                      <a:headEnd type="none" w="med" len="med"/>
+                      <a:tailEnd type="none" w="med" len="med"/>
+                    </a:lnL>
+                    <a:lnR w="9525" cap="flat" cmpd="sng" algn="ctr">
+                      <a:solidFill>
+                        <a:srgbClr val="CCCCCC"/>
+                      </a:solidFill>
+                      <a:prstDash val="solid"/>
+                      <a:round/>
+                      <a:headEnd type="none" w="med" len="med"/>
+                      <a:tailEnd type="none" w="med" len="med"/>
+                    </a:lnR>
+                    <a:lnT w="9525" cap="flat" cmpd="sng" algn="ctr">
+                      <a:solidFill>
+                        <a:srgbClr val="CCCCCC"/>
+                      </a:solidFill>
+                      <a:prstDash val="solid"/>
+                      <a:round/>
+                      <a:headEnd type="none" w="med" len="med"/>
+                      <a:tailEnd type="none" w="med" len="med"/>
+                    </a:lnT>
+                    <a:lnB w="9525" cap="flat" cmpd="sng" algn="ctr">
+                      <a:solidFill>
+                        <a:srgbClr val="CCCCCC"/>
+                      </a:solidFill>
+                      <a:prstDash val="solid"/>
+                      <a:round/>
+                      <a:headEnd type="none" w="med" len="med"/>
+                      <a:tailEnd type="none" w="med" len="med"/>
+                    </a:lnB>
+                  </a:tcPr>
+                </a:tc>
+                <a:tc>
+                  <a:txBody>
+                    <a:bodyPr/>
+                    <a:lstStyle/>
+                    <a:p>
+                      <a:pPr rtl="0" fontAlgn="b"/>
+                      <a:r>
+                        <a:rPr lang="en-US" sz="1400" b="0" dirty="0">
+                          <a:solidFill>
+                            <a:srgbClr val="000000"/>
+                          </a:solidFill>
+                          <a:effectLst/>
+                          <a:latin typeface="Calibri" panose="020F0502020204030204" pitchFamily="34" charset="0"/>
+                        </a:rPr>
+                        <a:t>The reported traits are not the kinds of traits we’d expect rate summation to work for (population-level emergent properties of many traits, e.g., population size, infection prevalence, probability of </a:t>
+                      </a:r>
+                      <a:r>
+                        <a:rPr lang="en-US" sz="1400" b="0" dirty="0" err="1">
+                          <a:solidFill>
+                            <a:srgbClr val="000000"/>
+                          </a:solidFill>
+                          <a:effectLst/>
+                          <a:latin typeface="Calibri" panose="020F0502020204030204" pitchFamily="34" charset="0"/>
+                        </a:rPr>
+                        <a:t>exinction</a:t>
+                      </a:r>
+                      <a:r>
+                        <a:rPr lang="en-US" sz="1400" b="0" dirty="0">
+                          <a:solidFill>
+                            <a:srgbClr val="000000"/>
+                          </a:solidFill>
+                          <a:effectLst/>
+                          <a:latin typeface="Calibri" panose="020F0502020204030204" pitchFamily="34" charset="0"/>
+                        </a:rPr>
+                        <a:t>), nor does rate summation come close to working based on visual inspection (bigger differences between varying vs. constant treatments than across mean temperatures).</a:t>
+                      </a:r>
+                    </a:p>
+                  </a:txBody>
+                  <a:tcPr marL="27106" marR="27106" marT="18070" marB="18070" anchor="b">
+                    <a:lnL w="9525" cap="flat" cmpd="sng" algn="ctr">
+                      <a:solidFill>
+                        <a:srgbClr val="CCCCCC"/>
+                      </a:solidFill>
+                      <a:prstDash val="solid"/>
+                      <a:round/>
+                      <a:headEnd type="none" w="med" len="med"/>
+                      <a:tailEnd type="none" w="med" len="med"/>
+                    </a:lnL>
+                    <a:lnR w="9525" cap="flat" cmpd="sng" algn="ctr">
+                      <a:solidFill>
+                        <a:srgbClr val="CCCCCC"/>
+                      </a:solidFill>
+                      <a:prstDash val="solid"/>
+                      <a:round/>
+                      <a:headEnd type="none" w="med" len="med"/>
+                      <a:tailEnd type="none" w="med" len="med"/>
+                    </a:lnR>
+                    <a:lnT w="9525" cap="flat" cmpd="sng" algn="ctr">
+                      <a:solidFill>
+                        <a:srgbClr val="CCCCCC"/>
+                      </a:solidFill>
+                      <a:prstDash val="solid"/>
+                      <a:round/>
+                      <a:headEnd type="none" w="med" len="med"/>
+                      <a:tailEnd type="none" w="med" len="med"/>
+                    </a:lnT>
+                    <a:lnB w="9525" cap="flat" cmpd="sng" algn="ctr">
+                      <a:solidFill>
+                        <a:srgbClr val="CCCCCC"/>
+                      </a:solidFill>
+                      <a:prstDash val="solid"/>
+                      <a:round/>
+                      <a:headEnd type="none" w="med" len="med"/>
+                      <a:tailEnd type="none" w="med" len="med"/>
+                    </a:lnB>
+                  </a:tcPr>
+                </a:tc>
+                <a:extLst>
+                  <a:ext uri="{0D108BD9-81ED-4DB2-BD59-A6C34878D82A}">
+                    <a16:rowId xmlns:a16="http://schemas.microsoft.com/office/drawing/2014/main" val="914636203"/>
+                  </a:ext>
+                </a:extLst>
+              </a:tr>
+              <a:tr h="709319">
+                <a:tc>
+                  <a:txBody>
+                    <a:bodyPr/>
+                    <a:lstStyle/>
+                    <a:p>
+                      <a:pPr algn="r" rtl="0" fontAlgn="b"/>
+                      <a:r>
+                        <a:rPr lang="en-US" sz="1400" b="0" dirty="0">
+                          <a:solidFill>
+                            <a:srgbClr val="000000"/>
+                          </a:solidFill>
+                          <a:effectLst/>
+                          <a:latin typeface="Calibri" panose="020F0502020204030204" pitchFamily="34" charset="0"/>
+                        </a:rPr>
+                        <a:t>91</a:t>
+                      </a:r>
+                    </a:p>
+                  </a:txBody>
+                  <a:tcPr marL="27106" marR="27106" marT="18070" marB="18070" anchor="b">
+                    <a:lnL w="9525" cap="flat" cmpd="sng" algn="ctr">
+                      <a:solidFill>
+                        <a:srgbClr val="CCCCCC"/>
+                      </a:solidFill>
+                      <a:prstDash val="solid"/>
+                      <a:round/>
+                      <a:headEnd type="none" w="med" len="med"/>
+                      <a:tailEnd type="none" w="med" len="med"/>
+                    </a:lnL>
+                    <a:lnR w="9525" cap="flat" cmpd="sng" algn="ctr">
+                      <a:solidFill>
+                        <a:srgbClr val="CCCCCC"/>
+                      </a:solidFill>
+                      <a:prstDash val="solid"/>
+                      <a:round/>
+                      <a:headEnd type="none" w="med" len="med"/>
+                      <a:tailEnd type="none" w="med" len="med"/>
+                    </a:lnR>
+                    <a:lnT w="9525" cap="flat" cmpd="sng" algn="ctr">
+                      <a:solidFill>
+                        <a:srgbClr val="CCCCCC"/>
+                      </a:solidFill>
+                      <a:prstDash val="solid"/>
+                      <a:round/>
+                      <a:headEnd type="none" w="med" len="med"/>
+                      <a:tailEnd type="none" w="med" len="med"/>
+                    </a:lnT>
+                    <a:lnB w="9525" cap="flat" cmpd="sng" algn="ctr">
+                      <a:solidFill>
+                        <a:srgbClr val="CCCCCC"/>
+                      </a:solidFill>
+                      <a:prstDash val="solid"/>
+                      <a:round/>
+                      <a:headEnd type="none" w="med" len="med"/>
+                      <a:tailEnd type="none" w="med" len="med"/>
+                    </a:lnB>
+                  </a:tcPr>
+                </a:tc>
+                <a:tc>
+                  <a:txBody>
+                    <a:bodyPr/>
+                    <a:lstStyle/>
+                    <a:p>
+                      <a:pPr rtl="0" fontAlgn="b"/>
+                      <a:r>
+                        <a:rPr lang="en-US" sz="1400" b="0" dirty="0" err="1">
+                          <a:solidFill>
+                            <a:srgbClr val="000000"/>
+                          </a:solidFill>
+                          <a:effectLst/>
+                          <a:latin typeface="Calibri" panose="020F0502020204030204" pitchFamily="34" charset="0"/>
+                        </a:rPr>
+                        <a:t>Radmacher</a:t>
+                      </a:r>
+                      <a:r>
+                        <a:rPr lang="en-US" sz="1400" b="0" dirty="0">
+                          <a:solidFill>
+                            <a:srgbClr val="000000"/>
+                          </a:solidFill>
+                          <a:effectLst/>
+                          <a:latin typeface="Calibri" panose="020F0502020204030204" pitchFamily="34" charset="0"/>
+                        </a:rPr>
+                        <a:t> &amp; </a:t>
+                      </a:r>
+                      <a:r>
+                        <a:rPr lang="en-US" sz="1400" b="0" dirty="0" err="1">
+                          <a:solidFill>
+                            <a:srgbClr val="000000"/>
+                          </a:solidFill>
+                          <a:effectLst/>
+                          <a:latin typeface="Calibri" panose="020F0502020204030204" pitchFamily="34" charset="0"/>
+                        </a:rPr>
+                        <a:t>Strohm</a:t>
+                      </a:r>
+                      <a:r>
+                        <a:rPr lang="en-US" sz="1400" b="0" dirty="0">
+                          <a:solidFill>
+                            <a:srgbClr val="000000"/>
+                          </a:solidFill>
+                          <a:effectLst/>
+                          <a:latin typeface="Calibri" panose="020F0502020204030204" pitchFamily="34" charset="0"/>
+                        </a:rPr>
+                        <a:t> 2011</a:t>
+                      </a:r>
+                    </a:p>
+                  </a:txBody>
+                  <a:tcPr marL="27106" marR="27106" marT="18070" marB="18070" anchor="b">
+                    <a:lnL w="9525" cap="flat" cmpd="sng" algn="ctr">
+                      <a:solidFill>
+                        <a:srgbClr val="CCCCCC"/>
+                      </a:solidFill>
+                      <a:prstDash val="solid"/>
+                      <a:round/>
+                      <a:headEnd type="none" w="med" len="med"/>
+                      <a:tailEnd type="none" w="med" len="med"/>
+                    </a:lnL>
+                    <a:lnR w="9525" cap="flat" cmpd="sng" algn="ctr">
+                      <a:solidFill>
+                        <a:srgbClr val="CCCCCC"/>
+                      </a:solidFill>
+                      <a:prstDash val="solid"/>
+                      <a:round/>
+                      <a:headEnd type="none" w="med" len="med"/>
+                      <a:tailEnd type="none" w="med" len="med"/>
+                    </a:lnR>
+                    <a:lnT w="9525" cap="flat" cmpd="sng" algn="ctr">
+                      <a:solidFill>
+                        <a:srgbClr val="CCCCCC"/>
+                      </a:solidFill>
+                      <a:prstDash val="solid"/>
+                      <a:round/>
+                      <a:headEnd type="none" w="med" len="med"/>
+                      <a:tailEnd type="none" w="med" len="med"/>
+                    </a:lnT>
+                    <a:lnB w="9525" cap="flat" cmpd="sng" algn="ctr">
+                      <a:solidFill>
+                        <a:srgbClr val="CCCCCC"/>
+                      </a:solidFill>
+                      <a:prstDash val="solid"/>
+                      <a:round/>
+                      <a:headEnd type="none" w="med" len="med"/>
+                      <a:tailEnd type="none" w="med" len="med"/>
+                    </a:lnB>
+                  </a:tcPr>
+                </a:tc>
+                <a:tc>
+                  <a:txBody>
+                    <a:bodyPr/>
+                    <a:lstStyle/>
+                    <a:p>
+                      <a:pPr rtl="0" fontAlgn="b"/>
+                      <a:r>
+                        <a:rPr lang="en-US" sz="1400" b="0" dirty="0">
+                          <a:solidFill>
+                            <a:srgbClr val="000000"/>
+                          </a:solidFill>
+                          <a:effectLst/>
+                          <a:latin typeface="Calibri" panose="020F0502020204030204" pitchFamily="34" charset="0"/>
+                        </a:rPr>
+                        <a:t>Yes</a:t>
+                      </a:r>
+                    </a:p>
+                  </a:txBody>
+                  <a:tcPr marL="27106" marR="27106" marT="18070" marB="18070" anchor="b">
+                    <a:lnL w="9525" cap="flat" cmpd="sng" algn="ctr">
+                      <a:solidFill>
+                        <a:srgbClr val="CCCCCC"/>
+                      </a:solidFill>
+                      <a:prstDash val="solid"/>
+                      <a:round/>
+                      <a:headEnd type="none" w="med" len="med"/>
+                      <a:tailEnd type="none" w="med" len="med"/>
+                    </a:lnL>
+                    <a:lnR w="9525" cap="flat" cmpd="sng" algn="ctr">
+                      <a:solidFill>
+                        <a:srgbClr val="CCCCCC"/>
+                      </a:solidFill>
+                      <a:prstDash val="solid"/>
+                      <a:round/>
+                      <a:headEnd type="none" w="med" len="med"/>
+                      <a:tailEnd type="none" w="med" len="med"/>
+                    </a:lnR>
+                    <a:lnT w="9525" cap="flat" cmpd="sng" algn="ctr">
+                      <a:solidFill>
+                        <a:srgbClr val="CCCCCC"/>
+                      </a:solidFill>
+                      <a:prstDash val="solid"/>
+                      <a:round/>
+                      <a:headEnd type="none" w="med" len="med"/>
+                      <a:tailEnd type="none" w="med" len="med"/>
+                    </a:lnT>
+                    <a:lnB w="9525" cap="flat" cmpd="sng" algn="ctr">
+                      <a:solidFill>
+                        <a:srgbClr val="CCCCCC"/>
+                      </a:solidFill>
+                      <a:prstDash val="solid"/>
+                      <a:round/>
+                      <a:headEnd type="none" w="med" len="med"/>
+                      <a:tailEnd type="none" w="med" len="med"/>
+                    </a:lnB>
+                  </a:tcPr>
+                </a:tc>
+                <a:tc>
+                  <a:txBody>
+                    <a:bodyPr/>
+                    <a:lstStyle/>
+                    <a:p>
+                      <a:pPr rtl="0" fontAlgn="b"/>
+                      <a:r>
+                        <a:rPr lang="en-US" sz="1400" b="0" dirty="0">
+                          <a:solidFill>
+                            <a:srgbClr val="000000"/>
+                          </a:solidFill>
+                          <a:effectLst/>
+                          <a:latin typeface="Calibri" panose="020F0502020204030204" pitchFamily="34" charset="0"/>
+                        </a:rPr>
+                        <a:t>bee</a:t>
+                      </a:r>
+                    </a:p>
+                  </a:txBody>
+                  <a:tcPr marL="27106" marR="27106" marT="18070" marB="18070" anchor="b">
+                    <a:lnL w="9525" cap="flat" cmpd="sng" algn="ctr">
+                      <a:solidFill>
+                        <a:srgbClr val="CCCCCC"/>
+                      </a:solidFill>
+                      <a:prstDash val="solid"/>
+                      <a:round/>
+                      <a:headEnd type="none" w="med" len="med"/>
+                      <a:tailEnd type="none" w="med" len="med"/>
+                    </a:lnL>
+                    <a:lnR w="9525" cap="flat" cmpd="sng" algn="ctr">
+                      <a:solidFill>
+                        <a:srgbClr val="CCCCCC"/>
+                      </a:solidFill>
+                      <a:prstDash val="solid"/>
+                      <a:round/>
+                      <a:headEnd type="none" w="med" len="med"/>
+                      <a:tailEnd type="none" w="med" len="med"/>
+                    </a:lnR>
+                    <a:lnT w="9525" cap="flat" cmpd="sng" algn="ctr">
+                      <a:solidFill>
+                        <a:srgbClr val="CCCCCC"/>
+                      </a:solidFill>
+                      <a:prstDash val="solid"/>
+                      <a:round/>
+                      <a:headEnd type="none" w="med" len="med"/>
+                      <a:tailEnd type="none" w="med" len="med"/>
+                    </a:lnT>
+                    <a:lnB w="9525" cap="flat" cmpd="sng" algn="ctr">
+                      <a:solidFill>
+                        <a:srgbClr val="CCCCCC"/>
+                      </a:solidFill>
+                      <a:prstDash val="solid"/>
+                      <a:round/>
+                      <a:headEnd type="none" w="med" len="med"/>
+                      <a:tailEnd type="none" w="med" len="med"/>
+                    </a:lnB>
+                  </a:tcPr>
+                </a:tc>
+                <a:tc>
+                  <a:txBody>
+                    <a:bodyPr/>
+                    <a:lstStyle/>
+                    <a:p>
+                      <a:pPr rtl="0" fontAlgn="b"/>
+                      <a:r>
+                        <a:rPr lang="en-US" sz="1400" b="0" dirty="0">
+                          <a:solidFill>
+                            <a:srgbClr val="000000"/>
+                          </a:solidFill>
+                          <a:effectLst/>
+                          <a:latin typeface="Calibri" panose="020F0502020204030204" pitchFamily="34" charset="0"/>
+                        </a:rPr>
+                        <a:t>None of the 3 fluctuating temperature treatments (10-15, 15-30, 20-35) were within the range of the 3 constant temperature treatments (17.5, 22.5, 27.5)</a:t>
+                      </a:r>
+                    </a:p>
+                  </a:txBody>
+                  <a:tcPr marL="27106" marR="27106" marT="18070" marB="18070" anchor="b">
+                    <a:lnL w="9525" cap="flat" cmpd="sng" algn="ctr">
+                      <a:solidFill>
+                        <a:srgbClr val="CCCCCC"/>
+                      </a:solidFill>
+                      <a:prstDash val="solid"/>
+                      <a:round/>
+                      <a:headEnd type="none" w="med" len="med"/>
+                      <a:tailEnd type="none" w="med" len="med"/>
+                    </a:lnL>
+                    <a:lnR w="9525" cap="flat" cmpd="sng" algn="ctr">
+                      <a:solidFill>
+                        <a:srgbClr val="CCCCCC"/>
+                      </a:solidFill>
+                      <a:prstDash val="solid"/>
+                      <a:round/>
+                      <a:headEnd type="none" w="med" len="med"/>
+                      <a:tailEnd type="none" w="med" len="med"/>
+                    </a:lnR>
+                    <a:lnT w="9525" cap="flat" cmpd="sng" algn="ctr">
+                      <a:solidFill>
+                        <a:srgbClr val="CCCCCC"/>
+                      </a:solidFill>
+                      <a:prstDash val="solid"/>
+                      <a:round/>
+                      <a:headEnd type="none" w="med" len="med"/>
+                      <a:tailEnd type="none" w="med" len="med"/>
+                    </a:lnT>
+                    <a:lnB w="9525" cap="flat" cmpd="sng" algn="ctr">
+                      <a:solidFill>
+                        <a:srgbClr val="CCCCCC"/>
+                      </a:solidFill>
+                      <a:prstDash val="solid"/>
+                      <a:round/>
+                      <a:headEnd type="none" w="med" len="med"/>
+                      <a:tailEnd type="none" w="med" len="med"/>
+                    </a:lnB>
+                  </a:tcPr>
+                </a:tc>
+                <a:extLst>
+                  <a:ext uri="{0D108BD9-81ED-4DB2-BD59-A6C34878D82A}">
+                    <a16:rowId xmlns:a16="http://schemas.microsoft.com/office/drawing/2014/main" val="1170874403"/>
+                  </a:ext>
+                </a:extLst>
+              </a:tr>
+              <a:tr h="709319">
+                <a:tc>
+                  <a:txBody>
+                    <a:bodyPr/>
+                    <a:lstStyle/>
+                    <a:p>
+                      <a:pPr algn="r" rtl="0" fontAlgn="b"/>
+                      <a:r>
+                        <a:rPr lang="en-US" sz="1400" b="0" dirty="0">
+                          <a:solidFill>
+                            <a:srgbClr val="000000"/>
+                          </a:solidFill>
+                          <a:effectLst/>
+                          <a:latin typeface="Calibri" panose="020F0502020204030204" pitchFamily="34" charset="0"/>
+                        </a:rPr>
+                        <a:t>124</a:t>
+                      </a:r>
+                    </a:p>
+                  </a:txBody>
+                  <a:tcPr marL="27106" marR="27106" marT="18070" marB="18070" anchor="b">
+                    <a:lnL w="9525" cap="flat" cmpd="sng" algn="ctr">
+                      <a:solidFill>
+                        <a:srgbClr val="CCCCCC"/>
+                      </a:solidFill>
+                      <a:prstDash val="solid"/>
+                      <a:round/>
+                      <a:headEnd type="none" w="med" len="med"/>
+                      <a:tailEnd type="none" w="med" len="med"/>
+                    </a:lnL>
+                    <a:lnR w="9525" cap="flat" cmpd="sng" algn="ctr">
+                      <a:solidFill>
+                        <a:srgbClr val="CCCCCC"/>
+                      </a:solidFill>
+                      <a:prstDash val="solid"/>
+                      <a:round/>
+                      <a:headEnd type="none" w="med" len="med"/>
+                      <a:tailEnd type="none" w="med" len="med"/>
+                    </a:lnR>
+                    <a:lnT w="9525" cap="flat" cmpd="sng" algn="ctr">
+                      <a:solidFill>
+                        <a:srgbClr val="CCCCCC"/>
+                      </a:solidFill>
+                      <a:prstDash val="solid"/>
+                      <a:round/>
+                      <a:headEnd type="none" w="med" len="med"/>
+                      <a:tailEnd type="none" w="med" len="med"/>
+                    </a:lnT>
+                    <a:lnB w="9525" cap="flat" cmpd="sng" algn="ctr">
+                      <a:solidFill>
+                        <a:srgbClr val="CCCCCC"/>
+                      </a:solidFill>
+                      <a:prstDash val="solid"/>
+                      <a:round/>
+                      <a:headEnd type="none" w="med" len="med"/>
+                      <a:tailEnd type="none" w="med" len="med"/>
+                    </a:lnB>
+                  </a:tcPr>
+                </a:tc>
+                <a:tc>
+                  <a:txBody>
+                    <a:bodyPr/>
+                    <a:lstStyle/>
+                    <a:p>
+                      <a:pPr rtl="0" fontAlgn="b"/>
+                      <a:r>
+                        <a:rPr lang="en-US" sz="1400" b="0" dirty="0" err="1">
+                          <a:solidFill>
+                            <a:srgbClr val="000000"/>
+                          </a:solidFill>
+                          <a:effectLst/>
+                          <a:latin typeface="Calibri" panose="020F0502020204030204" pitchFamily="34" charset="0"/>
+                        </a:rPr>
+                        <a:t>Seuffert</a:t>
+                      </a:r>
+                      <a:r>
+                        <a:rPr lang="en-US" sz="1400" b="0" dirty="0">
+                          <a:solidFill>
+                            <a:srgbClr val="000000"/>
+                          </a:solidFill>
+                          <a:effectLst/>
+                          <a:latin typeface="Calibri" panose="020F0502020204030204" pitchFamily="34" charset="0"/>
+                        </a:rPr>
+                        <a:t> et al. 2010</a:t>
+                      </a:r>
+                    </a:p>
+                  </a:txBody>
+                  <a:tcPr marL="27106" marR="27106" marT="18070" marB="18070" anchor="b">
+                    <a:lnL w="9525" cap="flat" cmpd="sng" algn="ctr">
+                      <a:solidFill>
+                        <a:srgbClr val="CCCCCC"/>
+                      </a:solidFill>
+                      <a:prstDash val="solid"/>
+                      <a:round/>
+                      <a:headEnd type="none" w="med" len="med"/>
+                      <a:tailEnd type="none" w="med" len="med"/>
+                    </a:lnL>
+                    <a:lnR w="9525" cap="flat" cmpd="sng" algn="ctr">
+                      <a:solidFill>
+                        <a:srgbClr val="CCCCCC"/>
+                      </a:solidFill>
+                      <a:prstDash val="solid"/>
+                      <a:round/>
+                      <a:headEnd type="none" w="med" len="med"/>
+                      <a:tailEnd type="none" w="med" len="med"/>
+                    </a:lnR>
+                    <a:lnT w="9525" cap="flat" cmpd="sng" algn="ctr">
+                      <a:solidFill>
+                        <a:srgbClr val="CCCCCC"/>
+                      </a:solidFill>
+                      <a:prstDash val="solid"/>
+                      <a:round/>
+                      <a:headEnd type="none" w="med" len="med"/>
+                      <a:tailEnd type="none" w="med" len="med"/>
+                    </a:lnT>
+                    <a:lnB w="9525" cap="flat" cmpd="sng" algn="ctr">
+                      <a:solidFill>
+                        <a:srgbClr val="CCCCCC"/>
+                      </a:solidFill>
+                      <a:prstDash val="solid"/>
+                      <a:round/>
+                      <a:headEnd type="none" w="med" len="med"/>
+                      <a:tailEnd type="none" w="med" len="med"/>
+                    </a:lnB>
+                  </a:tcPr>
+                </a:tc>
+                <a:tc>
+                  <a:txBody>
+                    <a:bodyPr/>
+                    <a:lstStyle/>
+                    <a:p>
+                      <a:pPr rtl="0" fontAlgn="b"/>
+                      <a:r>
+                        <a:rPr lang="en-US" sz="1400" b="0" dirty="0">
+                          <a:solidFill>
+                            <a:srgbClr val="000000"/>
+                          </a:solidFill>
+                          <a:effectLst/>
+                          <a:latin typeface="Calibri" panose="020F0502020204030204" pitchFamily="34" charset="0"/>
+                        </a:rPr>
+                        <a:t>Yes</a:t>
+                      </a:r>
+                    </a:p>
+                  </a:txBody>
+                  <a:tcPr marL="27106" marR="27106" marT="18070" marB="18070" anchor="b">
+                    <a:lnL w="9525" cap="flat" cmpd="sng" algn="ctr">
+                      <a:solidFill>
+                        <a:srgbClr val="CCCCCC"/>
+                      </a:solidFill>
+                      <a:prstDash val="solid"/>
+                      <a:round/>
+                      <a:headEnd type="none" w="med" len="med"/>
+                      <a:tailEnd type="none" w="med" len="med"/>
+                    </a:lnL>
+                    <a:lnR w="9525" cap="flat" cmpd="sng" algn="ctr">
+                      <a:solidFill>
+                        <a:srgbClr val="CCCCCC"/>
+                      </a:solidFill>
+                      <a:prstDash val="solid"/>
+                      <a:round/>
+                      <a:headEnd type="none" w="med" len="med"/>
+                      <a:tailEnd type="none" w="med" len="med"/>
+                    </a:lnR>
+                    <a:lnT w="9525" cap="flat" cmpd="sng" algn="ctr">
+                      <a:solidFill>
+                        <a:srgbClr val="CCCCCC"/>
+                      </a:solidFill>
+                      <a:prstDash val="solid"/>
+                      <a:round/>
+                      <a:headEnd type="none" w="med" len="med"/>
+                      <a:tailEnd type="none" w="med" len="med"/>
+                    </a:lnT>
+                    <a:lnB w="9525" cap="flat" cmpd="sng" algn="ctr">
+                      <a:solidFill>
+                        <a:srgbClr val="CCCCCC"/>
+                      </a:solidFill>
+                      <a:prstDash val="solid"/>
+                      <a:round/>
+                      <a:headEnd type="none" w="med" len="med"/>
+                      <a:tailEnd type="none" w="med" len="med"/>
+                    </a:lnB>
+                  </a:tcPr>
+                </a:tc>
+                <a:tc>
+                  <a:txBody>
+                    <a:bodyPr/>
+                    <a:lstStyle/>
+                    <a:p>
+                      <a:pPr rtl="0" fontAlgn="b"/>
+                      <a:r>
+                        <a:rPr lang="en-US" sz="1400" b="0" dirty="0">
+                          <a:solidFill>
+                            <a:srgbClr val="000000"/>
+                          </a:solidFill>
+                          <a:effectLst/>
+                          <a:latin typeface="Calibri" panose="020F0502020204030204" pitchFamily="34" charset="0"/>
+                        </a:rPr>
+                        <a:t>freshwater snail</a:t>
+                      </a:r>
+                    </a:p>
+                  </a:txBody>
+                  <a:tcPr marL="27106" marR="27106" marT="18070" marB="18070" anchor="b">
+                    <a:lnL w="9525" cap="flat" cmpd="sng" algn="ctr">
+                      <a:solidFill>
+                        <a:srgbClr val="CCCCCC"/>
+                      </a:solidFill>
+                      <a:prstDash val="solid"/>
+                      <a:round/>
+                      <a:headEnd type="none" w="med" len="med"/>
+                      <a:tailEnd type="none" w="med" len="med"/>
+                    </a:lnL>
+                    <a:lnR w="9525" cap="flat" cmpd="sng" algn="ctr">
+                      <a:solidFill>
+                        <a:srgbClr val="CCCCCC"/>
+                      </a:solidFill>
+                      <a:prstDash val="solid"/>
+                      <a:round/>
+                      <a:headEnd type="none" w="med" len="med"/>
+                      <a:tailEnd type="none" w="med" len="med"/>
+                    </a:lnR>
+                    <a:lnT w="9525" cap="flat" cmpd="sng" algn="ctr">
+                      <a:solidFill>
+                        <a:srgbClr val="CCCCCC"/>
+                      </a:solidFill>
+                      <a:prstDash val="solid"/>
+                      <a:round/>
+                      <a:headEnd type="none" w="med" len="med"/>
+                      <a:tailEnd type="none" w="med" len="med"/>
+                    </a:lnT>
+                    <a:lnB w="9525" cap="flat" cmpd="sng" algn="ctr">
+                      <a:solidFill>
+                        <a:srgbClr val="CCCCCC"/>
+                      </a:solidFill>
+                      <a:prstDash val="solid"/>
+                      <a:round/>
+                      <a:headEnd type="none" w="med" len="med"/>
+                      <a:tailEnd type="none" w="med" len="med"/>
+                    </a:lnB>
+                  </a:tcPr>
+                </a:tc>
+                <a:tc>
+                  <a:txBody>
+                    <a:bodyPr/>
+                    <a:lstStyle/>
+                    <a:p>
+                      <a:pPr rtl="0" fontAlgn="b"/>
+                      <a:r>
+                        <a:rPr lang="en-US" sz="1400" b="0" dirty="0">
+                          <a:solidFill>
+                            <a:srgbClr val="000000"/>
+                          </a:solidFill>
+                          <a:effectLst/>
+                          <a:latin typeface="Calibri" panose="020F0502020204030204" pitchFamily="34" charset="0"/>
+                        </a:rPr>
+                        <a:t>Traits measured differently at constant and varying temperatures (proportion of time active vs. proportion of snails active); trait at varying temperatures not suitable for rate summation approach (proportion of snails)</a:t>
+                      </a:r>
+                    </a:p>
+                  </a:txBody>
+                  <a:tcPr marL="27106" marR="27106" marT="18070" marB="18070" anchor="b">
+                    <a:lnL w="9525" cap="flat" cmpd="sng" algn="ctr">
+                      <a:solidFill>
+                        <a:srgbClr val="CCCCCC"/>
+                      </a:solidFill>
+                      <a:prstDash val="solid"/>
+                      <a:round/>
+                      <a:headEnd type="none" w="med" len="med"/>
+                      <a:tailEnd type="none" w="med" len="med"/>
+                    </a:lnL>
+                    <a:lnR w="9525" cap="flat" cmpd="sng" algn="ctr">
+                      <a:solidFill>
+                        <a:srgbClr val="CCCCCC"/>
+                      </a:solidFill>
+                      <a:prstDash val="solid"/>
+                      <a:round/>
+                      <a:headEnd type="none" w="med" len="med"/>
+                      <a:tailEnd type="none" w="med" len="med"/>
+                    </a:lnR>
+                    <a:lnT w="9525" cap="flat" cmpd="sng" algn="ctr">
+                      <a:solidFill>
+                        <a:srgbClr val="CCCCCC"/>
+                      </a:solidFill>
+                      <a:prstDash val="solid"/>
+                      <a:round/>
+                      <a:headEnd type="none" w="med" len="med"/>
+                      <a:tailEnd type="none" w="med" len="med"/>
+                    </a:lnT>
+                    <a:lnB w="9525" cap="flat" cmpd="sng" algn="ctr">
+                      <a:solidFill>
+                        <a:srgbClr val="CCCCCC"/>
+                      </a:solidFill>
+                      <a:prstDash val="solid"/>
+                      <a:round/>
+                      <a:headEnd type="none" w="med" len="med"/>
+                      <a:tailEnd type="none" w="med" len="med"/>
+                    </a:lnB>
+                  </a:tcPr>
+                </a:tc>
+                <a:extLst>
+                  <a:ext uri="{0D108BD9-81ED-4DB2-BD59-A6C34878D82A}">
+                    <a16:rowId xmlns:a16="http://schemas.microsoft.com/office/drawing/2014/main" val="730372348"/>
                   </a:ext>
                 </a:extLst>
               </a:tr>
@@ -4628,7 +5871,7 @@
         <p:spPr/>
         <p:txBody>
           <a:bodyPr>
-            <a:normAutofit fontScale="90000"/>
+            <a:normAutofit/>
           </a:bodyPr>
           <a:lstStyle/>
           <a:p>
@@ -4671,7 +5914,7 @@
               <a:rPr lang="en-US" sz="2500" dirty="0">
                 <a:latin typeface="Avenir Roman" panose="02000503020000020003" pitchFamily="2" charset="0"/>
               </a:rPr>
-              <a:t> Peng et al. </a:t>
+              <a:t> data</a:t>
             </a:r>
           </a:p>
         </p:txBody>
@@ -4691,14 +5934,14 @@
           <p:nvPr>
             <p:extLst>
               <p:ext uri="{D42A27DB-BD31-4B8C-83A1-F6EECF244321}">
-                <p14:modId xmlns:p14="http://schemas.microsoft.com/office/powerpoint/2010/main" val="2208774542"/>
+                <p14:modId xmlns:p14="http://schemas.microsoft.com/office/powerpoint/2010/main" val="2098811658"/>
               </p:ext>
             </p:extLst>
           </p:nvPr>
         </p:nvGraphicFramePr>
         <p:xfrm>
           <a:off x="737755" y="1839478"/>
-          <a:ext cx="10716490" cy="3915375"/>
+          <a:ext cx="10716490" cy="4128735"/>
         </p:xfrm>
         <a:graphic>
           <a:graphicData uri="http://schemas.openxmlformats.org/drawingml/2006/table">
@@ -5276,7 +6519,7 @@
                           <a:effectLst/>
                           <a:latin typeface="Calibri" panose="020F0502020204030204" pitchFamily="34" charset="0"/>
                         </a:rPr>
-                        <a:t>I think we can use a small subset of the data (only 3 traits reflect processes averaged over time at the varying temperatures vs. instantaneous traits for fish acclimated at varying temperatures)</a:t>
+                        <a:t>I think we can use a subset of the data (only 3 traits reflect processes averaged over time at the varying temperatures vs. instantaneous traits for fish acclimated at varying temperatures)</a:t>
                       </a:r>
                     </a:p>
                     <a:p>
@@ -5356,299 +6599,7 @@
                     <a:p>
                       <a:pPr algn="r" rtl="0" fontAlgn="b"/>
                       <a:r>
-                        <a:rPr lang="en-US" sz="1400" b="0">
-                          <a:solidFill>
-                            <a:srgbClr val="000000"/>
-                          </a:solidFill>
-                          <a:effectLst/>
-                          <a:latin typeface="Calibri" panose="020F0502020204030204" pitchFamily="34" charset="0"/>
-                        </a:rPr>
-                        <a:t>61</a:t>
-                      </a:r>
-                    </a:p>
-                  </a:txBody>
-                  <a:tcPr marL="27106" marR="27106" marT="18070" marB="18070" anchor="b">
-                    <a:lnL w="9525" cap="flat" cmpd="sng" algn="ctr">
-                      <a:solidFill>
-                        <a:srgbClr val="CCCCCC"/>
-                      </a:solidFill>
-                      <a:prstDash val="solid"/>
-                      <a:round/>
-                      <a:headEnd type="none" w="med" len="med"/>
-                      <a:tailEnd type="none" w="med" len="med"/>
-                    </a:lnL>
-                    <a:lnR w="9525" cap="flat" cmpd="sng" algn="ctr">
-                      <a:solidFill>
-                        <a:srgbClr val="CCCCCC"/>
-                      </a:solidFill>
-                      <a:prstDash val="solid"/>
-                      <a:round/>
-                      <a:headEnd type="none" w="med" len="med"/>
-                      <a:tailEnd type="none" w="med" len="med"/>
-                    </a:lnR>
-                    <a:lnT w="9525" cap="flat" cmpd="sng" algn="ctr">
-                      <a:solidFill>
-                        <a:srgbClr val="CCCCCC"/>
-                      </a:solidFill>
-                      <a:prstDash val="solid"/>
-                      <a:round/>
-                      <a:headEnd type="none" w="med" len="med"/>
-                      <a:tailEnd type="none" w="med" len="med"/>
-                    </a:lnT>
-                    <a:lnB w="9525" cap="flat" cmpd="sng" algn="ctr">
-                      <a:solidFill>
-                        <a:srgbClr val="CCCCCC"/>
-                      </a:solidFill>
-                      <a:prstDash val="solid"/>
-                      <a:round/>
-                      <a:headEnd type="none" w="med" len="med"/>
-                      <a:tailEnd type="none" w="med" len="med"/>
-                    </a:lnB>
-                  </a:tcPr>
-                </a:tc>
-                <a:tc>
-                  <a:txBody>
-                    <a:bodyPr/>
-                    <a:lstStyle/>
-                    <a:p>
-                      <a:pPr rtl="0" fontAlgn="b"/>
-                      <a:r>
-                        <a:rPr lang="en-US" sz="1400" b="0">
-                          <a:solidFill>
-                            <a:srgbClr val="000000"/>
-                          </a:solidFill>
-                          <a:effectLst/>
-                          <a:latin typeface="Calibri" panose="020F0502020204030204" pitchFamily="34" charset="0"/>
-                        </a:rPr>
-                        <a:t>Zhao et al. 2014</a:t>
-                      </a:r>
-                    </a:p>
-                  </a:txBody>
-                  <a:tcPr marL="27106" marR="27106" marT="18070" marB="18070" anchor="b">
-                    <a:lnL w="9525" cap="flat" cmpd="sng" algn="ctr">
-                      <a:solidFill>
-                        <a:srgbClr val="CCCCCC"/>
-                      </a:solidFill>
-                      <a:prstDash val="solid"/>
-                      <a:round/>
-                      <a:headEnd type="none" w="med" len="med"/>
-                      <a:tailEnd type="none" w="med" len="med"/>
-                    </a:lnL>
-                    <a:lnR w="9525" cap="flat" cmpd="sng" algn="ctr">
-                      <a:solidFill>
-                        <a:srgbClr val="CCCCCC"/>
-                      </a:solidFill>
-                      <a:prstDash val="solid"/>
-                      <a:round/>
-                      <a:headEnd type="none" w="med" len="med"/>
-                      <a:tailEnd type="none" w="med" len="med"/>
-                    </a:lnR>
-                    <a:lnT w="9525" cap="flat" cmpd="sng" algn="ctr">
-                      <a:solidFill>
-                        <a:srgbClr val="CCCCCC"/>
-                      </a:solidFill>
-                      <a:prstDash val="solid"/>
-                      <a:round/>
-                      <a:headEnd type="none" w="med" len="med"/>
-                      <a:tailEnd type="none" w="med" len="med"/>
-                    </a:lnT>
-                    <a:lnB w="9525" cap="flat" cmpd="sng" algn="ctr">
-                      <a:solidFill>
-                        <a:srgbClr val="CCCCCC"/>
-                      </a:solidFill>
-                      <a:prstDash val="solid"/>
-                      <a:round/>
-                      <a:headEnd type="none" w="med" len="med"/>
-                      <a:tailEnd type="none" w="med" len="med"/>
-                    </a:lnB>
-                  </a:tcPr>
-                </a:tc>
-                <a:tc>
-                  <a:txBody>
-                    <a:bodyPr/>
-                    <a:lstStyle/>
-                    <a:p>
-                      <a:pPr rtl="0" fontAlgn="b"/>
-                      <a:r>
-                        <a:rPr lang="en-US" sz="1400" b="0">
-                          <a:solidFill>
-                            <a:srgbClr val="000000"/>
-                          </a:solidFill>
-                          <a:effectLst/>
-                          <a:latin typeface="Calibri" panose="020F0502020204030204" pitchFamily="34" charset="0"/>
-                        </a:rPr>
-                        <a:t>Yes</a:t>
-                      </a:r>
-                    </a:p>
-                  </a:txBody>
-                  <a:tcPr marL="27106" marR="27106" marT="18070" marB="18070" anchor="b">
-                    <a:lnL w="9525" cap="flat" cmpd="sng" algn="ctr">
-                      <a:solidFill>
-                        <a:srgbClr val="CCCCCC"/>
-                      </a:solidFill>
-                      <a:prstDash val="solid"/>
-                      <a:round/>
-                      <a:headEnd type="none" w="med" len="med"/>
-                      <a:tailEnd type="none" w="med" len="med"/>
-                    </a:lnL>
-                    <a:lnR w="9525" cap="flat" cmpd="sng" algn="ctr">
-                      <a:solidFill>
-                        <a:srgbClr val="CCCCCC"/>
-                      </a:solidFill>
-                      <a:prstDash val="solid"/>
-                      <a:round/>
-                      <a:headEnd type="none" w="med" len="med"/>
-                      <a:tailEnd type="none" w="med" len="med"/>
-                    </a:lnR>
-                    <a:lnT w="9525" cap="flat" cmpd="sng" algn="ctr">
-                      <a:solidFill>
-                        <a:srgbClr val="CCCCCC"/>
-                      </a:solidFill>
-                      <a:prstDash val="solid"/>
-                      <a:round/>
-                      <a:headEnd type="none" w="med" len="med"/>
-                      <a:tailEnd type="none" w="med" len="med"/>
-                    </a:lnT>
-                    <a:lnB w="9525" cap="flat" cmpd="sng" algn="ctr">
-                      <a:solidFill>
-                        <a:srgbClr val="CCCCCC"/>
-                      </a:solidFill>
-                      <a:prstDash val="solid"/>
-                      <a:round/>
-                      <a:headEnd type="none" w="med" len="med"/>
-                      <a:tailEnd type="none" w="med" len="med"/>
-                    </a:lnB>
-                  </a:tcPr>
-                </a:tc>
-                <a:tc>
-                  <a:txBody>
-                    <a:bodyPr/>
-                    <a:lstStyle/>
-                    <a:p>
-                      <a:pPr rtl="0" fontAlgn="b"/>
-                      <a:r>
                         <a:rPr lang="en-US" sz="1400" b="0" dirty="0">
-                          <a:solidFill>
-                            <a:srgbClr val="000000"/>
-                          </a:solidFill>
-                          <a:effectLst/>
-                          <a:latin typeface="Calibri" panose="020F0502020204030204" pitchFamily="34" charset="0"/>
-                        </a:rPr>
-                        <a:t>aphid</a:t>
-                      </a:r>
-                    </a:p>
-                  </a:txBody>
-                  <a:tcPr marL="27106" marR="27106" marT="18070" marB="18070" anchor="b">
-                    <a:lnL w="9525" cap="flat" cmpd="sng" algn="ctr">
-                      <a:solidFill>
-                        <a:srgbClr val="CCCCCC"/>
-                      </a:solidFill>
-                      <a:prstDash val="solid"/>
-                      <a:round/>
-                      <a:headEnd type="none" w="med" len="med"/>
-                      <a:tailEnd type="none" w="med" len="med"/>
-                    </a:lnL>
-                    <a:lnR w="9525" cap="flat" cmpd="sng" algn="ctr">
-                      <a:solidFill>
-                        <a:srgbClr val="CCCCCC"/>
-                      </a:solidFill>
-                      <a:prstDash val="solid"/>
-                      <a:round/>
-                      <a:headEnd type="none" w="med" len="med"/>
-                      <a:tailEnd type="none" w="med" len="med"/>
-                    </a:lnR>
-                    <a:lnT w="9525" cap="flat" cmpd="sng" algn="ctr">
-                      <a:solidFill>
-                        <a:srgbClr val="CCCCCC"/>
-                      </a:solidFill>
-                      <a:prstDash val="solid"/>
-                      <a:round/>
-                      <a:headEnd type="none" w="med" len="med"/>
-                      <a:tailEnd type="none" w="med" len="med"/>
-                    </a:lnT>
-                    <a:lnB w="9525" cap="flat" cmpd="sng" algn="ctr">
-                      <a:solidFill>
-                        <a:srgbClr val="CCCCCC"/>
-                      </a:solidFill>
-                      <a:prstDash val="solid"/>
-                      <a:round/>
-                      <a:headEnd type="none" w="med" len="med"/>
-                      <a:tailEnd type="none" w="med" len="med"/>
-                    </a:lnB>
-                  </a:tcPr>
-                </a:tc>
-                <a:tc>
-                  <a:txBody>
-                    <a:bodyPr/>
-                    <a:lstStyle/>
-                    <a:p>
-                      <a:pPr rtl="0" fontAlgn="b"/>
-                      <a:r>
-                        <a:rPr lang="en-US" sz="1400" b="0" dirty="0">
-                          <a:solidFill>
-                            <a:srgbClr val="000000"/>
-                          </a:solidFill>
-                          <a:effectLst/>
-                          <a:latin typeface="Calibri" panose="020F0502020204030204" pitchFamily="34" charset="0"/>
-                        </a:rPr>
-                        <a:t>I think we can use this one – we just need to digitize the temperature sequence and the original constant temperature traits (from other publications) instead of the predicted model (work in progress for me)</a:t>
-                      </a:r>
-                    </a:p>
-                  </a:txBody>
-                  <a:tcPr marL="27106" marR="27106" marT="18070" marB="18070" anchor="b">
-                    <a:lnL w="9525" cap="flat" cmpd="sng" algn="ctr">
-                      <a:solidFill>
-                        <a:srgbClr val="CCCCCC"/>
-                      </a:solidFill>
-                      <a:prstDash val="solid"/>
-                      <a:round/>
-                      <a:headEnd type="none" w="med" len="med"/>
-                      <a:tailEnd type="none" w="med" len="med"/>
-                    </a:lnL>
-                    <a:lnR w="9525" cap="flat" cmpd="sng" algn="ctr">
-                      <a:solidFill>
-                        <a:srgbClr val="CCCCCC"/>
-                      </a:solidFill>
-                      <a:prstDash val="solid"/>
-                      <a:round/>
-                      <a:headEnd type="none" w="med" len="med"/>
-                      <a:tailEnd type="none" w="med" len="med"/>
-                    </a:lnR>
-                    <a:lnT w="9525" cap="flat" cmpd="sng" algn="ctr">
-                      <a:solidFill>
-                        <a:srgbClr val="CCCCCC"/>
-                      </a:solidFill>
-                      <a:prstDash val="solid"/>
-                      <a:round/>
-                      <a:headEnd type="none" w="med" len="med"/>
-                      <a:tailEnd type="none" w="med" len="med"/>
-                    </a:lnT>
-                    <a:lnB w="9525" cap="flat" cmpd="sng" algn="ctr">
-                      <a:solidFill>
-                        <a:srgbClr val="CCCCCC"/>
-                      </a:solidFill>
-                      <a:prstDash val="solid"/>
-                      <a:round/>
-                      <a:headEnd type="none" w="med" len="med"/>
-                      <a:tailEnd type="none" w="med" len="med"/>
-                    </a:lnB>
-                  </a:tcPr>
-                </a:tc>
-                <a:extLst>
-                  <a:ext uri="{0D108BD9-81ED-4DB2-BD59-A6C34878D82A}">
-                    <a16:rowId xmlns:a16="http://schemas.microsoft.com/office/drawing/2014/main" val="3045927452"/>
-                  </a:ext>
-                </a:extLst>
-              </a:tr>
-              <a:tr h="261712">
-                <a:tc>
-                  <a:txBody>
-                    <a:bodyPr/>
-                    <a:lstStyle/>
-                    <a:p>
-                      <a:pPr algn="r" rtl="0" fontAlgn="b"/>
-                      <a:r>
-                        <a:rPr lang="en-US" sz="1400" b="0">
                           <a:solidFill>
                             <a:srgbClr val="000000"/>
                           </a:solidFill>
@@ -5705,7 +6656,7 @@
                     <a:p>
                       <a:pPr rtl="0" fontAlgn="b"/>
                       <a:r>
-                        <a:rPr lang="en-US" sz="1400" b="0">
+                        <a:rPr lang="en-US" sz="1400" b="0" dirty="0">
                           <a:solidFill>
                             <a:srgbClr val="000000"/>
                           </a:solidFill>
@@ -5971,6 +6922,331 @@
                   </a:ext>
                 </a:extLst>
               </a:tr>
+              <a:tr h="261712">
+                <a:tc>
+                  <a:txBody>
+                    <a:bodyPr/>
+                    <a:lstStyle/>
+                    <a:p>
+                      <a:pPr algn="r" rtl="0" fontAlgn="b"/>
+                      <a:r>
+                        <a:rPr lang="en-US" sz="1400" b="0" dirty="0">
+                          <a:solidFill>
+                            <a:srgbClr val="000000"/>
+                          </a:solidFill>
+                          <a:effectLst/>
+                          <a:latin typeface="Calibri" panose="020F0502020204030204" pitchFamily="34" charset="0"/>
+                        </a:rPr>
+                        <a:t>165</a:t>
+                      </a:r>
+                    </a:p>
+                  </a:txBody>
+                  <a:tcPr marL="27106" marR="27106" marT="18070" marB="18070" anchor="b">
+                    <a:lnL w="9525" cap="flat" cmpd="sng" algn="ctr">
+                      <a:solidFill>
+                        <a:srgbClr val="CCCCCC"/>
+                      </a:solidFill>
+                      <a:prstDash val="solid"/>
+                      <a:round/>
+                      <a:headEnd type="none" w="med" len="med"/>
+                      <a:tailEnd type="none" w="med" len="med"/>
+                    </a:lnL>
+                    <a:lnR w="9525" cap="flat" cmpd="sng" algn="ctr">
+                      <a:solidFill>
+                        <a:srgbClr val="CCCCCC"/>
+                      </a:solidFill>
+                      <a:prstDash val="solid"/>
+                      <a:round/>
+                      <a:headEnd type="none" w="med" len="med"/>
+                      <a:tailEnd type="none" w="med" len="med"/>
+                    </a:lnR>
+                    <a:lnT w="9525" cap="flat" cmpd="sng" algn="ctr">
+                      <a:solidFill>
+                        <a:srgbClr val="CCCCCC"/>
+                      </a:solidFill>
+                      <a:prstDash val="solid"/>
+                      <a:round/>
+                      <a:headEnd type="none" w="med" len="med"/>
+                      <a:tailEnd type="none" w="med" len="med"/>
+                    </a:lnT>
+                    <a:lnB w="9525" cap="flat" cmpd="sng" algn="ctr">
+                      <a:solidFill>
+                        <a:srgbClr val="CCCCCC"/>
+                      </a:solidFill>
+                      <a:prstDash val="solid"/>
+                      <a:round/>
+                      <a:headEnd type="none" w="med" len="med"/>
+                      <a:tailEnd type="none" w="med" len="med"/>
+                    </a:lnB>
+                  </a:tcPr>
+                </a:tc>
+                <a:tc>
+                  <a:txBody>
+                    <a:bodyPr/>
+                    <a:lstStyle/>
+                    <a:p>
+                      <a:pPr rtl="0" fontAlgn="b"/>
+                      <a:r>
+                        <a:rPr lang="en-US" sz="1400" b="0" dirty="0" err="1">
+                          <a:solidFill>
+                            <a:srgbClr val="000000"/>
+                          </a:solidFill>
+                          <a:effectLst/>
+                          <a:latin typeface="Calibri" panose="020F0502020204030204" pitchFamily="34" charset="0"/>
+                        </a:rPr>
+                        <a:t>Hilbeck</a:t>
+                      </a:r>
+                      <a:r>
+                        <a:rPr lang="en-US" sz="1400" b="0" dirty="0">
+                          <a:solidFill>
+                            <a:srgbClr val="000000"/>
+                          </a:solidFill>
+                          <a:effectLst/>
+                          <a:latin typeface="Calibri" panose="020F0502020204030204" pitchFamily="34" charset="0"/>
+                        </a:rPr>
+                        <a:t> &amp; Kennedy 1998</a:t>
+                      </a:r>
+                    </a:p>
+                  </a:txBody>
+                  <a:tcPr marL="27106" marR="27106" marT="18070" marB="18070" anchor="b">
+                    <a:lnL w="9525" cap="flat" cmpd="sng" algn="ctr">
+                      <a:solidFill>
+                        <a:srgbClr val="CCCCCC"/>
+                      </a:solidFill>
+                      <a:prstDash val="solid"/>
+                      <a:round/>
+                      <a:headEnd type="none" w="med" len="med"/>
+                      <a:tailEnd type="none" w="med" len="med"/>
+                    </a:lnL>
+                    <a:lnR w="9525" cap="flat" cmpd="sng" algn="ctr">
+                      <a:solidFill>
+                        <a:srgbClr val="CCCCCC"/>
+                      </a:solidFill>
+                      <a:prstDash val="solid"/>
+                      <a:round/>
+                      <a:headEnd type="none" w="med" len="med"/>
+                      <a:tailEnd type="none" w="med" len="med"/>
+                    </a:lnR>
+                    <a:lnT w="9525" cap="flat" cmpd="sng" algn="ctr">
+                      <a:solidFill>
+                        <a:srgbClr val="CCCCCC"/>
+                      </a:solidFill>
+                      <a:prstDash val="solid"/>
+                      <a:round/>
+                      <a:headEnd type="none" w="med" len="med"/>
+                      <a:tailEnd type="none" w="med" len="med"/>
+                    </a:lnT>
+                    <a:lnB w="9525" cap="flat" cmpd="sng" algn="ctr">
+                      <a:solidFill>
+                        <a:srgbClr val="CCCCCC"/>
+                      </a:solidFill>
+                      <a:prstDash val="solid"/>
+                      <a:round/>
+                      <a:headEnd type="none" w="med" len="med"/>
+                      <a:tailEnd type="none" w="med" len="med"/>
+                    </a:lnB>
+                  </a:tcPr>
+                </a:tc>
+                <a:tc>
+                  <a:txBody>
+                    <a:bodyPr/>
+                    <a:lstStyle/>
+                    <a:p>
+                      <a:pPr rtl="0" fontAlgn="b"/>
+                      <a:r>
+                        <a:rPr lang="en-US" sz="1400" b="0" dirty="0">
+                          <a:solidFill>
+                            <a:srgbClr val="000000"/>
+                          </a:solidFill>
+                          <a:effectLst/>
+                          <a:latin typeface="Calibri" panose="020F0502020204030204" pitchFamily="34" charset="0"/>
+                        </a:rPr>
+                        <a:t>Yes</a:t>
+                      </a:r>
+                    </a:p>
+                  </a:txBody>
+                  <a:tcPr marL="27106" marR="27106" marT="18070" marB="18070" anchor="b">
+                    <a:lnL w="9525" cap="flat" cmpd="sng" algn="ctr">
+                      <a:solidFill>
+                        <a:srgbClr val="CCCCCC"/>
+                      </a:solidFill>
+                      <a:prstDash val="solid"/>
+                      <a:round/>
+                      <a:headEnd type="none" w="med" len="med"/>
+                      <a:tailEnd type="none" w="med" len="med"/>
+                    </a:lnL>
+                    <a:lnR w="9525" cap="flat" cmpd="sng" algn="ctr">
+                      <a:solidFill>
+                        <a:srgbClr val="CCCCCC"/>
+                      </a:solidFill>
+                      <a:prstDash val="solid"/>
+                      <a:round/>
+                      <a:headEnd type="none" w="med" len="med"/>
+                      <a:tailEnd type="none" w="med" len="med"/>
+                    </a:lnR>
+                    <a:lnT w="9525" cap="flat" cmpd="sng" algn="ctr">
+                      <a:solidFill>
+                        <a:srgbClr val="CCCCCC"/>
+                      </a:solidFill>
+                      <a:prstDash val="solid"/>
+                      <a:round/>
+                      <a:headEnd type="none" w="med" len="med"/>
+                      <a:tailEnd type="none" w="med" len="med"/>
+                    </a:lnT>
+                    <a:lnB w="9525" cap="flat" cmpd="sng" algn="ctr">
+                      <a:solidFill>
+                        <a:srgbClr val="CCCCCC"/>
+                      </a:solidFill>
+                      <a:prstDash val="solid"/>
+                      <a:round/>
+                      <a:headEnd type="none" w="med" len="med"/>
+                      <a:tailEnd type="none" w="med" len="med"/>
+                    </a:lnB>
+                  </a:tcPr>
+                </a:tc>
+                <a:tc>
+                  <a:txBody>
+                    <a:bodyPr/>
+                    <a:lstStyle/>
+                    <a:p>
+                      <a:pPr rtl="0" fontAlgn="b"/>
+                      <a:r>
+                        <a:rPr lang="en-US" sz="1400" b="0" dirty="0">
+                          <a:solidFill>
+                            <a:srgbClr val="000000"/>
+                          </a:solidFill>
+                          <a:effectLst/>
+                          <a:latin typeface="Calibri" panose="020F0502020204030204" pitchFamily="34" charset="0"/>
+                        </a:rPr>
+                        <a:t>beetle</a:t>
+                      </a:r>
+                    </a:p>
+                  </a:txBody>
+                  <a:tcPr marL="27106" marR="27106" marT="18070" marB="18070" anchor="b">
+                    <a:lnL w="9525" cap="flat" cmpd="sng" algn="ctr">
+                      <a:solidFill>
+                        <a:srgbClr val="CCCCCC"/>
+                      </a:solidFill>
+                      <a:prstDash val="solid"/>
+                      <a:round/>
+                      <a:headEnd type="none" w="med" len="med"/>
+                      <a:tailEnd type="none" w="med" len="med"/>
+                    </a:lnL>
+                    <a:lnR w="9525" cap="flat" cmpd="sng" algn="ctr">
+                      <a:solidFill>
+                        <a:srgbClr val="CCCCCC"/>
+                      </a:solidFill>
+                      <a:prstDash val="solid"/>
+                      <a:round/>
+                      <a:headEnd type="none" w="med" len="med"/>
+                      <a:tailEnd type="none" w="med" len="med"/>
+                    </a:lnR>
+                    <a:lnT w="9525" cap="flat" cmpd="sng" algn="ctr">
+                      <a:solidFill>
+                        <a:srgbClr val="CCCCCC"/>
+                      </a:solidFill>
+                      <a:prstDash val="solid"/>
+                      <a:round/>
+                      <a:headEnd type="none" w="med" len="med"/>
+                      <a:tailEnd type="none" w="med" len="med"/>
+                    </a:lnT>
+                    <a:lnB w="9525" cap="flat" cmpd="sng" algn="ctr">
+                      <a:solidFill>
+                        <a:srgbClr val="CCCCCC"/>
+                      </a:solidFill>
+                      <a:prstDash val="solid"/>
+                      <a:round/>
+                      <a:headEnd type="none" w="med" len="med"/>
+                      <a:tailEnd type="none" w="med" len="med"/>
+                    </a:lnB>
+                  </a:tcPr>
+                </a:tc>
+                <a:tc>
+                  <a:txBody>
+                    <a:bodyPr/>
+                    <a:lstStyle/>
+                    <a:p>
+                      <a:pPr rtl="0" fontAlgn="b"/>
+                      <a:r>
+                        <a:rPr lang="en-US" sz="1400" b="0" dirty="0">
+                          <a:solidFill>
+                            <a:srgbClr val="000000"/>
+                          </a:solidFill>
+                          <a:effectLst/>
+                          <a:latin typeface="Calibri" panose="020F0502020204030204" pitchFamily="34" charset="0"/>
+                        </a:rPr>
+                        <a:t>It’s not ideal that they didn’t measure constant temp at the same mean temp as the variable treatment, but we can still test rate summation for dev. rate – we don’t even need to fit reaction norms, we can just use the values for 30 and 22. </a:t>
+                      </a:r>
+                    </a:p>
+                    <a:p>
+                      <a:pPr rtl="0" fontAlgn="b"/>
+                      <a:r>
+                        <a:rPr lang="en-US" sz="1400" b="1" dirty="0">
+                          <a:solidFill>
+                            <a:srgbClr val="000000"/>
+                          </a:solidFill>
+                          <a:effectLst/>
+                          <a:latin typeface="Calibri" panose="020F0502020204030204" pitchFamily="34" charset="0"/>
+                        </a:rPr>
+                        <a:t>Temp profile</a:t>
+                      </a:r>
+                      <a:r>
+                        <a:rPr lang="en-US" sz="1400" b="0" dirty="0">
+                          <a:solidFill>
+                            <a:srgbClr val="000000"/>
+                          </a:solidFill>
+                          <a:effectLst/>
+                          <a:latin typeface="Calibri" panose="020F0502020204030204" pitchFamily="34" charset="0"/>
+                        </a:rPr>
+                        <a:t>: 8 hours at 30, 16 hours at 22 </a:t>
+                      </a:r>
+                    </a:p>
+                  </a:txBody>
+                  <a:tcPr marL="27106" marR="27106" marT="18070" marB="18070" anchor="b">
+                    <a:lnL w="9525" cap="flat" cmpd="sng" algn="ctr">
+                      <a:solidFill>
+                        <a:srgbClr val="CCCCCC"/>
+                      </a:solidFill>
+                      <a:prstDash val="solid"/>
+                      <a:round/>
+                      <a:headEnd type="none" w="med" len="med"/>
+                      <a:tailEnd type="none" w="med" len="med"/>
+                    </a:lnL>
+                    <a:lnR w="9525" cap="flat" cmpd="sng" algn="ctr">
+                      <a:solidFill>
+                        <a:srgbClr val="CCCCCC"/>
+                      </a:solidFill>
+                      <a:prstDash val="solid"/>
+                      <a:round/>
+                      <a:headEnd type="none" w="med" len="med"/>
+                      <a:tailEnd type="none" w="med" len="med"/>
+                    </a:lnR>
+                    <a:lnT w="9525" cap="flat" cmpd="sng" algn="ctr">
+                      <a:solidFill>
+                        <a:srgbClr val="CCCCCC"/>
+                      </a:solidFill>
+                      <a:prstDash val="solid"/>
+                      <a:round/>
+                      <a:headEnd type="none" w="med" len="med"/>
+                      <a:tailEnd type="none" w="med" len="med"/>
+                    </a:lnT>
+                    <a:lnB w="9525" cap="flat" cmpd="sng" algn="ctr">
+                      <a:solidFill>
+                        <a:srgbClr val="CCCCCC"/>
+                      </a:solidFill>
+                      <a:prstDash val="solid"/>
+                      <a:round/>
+                      <a:headEnd type="none" w="med" len="med"/>
+                      <a:tailEnd type="none" w="med" len="med"/>
+                    </a:lnB>
+                  </a:tcPr>
+                </a:tc>
+                <a:extLst>
+                  <a:ext uri="{0D108BD9-81ED-4DB2-BD59-A6C34878D82A}">
+                    <a16:rowId xmlns:a16="http://schemas.microsoft.com/office/drawing/2014/main" val="3227560998"/>
+                  </a:ext>
+                </a:extLst>
+              </a:tr>
             </a:tbl>
           </a:graphicData>
         </a:graphic>
@@ -6030,7 +7306,7 @@
               <a:rPr lang="en-US" dirty="0">
                 <a:latin typeface="Avenir Roman" panose="02000503020000020003" pitchFamily="2" charset="0"/>
               </a:rPr>
-              <a:t>Studies Marta is still looking through</a:t>
+              <a:t>Studies Marta is still working on</a:t>
             </a:r>
             <a:endParaRPr lang="en-US" sz="2500" dirty="0">
               <a:latin typeface="Avenir Roman" panose="02000503020000020003" pitchFamily="2" charset="0"/>
@@ -6053,14 +7329,14 @@
           <p:nvPr>
             <p:extLst>
               <p:ext uri="{D42A27DB-BD31-4B8C-83A1-F6EECF244321}">
-                <p14:modId xmlns:p14="http://schemas.microsoft.com/office/powerpoint/2010/main" val="3313725531"/>
+                <p14:modId xmlns:p14="http://schemas.microsoft.com/office/powerpoint/2010/main" val="1408593943"/>
               </p:ext>
             </p:extLst>
           </p:nvPr>
         </p:nvGraphicFramePr>
         <p:xfrm>
           <a:off x="838200" y="1825625"/>
-          <a:ext cx="10716490" cy="2700251"/>
+          <a:ext cx="10716490" cy="2067911"/>
         </p:xfrm>
         <a:graphic>
           <a:graphicData uri="http://schemas.openxmlformats.org/drawingml/2006/table">
@@ -6410,131 +7686,7 @@
                           <a:effectLst/>
                           <a:latin typeface="Calibri" panose="020F0502020204030204" pitchFamily="34" charset="0"/>
                         </a:rPr>
-                        <a:t>86</a:t>
-                      </a:r>
-                    </a:p>
-                  </a:txBody>
-                  <a:tcPr marL="27106" marR="27106" marT="18070" marB="18070" anchor="b">
-                    <a:lnL w="9525" cap="flat" cmpd="sng" algn="ctr">
-                      <a:solidFill>
-                        <a:srgbClr val="CCCCCC"/>
-                      </a:solidFill>
-                      <a:prstDash val="solid"/>
-                      <a:round/>
-                      <a:headEnd type="none" w="med" len="med"/>
-                      <a:tailEnd type="none" w="med" len="med"/>
-                    </a:lnL>
-                    <a:lnR w="9525" cap="flat" cmpd="sng" algn="ctr">
-                      <a:solidFill>
-                        <a:srgbClr val="CCCCCC"/>
-                      </a:solidFill>
-                      <a:prstDash val="solid"/>
-                      <a:round/>
-                      <a:headEnd type="none" w="med" len="med"/>
-                      <a:tailEnd type="none" w="med" len="med"/>
-                    </a:lnR>
-                    <a:lnT w="9525" cap="flat" cmpd="sng" algn="ctr">
-                      <a:solidFill>
-                        <a:srgbClr val="CCCCCC"/>
-                      </a:solidFill>
-                      <a:prstDash val="solid"/>
-                      <a:round/>
-                      <a:headEnd type="none" w="med" len="med"/>
-                      <a:tailEnd type="none" w="med" len="med"/>
-                    </a:lnT>
-                    <a:lnB w="9525" cap="flat" cmpd="sng" algn="ctr">
-                      <a:solidFill>
-                        <a:srgbClr val="CCCCCC"/>
-                      </a:solidFill>
-                      <a:prstDash val="solid"/>
-                      <a:round/>
-                      <a:headEnd type="none" w="med" len="med"/>
-                      <a:tailEnd type="none" w="med" len="med"/>
-                    </a:lnB>
-                  </a:tcPr>
-                </a:tc>
-                <a:tc>
-                  <a:txBody>
-                    <a:bodyPr/>
-                    <a:lstStyle/>
-                    <a:p>
-                      <a:pPr rtl="0" fontAlgn="b"/>
-                      <a:r>
-                        <a:rPr lang="en-US" sz="1400" b="0" dirty="0" err="1">
-                          <a:solidFill>
-                            <a:srgbClr val="000000"/>
-                          </a:solidFill>
-                          <a:effectLst/>
-                          <a:latin typeface="Calibri" panose="020F0502020204030204" pitchFamily="34" charset="0"/>
-                        </a:rPr>
-                        <a:t>Klepsatel</a:t>
-                      </a:r>
-                      <a:r>
-                        <a:rPr lang="en-US" sz="1400" b="0" dirty="0">
-                          <a:solidFill>
-                            <a:srgbClr val="000000"/>
-                          </a:solidFill>
-                          <a:effectLst/>
-                          <a:latin typeface="Calibri" panose="020F0502020204030204" pitchFamily="34" charset="0"/>
-                        </a:rPr>
-                        <a:t> et al. 2013</a:t>
-                      </a:r>
-                    </a:p>
-                  </a:txBody>
-                  <a:tcPr marL="27106" marR="27106" marT="18070" marB="18070" anchor="b">
-                    <a:lnL w="9525" cap="flat" cmpd="sng" algn="ctr">
-                      <a:solidFill>
-                        <a:srgbClr val="CCCCCC"/>
-                      </a:solidFill>
-                      <a:prstDash val="solid"/>
-                      <a:round/>
-                      <a:headEnd type="none" w="med" len="med"/>
-                      <a:tailEnd type="none" w="med" len="med"/>
-                    </a:lnL>
-                    <a:lnR w="9525" cap="flat" cmpd="sng" algn="ctr">
-                      <a:solidFill>
-                        <a:srgbClr val="CCCCCC"/>
-                      </a:solidFill>
-                      <a:prstDash val="solid"/>
-                      <a:round/>
-                      <a:headEnd type="none" w="med" len="med"/>
-                      <a:tailEnd type="none" w="med" len="med"/>
-                    </a:lnR>
-                    <a:lnT w="9525" cap="flat" cmpd="sng" algn="ctr">
-                      <a:solidFill>
-                        <a:srgbClr val="CCCCCC"/>
-                      </a:solidFill>
-                      <a:prstDash val="solid"/>
-                      <a:round/>
-                      <a:headEnd type="none" w="med" len="med"/>
-                      <a:tailEnd type="none" w="med" len="med"/>
-                    </a:lnT>
-                    <a:lnB w="9525" cap="flat" cmpd="sng" algn="ctr">
-                      <a:solidFill>
-                        <a:srgbClr val="CCCCCC"/>
-                      </a:solidFill>
-                      <a:prstDash val="solid"/>
-                      <a:round/>
-                      <a:headEnd type="none" w="med" len="med"/>
-                      <a:tailEnd type="none" w="med" len="med"/>
-                    </a:lnB>
-                  </a:tcPr>
-                </a:tc>
-                <a:tc>
-                  <a:txBody>
-                    <a:bodyPr/>
-                    <a:lstStyle/>
-                    <a:p>
-                      <a:pPr rtl="0" fontAlgn="b"/>
-                      <a:r>
-                        <a:rPr lang="en-US" sz="1400" b="0" dirty="0">
-                          <a:solidFill>
-                            <a:srgbClr val="000000"/>
-                          </a:solidFill>
-                          <a:effectLst/>
-                          <a:latin typeface="Calibri" panose="020F0502020204030204" pitchFamily="34" charset="0"/>
-                        </a:rPr>
-                        <a:t>No</a:t>
+                        <a:t>61</a:t>
                       </a:r>
                     </a:p>
                   </a:txBody>
@@ -6591,185 +7743,7 @@
                           <a:effectLst/>
                           <a:latin typeface="Calibri" panose="020F0502020204030204" pitchFamily="34" charset="0"/>
                         </a:rPr>
-                        <a:t>Drosophila melanogaster</a:t>
-                      </a:r>
-                    </a:p>
-                  </a:txBody>
-                  <a:tcPr marL="27106" marR="27106" marT="18070" marB="18070" anchor="b">
-                    <a:lnL w="9525" cap="flat" cmpd="sng" algn="ctr">
-                      <a:solidFill>
-                        <a:srgbClr val="CCCCCC"/>
-                      </a:solidFill>
-                      <a:prstDash val="solid"/>
-                      <a:round/>
-                      <a:headEnd type="none" w="med" len="med"/>
-                      <a:tailEnd type="none" w="med" len="med"/>
-                    </a:lnL>
-                    <a:lnR w="9525" cap="flat" cmpd="sng" algn="ctr">
-                      <a:solidFill>
-                        <a:srgbClr val="CCCCCC"/>
-                      </a:solidFill>
-                      <a:prstDash val="solid"/>
-                      <a:round/>
-                      <a:headEnd type="none" w="med" len="med"/>
-                      <a:tailEnd type="none" w="med" len="med"/>
-                    </a:lnR>
-                    <a:lnT w="9525" cap="flat" cmpd="sng" algn="ctr">
-                      <a:solidFill>
-                        <a:srgbClr val="CCCCCC"/>
-                      </a:solidFill>
-                      <a:prstDash val="solid"/>
-                      <a:round/>
-                      <a:headEnd type="none" w="med" len="med"/>
-                      <a:tailEnd type="none" w="med" len="med"/>
-                    </a:lnT>
-                    <a:lnB w="9525" cap="flat" cmpd="sng" algn="ctr">
-                      <a:solidFill>
-                        <a:srgbClr val="CCCCCC"/>
-                      </a:solidFill>
-                      <a:prstDash val="solid"/>
-                      <a:round/>
-                      <a:headEnd type="none" w="med" len="med"/>
-                      <a:tailEnd type="none" w="med" len="med"/>
-                    </a:lnB>
-                  </a:tcPr>
-                </a:tc>
-                <a:tc>
-                  <a:txBody>
-                    <a:bodyPr/>
-                    <a:lstStyle/>
-                    <a:p>
-                      <a:pPr rtl="0" fontAlgn="b"/>
-                      <a:r>
-                        <a:rPr lang="en-US" sz="1400" b="0" dirty="0">
-                          <a:solidFill>
-                            <a:srgbClr val="000000"/>
-                          </a:solidFill>
-                          <a:effectLst/>
-                          <a:latin typeface="Calibri" panose="020F0502020204030204" pitchFamily="34" charset="0"/>
-                        </a:rPr>
-                        <a:t>?</a:t>
-                      </a:r>
-                    </a:p>
-                  </a:txBody>
-                  <a:tcPr marL="27106" marR="27106" marT="18070" marB="18070" anchor="b">
-                    <a:lnL w="9525" cap="flat" cmpd="sng" algn="ctr">
-                      <a:solidFill>
-                        <a:srgbClr val="CCCCCC"/>
-                      </a:solidFill>
-                      <a:prstDash val="solid"/>
-                      <a:round/>
-                      <a:headEnd type="none" w="med" len="med"/>
-                      <a:tailEnd type="none" w="med" len="med"/>
-                    </a:lnL>
-                    <a:lnR w="9525" cap="flat" cmpd="sng" algn="ctr">
-                      <a:solidFill>
-                        <a:srgbClr val="CCCCCC"/>
-                      </a:solidFill>
-                      <a:prstDash val="solid"/>
-                      <a:round/>
-                      <a:headEnd type="none" w="med" len="med"/>
-                      <a:tailEnd type="none" w="med" len="med"/>
-                    </a:lnR>
-                    <a:lnT w="9525" cap="flat" cmpd="sng" algn="ctr">
-                      <a:solidFill>
-                        <a:srgbClr val="CCCCCC"/>
-                      </a:solidFill>
-                      <a:prstDash val="solid"/>
-                      <a:round/>
-                      <a:headEnd type="none" w="med" len="med"/>
-                      <a:tailEnd type="none" w="med" len="med"/>
-                    </a:lnT>
-                    <a:lnB w="9525" cap="flat" cmpd="sng" algn="ctr">
-                      <a:solidFill>
-                        <a:srgbClr val="CCCCCC"/>
-                      </a:solidFill>
-                      <a:prstDash val="solid"/>
-                      <a:round/>
-                      <a:headEnd type="none" w="med" len="med"/>
-                      <a:tailEnd type="none" w="med" len="med"/>
-                    </a:lnB>
-                  </a:tcPr>
-                </a:tc>
-                <a:extLst>
-                  <a:ext uri="{0D108BD9-81ED-4DB2-BD59-A6C34878D82A}">
-                    <a16:rowId xmlns:a16="http://schemas.microsoft.com/office/drawing/2014/main" val="783785204"/>
-                  </a:ext>
-                </a:extLst>
-              </a:tr>
-              <a:tr h="261712">
-                <a:tc>
-                  <a:txBody>
-                    <a:bodyPr/>
-                    <a:lstStyle/>
-                    <a:p>
-                      <a:pPr algn="r" rtl="0" fontAlgn="b"/>
-                      <a:r>
-                        <a:rPr lang="en-US" sz="1400" b="0">
-                          <a:solidFill>
-                            <a:srgbClr val="000000"/>
-                          </a:solidFill>
-                          <a:effectLst/>
-                          <a:latin typeface="Calibri" panose="020F0502020204030204" pitchFamily="34" charset="0"/>
-                        </a:rPr>
-                        <a:t>90</a:t>
-                      </a:r>
-                    </a:p>
-                  </a:txBody>
-                  <a:tcPr marL="27106" marR="27106" marT="18070" marB="18070" anchor="b">
-                    <a:lnL w="9525" cap="flat" cmpd="sng" algn="ctr">
-                      <a:solidFill>
-                        <a:srgbClr val="CCCCCC"/>
-                      </a:solidFill>
-                      <a:prstDash val="solid"/>
-                      <a:round/>
-                      <a:headEnd type="none" w="med" len="med"/>
-                      <a:tailEnd type="none" w="med" len="med"/>
-                    </a:lnL>
-                    <a:lnR w="9525" cap="flat" cmpd="sng" algn="ctr">
-                      <a:solidFill>
-                        <a:srgbClr val="CCCCCC"/>
-                      </a:solidFill>
-                      <a:prstDash val="solid"/>
-                      <a:round/>
-                      <a:headEnd type="none" w="med" len="med"/>
-                      <a:tailEnd type="none" w="med" len="med"/>
-                    </a:lnR>
-                    <a:lnT w="9525" cap="flat" cmpd="sng" algn="ctr">
-                      <a:solidFill>
-                        <a:srgbClr val="CCCCCC"/>
-                      </a:solidFill>
-                      <a:prstDash val="solid"/>
-                      <a:round/>
-                      <a:headEnd type="none" w="med" len="med"/>
-                      <a:tailEnd type="none" w="med" len="med"/>
-                    </a:lnT>
-                    <a:lnB w="9525" cap="flat" cmpd="sng" algn="ctr">
-                      <a:solidFill>
-                        <a:srgbClr val="CCCCCC"/>
-                      </a:solidFill>
-                      <a:prstDash val="solid"/>
-                      <a:round/>
-                      <a:headEnd type="none" w="med" len="med"/>
-                      <a:tailEnd type="none" w="med" len="med"/>
-                    </a:lnB>
-                  </a:tcPr>
-                </a:tc>
-                <a:tc>
-                  <a:txBody>
-                    <a:bodyPr/>
-                    <a:lstStyle/>
-                    <a:p>
-                      <a:pPr rtl="0" fontAlgn="b"/>
-                      <a:r>
-                        <a:rPr lang="en-US" sz="1400" b="0" dirty="0">
-                          <a:solidFill>
-                            <a:srgbClr val="000000"/>
-                          </a:solidFill>
-                          <a:effectLst/>
-                          <a:latin typeface="Calibri" panose="020F0502020204030204" pitchFamily="34" charset="0"/>
-                        </a:rPr>
-                        <a:t>Duncan et al. 2011</a:t>
+                        <a:t>Zhao et al. 2014</a:t>
                       </a:r>
                     </a:p>
                   </a:txBody>
@@ -6876,14 +7850,14 @@
                     <a:p>
                       <a:pPr rtl="0" fontAlgn="b"/>
                       <a:r>
-                        <a:rPr lang="en-US" sz="1400" b="0">
+                        <a:rPr lang="en-US" sz="1400" b="0" dirty="0">
                           <a:solidFill>
                             <a:srgbClr val="000000"/>
                           </a:solidFill>
                           <a:effectLst/>
                           <a:latin typeface="Calibri" panose="020F0502020204030204" pitchFamily="34" charset="0"/>
                         </a:rPr>
-                        <a:t>Paramecium</a:t>
+                        <a:t>aphid</a:t>
                       </a:r>
                     </a:p>
                   </a:txBody>
@@ -6940,7 +7914,7 @@
                           <a:effectLst/>
                           <a:latin typeface="Calibri" panose="020F0502020204030204" pitchFamily="34" charset="0"/>
                         </a:rPr>
-                        <a:t>?</a:t>
+                        <a:t>We might be able to use this one – it depends on finding and digitizing the original constant temperature traits (from other publications) instead of the predicted model</a:t>
                       </a:r>
                     </a:p>
                   </a:txBody>
@@ -6985,903 +7959,7 @@
                 </a:tc>
                 <a:extLst>
                   <a:ext uri="{0D108BD9-81ED-4DB2-BD59-A6C34878D82A}">
-                    <a16:rowId xmlns:a16="http://schemas.microsoft.com/office/drawing/2014/main" val="2409065343"/>
-                  </a:ext>
-                </a:extLst>
-              </a:tr>
-              <a:tr h="261712">
-                <a:tc>
-                  <a:txBody>
-                    <a:bodyPr/>
-                    <a:lstStyle/>
-                    <a:p>
-                      <a:pPr algn="r" rtl="0" fontAlgn="b"/>
-                      <a:r>
-                        <a:rPr lang="en-US" sz="1400" b="0">
-                          <a:solidFill>
-                            <a:srgbClr val="000000"/>
-                          </a:solidFill>
-                          <a:effectLst/>
-                          <a:latin typeface="Calibri" panose="020F0502020204030204" pitchFamily="34" charset="0"/>
-                        </a:rPr>
-                        <a:t>91</a:t>
-                      </a:r>
-                    </a:p>
-                  </a:txBody>
-                  <a:tcPr marL="27106" marR="27106" marT="18070" marB="18070" anchor="b">
-                    <a:lnL w="9525" cap="flat" cmpd="sng" algn="ctr">
-                      <a:solidFill>
-                        <a:srgbClr val="CCCCCC"/>
-                      </a:solidFill>
-                      <a:prstDash val="solid"/>
-                      <a:round/>
-                      <a:headEnd type="none" w="med" len="med"/>
-                      <a:tailEnd type="none" w="med" len="med"/>
-                    </a:lnL>
-                    <a:lnR w="9525" cap="flat" cmpd="sng" algn="ctr">
-                      <a:solidFill>
-                        <a:srgbClr val="CCCCCC"/>
-                      </a:solidFill>
-                      <a:prstDash val="solid"/>
-                      <a:round/>
-                      <a:headEnd type="none" w="med" len="med"/>
-                      <a:tailEnd type="none" w="med" len="med"/>
-                    </a:lnR>
-                    <a:lnT w="9525" cap="flat" cmpd="sng" algn="ctr">
-                      <a:solidFill>
-                        <a:srgbClr val="CCCCCC"/>
-                      </a:solidFill>
-                      <a:prstDash val="solid"/>
-                      <a:round/>
-                      <a:headEnd type="none" w="med" len="med"/>
-                      <a:tailEnd type="none" w="med" len="med"/>
-                    </a:lnT>
-                    <a:lnB w="9525" cap="flat" cmpd="sng" algn="ctr">
-                      <a:solidFill>
-                        <a:srgbClr val="CCCCCC"/>
-                      </a:solidFill>
-                      <a:prstDash val="solid"/>
-                      <a:round/>
-                      <a:headEnd type="none" w="med" len="med"/>
-                      <a:tailEnd type="none" w="med" len="med"/>
-                    </a:lnB>
-                  </a:tcPr>
-                </a:tc>
-                <a:tc>
-                  <a:txBody>
-                    <a:bodyPr/>
-                    <a:lstStyle/>
-                    <a:p>
-                      <a:pPr rtl="0" fontAlgn="b"/>
-                      <a:r>
-                        <a:rPr lang="en-US" sz="1400" b="0">
-                          <a:solidFill>
-                            <a:srgbClr val="000000"/>
-                          </a:solidFill>
-                          <a:effectLst/>
-                          <a:latin typeface="Calibri" panose="020F0502020204030204" pitchFamily="34" charset="0"/>
-                        </a:rPr>
-                        <a:t>Radmacher &amp; Strohm 2011</a:t>
-                      </a:r>
-                    </a:p>
-                  </a:txBody>
-                  <a:tcPr marL="27106" marR="27106" marT="18070" marB="18070" anchor="b">
-                    <a:lnL w="9525" cap="flat" cmpd="sng" algn="ctr">
-                      <a:solidFill>
-                        <a:srgbClr val="CCCCCC"/>
-                      </a:solidFill>
-                      <a:prstDash val="solid"/>
-                      <a:round/>
-                      <a:headEnd type="none" w="med" len="med"/>
-                      <a:tailEnd type="none" w="med" len="med"/>
-                    </a:lnL>
-                    <a:lnR w="9525" cap="flat" cmpd="sng" algn="ctr">
-                      <a:solidFill>
-                        <a:srgbClr val="CCCCCC"/>
-                      </a:solidFill>
-                      <a:prstDash val="solid"/>
-                      <a:round/>
-                      <a:headEnd type="none" w="med" len="med"/>
-                      <a:tailEnd type="none" w="med" len="med"/>
-                    </a:lnR>
-                    <a:lnT w="9525" cap="flat" cmpd="sng" algn="ctr">
-                      <a:solidFill>
-                        <a:srgbClr val="CCCCCC"/>
-                      </a:solidFill>
-                      <a:prstDash val="solid"/>
-                      <a:round/>
-                      <a:headEnd type="none" w="med" len="med"/>
-                      <a:tailEnd type="none" w="med" len="med"/>
-                    </a:lnT>
-                    <a:lnB w="9525" cap="flat" cmpd="sng" algn="ctr">
-                      <a:solidFill>
-                        <a:srgbClr val="CCCCCC"/>
-                      </a:solidFill>
-                      <a:prstDash val="solid"/>
-                      <a:round/>
-                      <a:headEnd type="none" w="med" len="med"/>
-                      <a:tailEnd type="none" w="med" len="med"/>
-                    </a:lnB>
-                  </a:tcPr>
-                </a:tc>
-                <a:tc>
-                  <a:txBody>
-                    <a:bodyPr/>
-                    <a:lstStyle/>
-                    <a:p>
-                      <a:pPr rtl="0" fontAlgn="b"/>
-                      <a:r>
-                        <a:rPr lang="en-US" sz="1400" b="0" dirty="0">
-                          <a:solidFill>
-                            <a:srgbClr val="000000"/>
-                          </a:solidFill>
-                          <a:effectLst/>
-                          <a:latin typeface="Calibri" panose="020F0502020204030204" pitchFamily="34" charset="0"/>
-                        </a:rPr>
-                        <a:t>Yes</a:t>
-                      </a:r>
-                    </a:p>
-                  </a:txBody>
-                  <a:tcPr marL="27106" marR="27106" marT="18070" marB="18070" anchor="b">
-                    <a:lnL w="9525" cap="flat" cmpd="sng" algn="ctr">
-                      <a:solidFill>
-                        <a:srgbClr val="CCCCCC"/>
-                      </a:solidFill>
-                      <a:prstDash val="solid"/>
-                      <a:round/>
-                      <a:headEnd type="none" w="med" len="med"/>
-                      <a:tailEnd type="none" w="med" len="med"/>
-                    </a:lnL>
-                    <a:lnR w="9525" cap="flat" cmpd="sng" algn="ctr">
-                      <a:solidFill>
-                        <a:srgbClr val="CCCCCC"/>
-                      </a:solidFill>
-                      <a:prstDash val="solid"/>
-                      <a:round/>
-                      <a:headEnd type="none" w="med" len="med"/>
-                      <a:tailEnd type="none" w="med" len="med"/>
-                    </a:lnR>
-                    <a:lnT w="9525" cap="flat" cmpd="sng" algn="ctr">
-                      <a:solidFill>
-                        <a:srgbClr val="CCCCCC"/>
-                      </a:solidFill>
-                      <a:prstDash val="solid"/>
-                      <a:round/>
-                      <a:headEnd type="none" w="med" len="med"/>
-                      <a:tailEnd type="none" w="med" len="med"/>
-                    </a:lnT>
-                    <a:lnB w="9525" cap="flat" cmpd="sng" algn="ctr">
-                      <a:solidFill>
-                        <a:srgbClr val="CCCCCC"/>
-                      </a:solidFill>
-                      <a:prstDash val="solid"/>
-                      <a:round/>
-                      <a:headEnd type="none" w="med" len="med"/>
-                      <a:tailEnd type="none" w="med" len="med"/>
-                    </a:lnB>
-                  </a:tcPr>
-                </a:tc>
-                <a:tc>
-                  <a:txBody>
-                    <a:bodyPr/>
-                    <a:lstStyle/>
-                    <a:p>
-                      <a:pPr rtl="0" fontAlgn="b"/>
-                      <a:r>
-                        <a:rPr lang="en-US" sz="1400" b="0">
-                          <a:solidFill>
-                            <a:srgbClr val="000000"/>
-                          </a:solidFill>
-                          <a:effectLst/>
-                          <a:latin typeface="Calibri" panose="020F0502020204030204" pitchFamily="34" charset="0"/>
-                        </a:rPr>
-                        <a:t>bee</a:t>
-                      </a:r>
-                    </a:p>
-                  </a:txBody>
-                  <a:tcPr marL="27106" marR="27106" marT="18070" marB="18070" anchor="b">
-                    <a:lnL w="9525" cap="flat" cmpd="sng" algn="ctr">
-                      <a:solidFill>
-                        <a:srgbClr val="CCCCCC"/>
-                      </a:solidFill>
-                      <a:prstDash val="solid"/>
-                      <a:round/>
-                      <a:headEnd type="none" w="med" len="med"/>
-                      <a:tailEnd type="none" w="med" len="med"/>
-                    </a:lnL>
-                    <a:lnR w="9525" cap="flat" cmpd="sng" algn="ctr">
-                      <a:solidFill>
-                        <a:srgbClr val="CCCCCC"/>
-                      </a:solidFill>
-                      <a:prstDash val="solid"/>
-                      <a:round/>
-                      <a:headEnd type="none" w="med" len="med"/>
-                      <a:tailEnd type="none" w="med" len="med"/>
-                    </a:lnR>
-                    <a:lnT w="9525" cap="flat" cmpd="sng" algn="ctr">
-                      <a:solidFill>
-                        <a:srgbClr val="CCCCCC"/>
-                      </a:solidFill>
-                      <a:prstDash val="solid"/>
-                      <a:round/>
-                      <a:headEnd type="none" w="med" len="med"/>
-                      <a:tailEnd type="none" w="med" len="med"/>
-                    </a:lnT>
-                    <a:lnB w="9525" cap="flat" cmpd="sng" algn="ctr">
-                      <a:solidFill>
-                        <a:srgbClr val="CCCCCC"/>
-                      </a:solidFill>
-                      <a:prstDash val="solid"/>
-                      <a:round/>
-                      <a:headEnd type="none" w="med" len="med"/>
-                      <a:tailEnd type="none" w="med" len="med"/>
-                    </a:lnB>
-                  </a:tcPr>
-                </a:tc>
-                <a:tc>
-                  <a:txBody>
-                    <a:bodyPr/>
-                    <a:lstStyle/>
-                    <a:p>
-                      <a:pPr rtl="0" fontAlgn="b"/>
-                      <a:r>
-                        <a:rPr lang="en-US" sz="1400" b="0" dirty="0">
-                          <a:solidFill>
-                            <a:srgbClr val="000000"/>
-                          </a:solidFill>
-                          <a:effectLst/>
-                          <a:latin typeface="Calibri" panose="020F0502020204030204" pitchFamily="34" charset="0"/>
-                        </a:rPr>
-                        <a:t>?</a:t>
-                      </a:r>
-                    </a:p>
-                  </a:txBody>
-                  <a:tcPr marL="27106" marR="27106" marT="18070" marB="18070" anchor="b">
-                    <a:lnL w="9525" cap="flat" cmpd="sng" algn="ctr">
-                      <a:solidFill>
-                        <a:srgbClr val="CCCCCC"/>
-                      </a:solidFill>
-                      <a:prstDash val="solid"/>
-                      <a:round/>
-                      <a:headEnd type="none" w="med" len="med"/>
-                      <a:tailEnd type="none" w="med" len="med"/>
-                    </a:lnL>
-                    <a:lnR w="9525" cap="flat" cmpd="sng" algn="ctr">
-                      <a:solidFill>
-                        <a:srgbClr val="CCCCCC"/>
-                      </a:solidFill>
-                      <a:prstDash val="solid"/>
-                      <a:round/>
-                      <a:headEnd type="none" w="med" len="med"/>
-                      <a:tailEnd type="none" w="med" len="med"/>
-                    </a:lnR>
-                    <a:lnT w="9525" cap="flat" cmpd="sng" algn="ctr">
-                      <a:solidFill>
-                        <a:srgbClr val="CCCCCC"/>
-                      </a:solidFill>
-                      <a:prstDash val="solid"/>
-                      <a:round/>
-                      <a:headEnd type="none" w="med" len="med"/>
-                      <a:tailEnd type="none" w="med" len="med"/>
-                    </a:lnT>
-                    <a:lnB w="9525" cap="flat" cmpd="sng" algn="ctr">
-                      <a:solidFill>
-                        <a:srgbClr val="CCCCCC"/>
-                      </a:solidFill>
-                      <a:prstDash val="solid"/>
-                      <a:round/>
-                      <a:headEnd type="none" w="med" len="med"/>
-                      <a:tailEnd type="none" w="med" len="med"/>
-                    </a:lnB>
-                  </a:tcPr>
-                </a:tc>
-                <a:extLst>
-                  <a:ext uri="{0D108BD9-81ED-4DB2-BD59-A6C34878D82A}">
-                    <a16:rowId xmlns:a16="http://schemas.microsoft.com/office/drawing/2014/main" val="1476799281"/>
-                  </a:ext>
-                </a:extLst>
-              </a:tr>
-              <a:tr h="261712">
-                <a:tc>
-                  <a:txBody>
-                    <a:bodyPr/>
-                    <a:lstStyle/>
-                    <a:p>
-                      <a:pPr algn="r" rtl="0" fontAlgn="b"/>
-                      <a:r>
-                        <a:rPr lang="en-US" sz="1400" b="0">
-                          <a:solidFill>
-                            <a:srgbClr val="000000"/>
-                          </a:solidFill>
-                          <a:effectLst/>
-                          <a:latin typeface="Calibri" panose="020F0502020204030204" pitchFamily="34" charset="0"/>
-                        </a:rPr>
-                        <a:t>124</a:t>
-                      </a:r>
-                    </a:p>
-                  </a:txBody>
-                  <a:tcPr marL="27106" marR="27106" marT="18070" marB="18070" anchor="b">
-                    <a:lnL w="9525" cap="flat" cmpd="sng" algn="ctr">
-                      <a:solidFill>
-                        <a:srgbClr val="CCCCCC"/>
-                      </a:solidFill>
-                      <a:prstDash val="solid"/>
-                      <a:round/>
-                      <a:headEnd type="none" w="med" len="med"/>
-                      <a:tailEnd type="none" w="med" len="med"/>
-                    </a:lnL>
-                    <a:lnR w="9525" cap="flat" cmpd="sng" algn="ctr">
-                      <a:solidFill>
-                        <a:srgbClr val="CCCCCC"/>
-                      </a:solidFill>
-                      <a:prstDash val="solid"/>
-                      <a:round/>
-                      <a:headEnd type="none" w="med" len="med"/>
-                      <a:tailEnd type="none" w="med" len="med"/>
-                    </a:lnR>
-                    <a:lnT w="9525" cap="flat" cmpd="sng" algn="ctr">
-                      <a:solidFill>
-                        <a:srgbClr val="CCCCCC"/>
-                      </a:solidFill>
-                      <a:prstDash val="solid"/>
-                      <a:round/>
-                      <a:headEnd type="none" w="med" len="med"/>
-                      <a:tailEnd type="none" w="med" len="med"/>
-                    </a:lnT>
-                    <a:lnB w="9525" cap="flat" cmpd="sng" algn="ctr">
-                      <a:solidFill>
-                        <a:srgbClr val="CCCCCC"/>
-                      </a:solidFill>
-                      <a:prstDash val="solid"/>
-                      <a:round/>
-                      <a:headEnd type="none" w="med" len="med"/>
-                      <a:tailEnd type="none" w="med" len="med"/>
-                    </a:lnB>
-                  </a:tcPr>
-                </a:tc>
-                <a:tc>
-                  <a:txBody>
-                    <a:bodyPr/>
-                    <a:lstStyle/>
-                    <a:p>
-                      <a:pPr rtl="0" fontAlgn="b"/>
-                      <a:r>
-                        <a:rPr lang="en-US" sz="1400" b="0" dirty="0" err="1">
-                          <a:solidFill>
-                            <a:srgbClr val="000000"/>
-                          </a:solidFill>
-                          <a:effectLst/>
-                          <a:latin typeface="Calibri" panose="020F0502020204030204" pitchFamily="34" charset="0"/>
-                        </a:rPr>
-                        <a:t>Seuffert</a:t>
-                      </a:r>
-                      <a:r>
-                        <a:rPr lang="en-US" sz="1400" b="0" dirty="0">
-                          <a:solidFill>
-                            <a:srgbClr val="000000"/>
-                          </a:solidFill>
-                          <a:effectLst/>
-                          <a:latin typeface="Calibri" panose="020F0502020204030204" pitchFamily="34" charset="0"/>
-                        </a:rPr>
-                        <a:t> et al. 2010</a:t>
-                      </a:r>
-                    </a:p>
-                  </a:txBody>
-                  <a:tcPr marL="27106" marR="27106" marT="18070" marB="18070" anchor="b">
-                    <a:lnL w="9525" cap="flat" cmpd="sng" algn="ctr">
-                      <a:solidFill>
-                        <a:srgbClr val="CCCCCC"/>
-                      </a:solidFill>
-                      <a:prstDash val="solid"/>
-                      <a:round/>
-                      <a:headEnd type="none" w="med" len="med"/>
-                      <a:tailEnd type="none" w="med" len="med"/>
-                    </a:lnL>
-                    <a:lnR w="9525" cap="flat" cmpd="sng" algn="ctr">
-                      <a:solidFill>
-                        <a:srgbClr val="CCCCCC"/>
-                      </a:solidFill>
-                      <a:prstDash val="solid"/>
-                      <a:round/>
-                      <a:headEnd type="none" w="med" len="med"/>
-                      <a:tailEnd type="none" w="med" len="med"/>
-                    </a:lnR>
-                    <a:lnT w="9525" cap="flat" cmpd="sng" algn="ctr">
-                      <a:solidFill>
-                        <a:srgbClr val="CCCCCC"/>
-                      </a:solidFill>
-                      <a:prstDash val="solid"/>
-                      <a:round/>
-                      <a:headEnd type="none" w="med" len="med"/>
-                      <a:tailEnd type="none" w="med" len="med"/>
-                    </a:lnT>
-                    <a:lnB w="9525" cap="flat" cmpd="sng" algn="ctr">
-                      <a:solidFill>
-                        <a:srgbClr val="CCCCCC"/>
-                      </a:solidFill>
-                      <a:prstDash val="solid"/>
-                      <a:round/>
-                      <a:headEnd type="none" w="med" len="med"/>
-                      <a:tailEnd type="none" w="med" len="med"/>
-                    </a:lnB>
-                  </a:tcPr>
-                </a:tc>
-                <a:tc>
-                  <a:txBody>
-                    <a:bodyPr/>
-                    <a:lstStyle/>
-                    <a:p>
-                      <a:pPr rtl="0" fontAlgn="b"/>
-                      <a:r>
-                        <a:rPr lang="en-US" sz="1400" b="0" dirty="0">
-                          <a:solidFill>
-                            <a:srgbClr val="000000"/>
-                          </a:solidFill>
-                          <a:effectLst/>
-                          <a:latin typeface="Calibri" panose="020F0502020204030204" pitchFamily="34" charset="0"/>
-                        </a:rPr>
-                        <a:t>Yes</a:t>
-                      </a:r>
-                    </a:p>
-                  </a:txBody>
-                  <a:tcPr marL="27106" marR="27106" marT="18070" marB="18070" anchor="b">
-                    <a:lnL w="9525" cap="flat" cmpd="sng" algn="ctr">
-                      <a:solidFill>
-                        <a:srgbClr val="CCCCCC"/>
-                      </a:solidFill>
-                      <a:prstDash val="solid"/>
-                      <a:round/>
-                      <a:headEnd type="none" w="med" len="med"/>
-                      <a:tailEnd type="none" w="med" len="med"/>
-                    </a:lnL>
-                    <a:lnR w="9525" cap="flat" cmpd="sng" algn="ctr">
-                      <a:solidFill>
-                        <a:srgbClr val="CCCCCC"/>
-                      </a:solidFill>
-                      <a:prstDash val="solid"/>
-                      <a:round/>
-                      <a:headEnd type="none" w="med" len="med"/>
-                      <a:tailEnd type="none" w="med" len="med"/>
-                    </a:lnR>
-                    <a:lnT w="9525" cap="flat" cmpd="sng" algn="ctr">
-                      <a:solidFill>
-                        <a:srgbClr val="CCCCCC"/>
-                      </a:solidFill>
-                      <a:prstDash val="solid"/>
-                      <a:round/>
-                      <a:headEnd type="none" w="med" len="med"/>
-                      <a:tailEnd type="none" w="med" len="med"/>
-                    </a:lnT>
-                    <a:lnB w="9525" cap="flat" cmpd="sng" algn="ctr">
-                      <a:solidFill>
-                        <a:srgbClr val="CCCCCC"/>
-                      </a:solidFill>
-                      <a:prstDash val="solid"/>
-                      <a:round/>
-                      <a:headEnd type="none" w="med" len="med"/>
-                      <a:tailEnd type="none" w="med" len="med"/>
-                    </a:lnB>
-                  </a:tcPr>
-                </a:tc>
-                <a:tc>
-                  <a:txBody>
-                    <a:bodyPr/>
-                    <a:lstStyle/>
-                    <a:p>
-                      <a:pPr rtl="0" fontAlgn="b"/>
-                      <a:r>
-                        <a:rPr lang="en-US" sz="1400" b="0" dirty="0">
-                          <a:solidFill>
-                            <a:srgbClr val="000000"/>
-                          </a:solidFill>
-                          <a:effectLst/>
-                          <a:latin typeface="Calibri" panose="020F0502020204030204" pitchFamily="34" charset="0"/>
-                        </a:rPr>
-                        <a:t>freshwater snail</a:t>
-                      </a:r>
-                    </a:p>
-                  </a:txBody>
-                  <a:tcPr marL="27106" marR="27106" marT="18070" marB="18070" anchor="b">
-                    <a:lnL w="9525" cap="flat" cmpd="sng" algn="ctr">
-                      <a:solidFill>
-                        <a:srgbClr val="CCCCCC"/>
-                      </a:solidFill>
-                      <a:prstDash val="solid"/>
-                      <a:round/>
-                      <a:headEnd type="none" w="med" len="med"/>
-                      <a:tailEnd type="none" w="med" len="med"/>
-                    </a:lnL>
-                    <a:lnR w="9525" cap="flat" cmpd="sng" algn="ctr">
-                      <a:solidFill>
-                        <a:srgbClr val="CCCCCC"/>
-                      </a:solidFill>
-                      <a:prstDash val="solid"/>
-                      <a:round/>
-                      <a:headEnd type="none" w="med" len="med"/>
-                      <a:tailEnd type="none" w="med" len="med"/>
-                    </a:lnR>
-                    <a:lnT w="9525" cap="flat" cmpd="sng" algn="ctr">
-                      <a:solidFill>
-                        <a:srgbClr val="CCCCCC"/>
-                      </a:solidFill>
-                      <a:prstDash val="solid"/>
-                      <a:round/>
-                      <a:headEnd type="none" w="med" len="med"/>
-                      <a:tailEnd type="none" w="med" len="med"/>
-                    </a:lnT>
-                    <a:lnB w="9525" cap="flat" cmpd="sng" algn="ctr">
-                      <a:solidFill>
-                        <a:srgbClr val="CCCCCC"/>
-                      </a:solidFill>
-                      <a:prstDash val="solid"/>
-                      <a:round/>
-                      <a:headEnd type="none" w="med" len="med"/>
-                      <a:tailEnd type="none" w="med" len="med"/>
-                    </a:lnB>
-                  </a:tcPr>
-                </a:tc>
-                <a:tc>
-                  <a:txBody>
-                    <a:bodyPr/>
-                    <a:lstStyle/>
-                    <a:p>
-                      <a:pPr rtl="0" fontAlgn="b"/>
-                      <a:r>
-                        <a:rPr lang="en-US" sz="1400" b="0" dirty="0">
-                          <a:solidFill>
-                            <a:srgbClr val="000000"/>
-                          </a:solidFill>
-                          <a:effectLst/>
-                          <a:latin typeface="Calibri" panose="020F0502020204030204" pitchFamily="34" charset="0"/>
-                        </a:rPr>
-                        <a:t>?</a:t>
-                      </a:r>
-                    </a:p>
-                  </a:txBody>
-                  <a:tcPr marL="27106" marR="27106" marT="18070" marB="18070" anchor="b">
-                    <a:lnL w="9525" cap="flat" cmpd="sng" algn="ctr">
-                      <a:solidFill>
-                        <a:srgbClr val="CCCCCC"/>
-                      </a:solidFill>
-                      <a:prstDash val="solid"/>
-                      <a:round/>
-                      <a:headEnd type="none" w="med" len="med"/>
-                      <a:tailEnd type="none" w="med" len="med"/>
-                    </a:lnL>
-                    <a:lnR w="9525" cap="flat" cmpd="sng" algn="ctr">
-                      <a:solidFill>
-                        <a:srgbClr val="CCCCCC"/>
-                      </a:solidFill>
-                      <a:prstDash val="solid"/>
-                      <a:round/>
-                      <a:headEnd type="none" w="med" len="med"/>
-                      <a:tailEnd type="none" w="med" len="med"/>
-                    </a:lnR>
-                    <a:lnT w="9525" cap="flat" cmpd="sng" algn="ctr">
-                      <a:solidFill>
-                        <a:srgbClr val="CCCCCC"/>
-                      </a:solidFill>
-                      <a:prstDash val="solid"/>
-                      <a:round/>
-                      <a:headEnd type="none" w="med" len="med"/>
-                      <a:tailEnd type="none" w="med" len="med"/>
-                    </a:lnT>
-                    <a:lnB w="9525" cap="flat" cmpd="sng" algn="ctr">
-                      <a:solidFill>
-                        <a:srgbClr val="CCCCCC"/>
-                      </a:solidFill>
-                      <a:prstDash val="solid"/>
-                      <a:round/>
-                      <a:headEnd type="none" w="med" len="med"/>
-                      <a:tailEnd type="none" w="med" len="med"/>
-                    </a:lnB>
-                  </a:tcPr>
-                </a:tc>
-                <a:extLst>
-                  <a:ext uri="{0D108BD9-81ED-4DB2-BD59-A6C34878D82A}">
-                    <a16:rowId xmlns:a16="http://schemas.microsoft.com/office/drawing/2014/main" val="1365085328"/>
-                  </a:ext>
-                </a:extLst>
-              </a:tr>
-              <a:tr h="261712">
-                <a:tc>
-                  <a:txBody>
-                    <a:bodyPr/>
-                    <a:lstStyle/>
-                    <a:p>
-                      <a:pPr algn="r" rtl="0" fontAlgn="b"/>
-                      <a:r>
-                        <a:rPr lang="en-US" sz="1400" b="0">
-                          <a:solidFill>
-                            <a:srgbClr val="000000"/>
-                          </a:solidFill>
-                          <a:effectLst/>
-                          <a:latin typeface="Calibri" panose="020F0502020204030204" pitchFamily="34" charset="0"/>
-                        </a:rPr>
-                        <a:t>165</a:t>
-                      </a:r>
-                    </a:p>
-                  </a:txBody>
-                  <a:tcPr marL="27106" marR="27106" marT="18070" marB="18070" anchor="b">
-                    <a:lnL w="9525" cap="flat" cmpd="sng" algn="ctr">
-                      <a:solidFill>
-                        <a:srgbClr val="CCCCCC"/>
-                      </a:solidFill>
-                      <a:prstDash val="solid"/>
-                      <a:round/>
-                      <a:headEnd type="none" w="med" len="med"/>
-                      <a:tailEnd type="none" w="med" len="med"/>
-                    </a:lnL>
-                    <a:lnR w="9525" cap="flat" cmpd="sng" algn="ctr">
-                      <a:solidFill>
-                        <a:srgbClr val="CCCCCC"/>
-                      </a:solidFill>
-                      <a:prstDash val="solid"/>
-                      <a:round/>
-                      <a:headEnd type="none" w="med" len="med"/>
-                      <a:tailEnd type="none" w="med" len="med"/>
-                    </a:lnR>
-                    <a:lnT w="9525" cap="flat" cmpd="sng" algn="ctr">
-                      <a:solidFill>
-                        <a:srgbClr val="CCCCCC"/>
-                      </a:solidFill>
-                      <a:prstDash val="solid"/>
-                      <a:round/>
-                      <a:headEnd type="none" w="med" len="med"/>
-                      <a:tailEnd type="none" w="med" len="med"/>
-                    </a:lnT>
-                    <a:lnB w="9525" cap="flat" cmpd="sng" algn="ctr">
-                      <a:solidFill>
-                        <a:srgbClr val="CCCCCC"/>
-                      </a:solidFill>
-                      <a:prstDash val="solid"/>
-                      <a:round/>
-                      <a:headEnd type="none" w="med" len="med"/>
-                      <a:tailEnd type="none" w="med" len="med"/>
-                    </a:lnB>
-                  </a:tcPr>
-                </a:tc>
-                <a:tc>
-                  <a:txBody>
-                    <a:bodyPr/>
-                    <a:lstStyle/>
-                    <a:p>
-                      <a:pPr rtl="0" fontAlgn="b"/>
-                      <a:r>
-                        <a:rPr lang="en-US" sz="1400" b="0" dirty="0" err="1">
-                          <a:solidFill>
-                            <a:srgbClr val="000000"/>
-                          </a:solidFill>
-                          <a:effectLst/>
-                          <a:latin typeface="Calibri" panose="020F0502020204030204" pitchFamily="34" charset="0"/>
-                        </a:rPr>
-                        <a:t>Hilbeck</a:t>
-                      </a:r>
-                      <a:r>
-                        <a:rPr lang="en-US" sz="1400" b="0" dirty="0">
-                          <a:solidFill>
-                            <a:srgbClr val="000000"/>
-                          </a:solidFill>
-                          <a:effectLst/>
-                          <a:latin typeface="Calibri" panose="020F0502020204030204" pitchFamily="34" charset="0"/>
-                        </a:rPr>
-                        <a:t> &amp; Kennedy 1998</a:t>
-                      </a:r>
-                    </a:p>
-                  </a:txBody>
-                  <a:tcPr marL="27106" marR="27106" marT="18070" marB="18070" anchor="b">
-                    <a:lnL w="9525" cap="flat" cmpd="sng" algn="ctr">
-                      <a:solidFill>
-                        <a:srgbClr val="CCCCCC"/>
-                      </a:solidFill>
-                      <a:prstDash val="solid"/>
-                      <a:round/>
-                      <a:headEnd type="none" w="med" len="med"/>
-                      <a:tailEnd type="none" w="med" len="med"/>
-                    </a:lnL>
-                    <a:lnR w="9525" cap="flat" cmpd="sng" algn="ctr">
-                      <a:solidFill>
-                        <a:srgbClr val="CCCCCC"/>
-                      </a:solidFill>
-                      <a:prstDash val="solid"/>
-                      <a:round/>
-                      <a:headEnd type="none" w="med" len="med"/>
-                      <a:tailEnd type="none" w="med" len="med"/>
-                    </a:lnR>
-                    <a:lnT w="9525" cap="flat" cmpd="sng" algn="ctr">
-                      <a:solidFill>
-                        <a:srgbClr val="CCCCCC"/>
-                      </a:solidFill>
-                      <a:prstDash val="solid"/>
-                      <a:round/>
-                      <a:headEnd type="none" w="med" len="med"/>
-                      <a:tailEnd type="none" w="med" len="med"/>
-                    </a:lnT>
-                    <a:lnB w="9525" cap="flat" cmpd="sng" algn="ctr">
-                      <a:solidFill>
-                        <a:srgbClr val="CCCCCC"/>
-                      </a:solidFill>
-                      <a:prstDash val="solid"/>
-                      <a:round/>
-                      <a:headEnd type="none" w="med" len="med"/>
-                      <a:tailEnd type="none" w="med" len="med"/>
-                    </a:lnB>
-                  </a:tcPr>
-                </a:tc>
-                <a:tc>
-                  <a:txBody>
-                    <a:bodyPr/>
-                    <a:lstStyle/>
-                    <a:p>
-                      <a:pPr rtl="0" fontAlgn="b"/>
-                      <a:r>
-                        <a:rPr lang="en-US" sz="1400" b="0" dirty="0">
-                          <a:solidFill>
-                            <a:srgbClr val="000000"/>
-                          </a:solidFill>
-                          <a:effectLst/>
-                          <a:latin typeface="Calibri" panose="020F0502020204030204" pitchFamily="34" charset="0"/>
-                        </a:rPr>
-                        <a:t>Yes</a:t>
-                      </a:r>
-                    </a:p>
-                  </a:txBody>
-                  <a:tcPr marL="27106" marR="27106" marT="18070" marB="18070" anchor="b">
-                    <a:lnL w="9525" cap="flat" cmpd="sng" algn="ctr">
-                      <a:solidFill>
-                        <a:srgbClr val="CCCCCC"/>
-                      </a:solidFill>
-                      <a:prstDash val="solid"/>
-                      <a:round/>
-                      <a:headEnd type="none" w="med" len="med"/>
-                      <a:tailEnd type="none" w="med" len="med"/>
-                    </a:lnL>
-                    <a:lnR w="9525" cap="flat" cmpd="sng" algn="ctr">
-                      <a:solidFill>
-                        <a:srgbClr val="CCCCCC"/>
-                      </a:solidFill>
-                      <a:prstDash val="solid"/>
-                      <a:round/>
-                      <a:headEnd type="none" w="med" len="med"/>
-                      <a:tailEnd type="none" w="med" len="med"/>
-                    </a:lnR>
-                    <a:lnT w="9525" cap="flat" cmpd="sng" algn="ctr">
-                      <a:solidFill>
-                        <a:srgbClr val="CCCCCC"/>
-                      </a:solidFill>
-                      <a:prstDash val="solid"/>
-                      <a:round/>
-                      <a:headEnd type="none" w="med" len="med"/>
-                      <a:tailEnd type="none" w="med" len="med"/>
-                    </a:lnT>
-                    <a:lnB w="9525" cap="flat" cmpd="sng" algn="ctr">
-                      <a:solidFill>
-                        <a:srgbClr val="CCCCCC"/>
-                      </a:solidFill>
-                      <a:prstDash val="solid"/>
-                      <a:round/>
-                      <a:headEnd type="none" w="med" len="med"/>
-                      <a:tailEnd type="none" w="med" len="med"/>
-                    </a:lnB>
-                  </a:tcPr>
-                </a:tc>
-                <a:tc>
-                  <a:txBody>
-                    <a:bodyPr/>
-                    <a:lstStyle/>
-                    <a:p>
-                      <a:pPr rtl="0" fontAlgn="b"/>
-                      <a:r>
-                        <a:rPr lang="en-US" sz="1400" b="0" dirty="0">
-                          <a:solidFill>
-                            <a:srgbClr val="000000"/>
-                          </a:solidFill>
-                          <a:effectLst/>
-                          <a:latin typeface="Calibri" panose="020F0502020204030204" pitchFamily="34" charset="0"/>
-                        </a:rPr>
-                        <a:t>beetle</a:t>
-                      </a:r>
-                    </a:p>
-                  </a:txBody>
-                  <a:tcPr marL="27106" marR="27106" marT="18070" marB="18070" anchor="b">
-                    <a:lnL w="9525" cap="flat" cmpd="sng" algn="ctr">
-                      <a:solidFill>
-                        <a:srgbClr val="CCCCCC"/>
-                      </a:solidFill>
-                      <a:prstDash val="solid"/>
-                      <a:round/>
-                      <a:headEnd type="none" w="med" len="med"/>
-                      <a:tailEnd type="none" w="med" len="med"/>
-                    </a:lnL>
-                    <a:lnR w="9525" cap="flat" cmpd="sng" algn="ctr">
-                      <a:solidFill>
-                        <a:srgbClr val="CCCCCC"/>
-                      </a:solidFill>
-                      <a:prstDash val="solid"/>
-                      <a:round/>
-                      <a:headEnd type="none" w="med" len="med"/>
-                      <a:tailEnd type="none" w="med" len="med"/>
-                    </a:lnR>
-                    <a:lnT w="9525" cap="flat" cmpd="sng" algn="ctr">
-                      <a:solidFill>
-                        <a:srgbClr val="CCCCCC"/>
-                      </a:solidFill>
-                      <a:prstDash val="solid"/>
-                      <a:round/>
-                      <a:headEnd type="none" w="med" len="med"/>
-                      <a:tailEnd type="none" w="med" len="med"/>
-                    </a:lnT>
-                    <a:lnB w="9525" cap="flat" cmpd="sng" algn="ctr">
-                      <a:solidFill>
-                        <a:srgbClr val="CCCCCC"/>
-                      </a:solidFill>
-                      <a:prstDash val="solid"/>
-                      <a:round/>
-                      <a:headEnd type="none" w="med" len="med"/>
-                      <a:tailEnd type="none" w="med" len="med"/>
-                    </a:lnB>
-                  </a:tcPr>
-                </a:tc>
-                <a:tc>
-                  <a:txBody>
-                    <a:bodyPr/>
-                    <a:lstStyle/>
-                    <a:p>
-                      <a:pPr rtl="0" fontAlgn="b"/>
-                      <a:r>
-                        <a:rPr lang="en-US" sz="1400" b="0" dirty="0">
-                          <a:solidFill>
-                            <a:srgbClr val="000000"/>
-                          </a:solidFill>
-                          <a:effectLst/>
-                          <a:latin typeface="Calibri" panose="020F0502020204030204" pitchFamily="34" charset="0"/>
-                        </a:rPr>
-                        <a:t>?</a:t>
-                      </a:r>
-                    </a:p>
-                  </a:txBody>
-                  <a:tcPr marL="27106" marR="27106" marT="18070" marB="18070" anchor="b">
-                    <a:lnL w="9525" cap="flat" cmpd="sng" algn="ctr">
-                      <a:solidFill>
-                        <a:srgbClr val="CCCCCC"/>
-                      </a:solidFill>
-                      <a:prstDash val="solid"/>
-                      <a:round/>
-                      <a:headEnd type="none" w="med" len="med"/>
-                      <a:tailEnd type="none" w="med" len="med"/>
-                    </a:lnL>
-                    <a:lnR w="9525" cap="flat" cmpd="sng" algn="ctr">
-                      <a:solidFill>
-                        <a:srgbClr val="CCCCCC"/>
-                      </a:solidFill>
-                      <a:prstDash val="solid"/>
-                      <a:round/>
-                      <a:headEnd type="none" w="med" len="med"/>
-                      <a:tailEnd type="none" w="med" len="med"/>
-                    </a:lnR>
-                    <a:lnT w="9525" cap="flat" cmpd="sng" algn="ctr">
-                      <a:solidFill>
-                        <a:srgbClr val="CCCCCC"/>
-                      </a:solidFill>
-                      <a:prstDash val="solid"/>
-                      <a:round/>
-                      <a:headEnd type="none" w="med" len="med"/>
-                      <a:tailEnd type="none" w="med" len="med"/>
-                    </a:lnT>
-                    <a:lnB w="9525" cap="flat" cmpd="sng" algn="ctr">
-                      <a:solidFill>
-                        <a:srgbClr val="CCCCCC"/>
-                      </a:solidFill>
-                      <a:prstDash val="solid"/>
-                      <a:round/>
-                      <a:headEnd type="none" w="med" len="med"/>
-                      <a:tailEnd type="none" w="med" len="med"/>
-                    </a:lnB>
-                  </a:tcPr>
-                </a:tc>
-                <a:extLst>
-                  <a:ext uri="{0D108BD9-81ED-4DB2-BD59-A6C34878D82A}">
-                    <a16:rowId xmlns:a16="http://schemas.microsoft.com/office/drawing/2014/main" val="1267861890"/>
+                    <a16:rowId xmlns:a16="http://schemas.microsoft.com/office/drawing/2014/main" val="1449004697"/>
                   </a:ext>
                 </a:extLst>
               </a:tr>
@@ -7893,7 +7971,7 @@
                     <a:p>
                       <a:pPr rtl="0" fontAlgn="b"/>
                       <a:r>
-                        <a:rPr lang="en-US" sz="1400" b="0">
+                        <a:rPr lang="en-US" sz="1400" b="0" dirty="0">
                           <a:solidFill>
                             <a:srgbClr val="000000"/>
                           </a:solidFill>

</xml_diff>

<commit_message>
more changes to the presentation
</commit_message>
<xml_diff>
--- a/VBite2019_WGPres.pptx
+++ b/VBite2019_WGPres.pptx
@@ -145,7 +145,7 @@
           <p:cNvPr id="2" name="Title 1">
             <a:extLst>
               <a:ext uri="{FF2B5EF4-FFF2-40B4-BE49-F238E27FC236}">
-                <a16:creationId xmlns:a16="http://schemas.microsoft.com/office/drawing/2014/main" id="{409B086E-D641-6744-80F2-48340BD8E860}"/>
+                <a16:creationId xmlns:a16="http://schemas.microsoft.com/office/drawing/2014/main" xmlns="" id="{409B086E-D641-6744-80F2-48340BD8E860}"/>
               </a:ext>
             </a:extLst>
           </p:cNvPr>
@@ -182,7 +182,7 @@
           <p:cNvPr id="3" name="Subtitle 2">
             <a:extLst>
               <a:ext uri="{FF2B5EF4-FFF2-40B4-BE49-F238E27FC236}">
-                <a16:creationId xmlns:a16="http://schemas.microsoft.com/office/drawing/2014/main" id="{D4B950A6-EDBC-E140-9928-53068B1434A1}"/>
+                <a16:creationId xmlns:a16="http://schemas.microsoft.com/office/drawing/2014/main" xmlns="" id="{D4B950A6-EDBC-E140-9928-53068B1434A1}"/>
               </a:ext>
             </a:extLst>
           </p:cNvPr>
@@ -252,7 +252,7 @@
           <p:cNvPr id="4" name="Date Placeholder 3">
             <a:extLst>
               <a:ext uri="{FF2B5EF4-FFF2-40B4-BE49-F238E27FC236}">
-                <a16:creationId xmlns:a16="http://schemas.microsoft.com/office/drawing/2014/main" id="{BBAC9788-96ED-974D-A510-AB46FD7F0909}"/>
+                <a16:creationId xmlns:a16="http://schemas.microsoft.com/office/drawing/2014/main" xmlns="" id="{BBAC9788-96ED-974D-A510-AB46FD7F0909}"/>
               </a:ext>
             </a:extLst>
           </p:cNvPr>
@@ -270,7 +270,7 @@
           <a:p>
             <a:fld id="{5ABA3254-B489-4843-B477-2A714F347B69}" type="datetimeFigureOut">
               <a:rPr lang="en-US" smtClean="0"/>
-              <a:t>6/12/19</a:t>
+              <a:t>6/17/19</a:t>
             </a:fld>
             <a:endParaRPr lang="en-US"/>
           </a:p>
@@ -281,7 +281,7 @@
           <p:cNvPr id="5" name="Footer Placeholder 4">
             <a:extLst>
               <a:ext uri="{FF2B5EF4-FFF2-40B4-BE49-F238E27FC236}">
-                <a16:creationId xmlns:a16="http://schemas.microsoft.com/office/drawing/2014/main" id="{0E01A3C6-DEA8-3B40-BAC3-7A2E8C5F95BC}"/>
+                <a16:creationId xmlns:a16="http://schemas.microsoft.com/office/drawing/2014/main" xmlns="" id="{0E01A3C6-DEA8-3B40-BAC3-7A2E8C5F95BC}"/>
               </a:ext>
             </a:extLst>
           </p:cNvPr>
@@ -306,7 +306,7 @@
           <p:cNvPr id="6" name="Slide Number Placeholder 5">
             <a:extLst>
               <a:ext uri="{FF2B5EF4-FFF2-40B4-BE49-F238E27FC236}">
-                <a16:creationId xmlns:a16="http://schemas.microsoft.com/office/drawing/2014/main" id="{9F42C974-1C95-5A40-97BB-474012B3E83A}"/>
+                <a16:creationId xmlns:a16="http://schemas.microsoft.com/office/drawing/2014/main" xmlns="" id="{9F42C974-1C95-5A40-97BB-474012B3E83A}"/>
               </a:ext>
             </a:extLst>
           </p:cNvPr>
@@ -365,7 +365,7 @@
           <p:cNvPr id="2" name="Title 1">
             <a:extLst>
               <a:ext uri="{FF2B5EF4-FFF2-40B4-BE49-F238E27FC236}">
-                <a16:creationId xmlns:a16="http://schemas.microsoft.com/office/drawing/2014/main" id="{3C42773A-3315-7C42-9CD2-0C51809EFB0C}"/>
+                <a16:creationId xmlns:a16="http://schemas.microsoft.com/office/drawing/2014/main" xmlns="" id="{3C42773A-3315-7C42-9CD2-0C51809EFB0C}"/>
               </a:ext>
             </a:extLst>
           </p:cNvPr>
@@ -393,7 +393,7 @@
           <p:cNvPr id="3" name="Vertical Text Placeholder 2">
             <a:extLst>
               <a:ext uri="{FF2B5EF4-FFF2-40B4-BE49-F238E27FC236}">
-                <a16:creationId xmlns:a16="http://schemas.microsoft.com/office/drawing/2014/main" id="{0360D10F-D967-954F-B251-06C9332FDA06}"/>
+                <a16:creationId xmlns:a16="http://schemas.microsoft.com/office/drawing/2014/main" xmlns="" id="{0360D10F-D967-954F-B251-06C9332FDA06}"/>
               </a:ext>
             </a:extLst>
           </p:cNvPr>
@@ -450,7 +450,7 @@
           <p:cNvPr id="4" name="Date Placeholder 3">
             <a:extLst>
               <a:ext uri="{FF2B5EF4-FFF2-40B4-BE49-F238E27FC236}">
-                <a16:creationId xmlns:a16="http://schemas.microsoft.com/office/drawing/2014/main" id="{E865A395-B965-1349-BBBD-B08C3E71BDD3}"/>
+                <a16:creationId xmlns:a16="http://schemas.microsoft.com/office/drawing/2014/main" xmlns="" id="{E865A395-B965-1349-BBBD-B08C3E71BDD3}"/>
               </a:ext>
             </a:extLst>
           </p:cNvPr>
@@ -468,7 +468,7 @@
           <a:p>
             <a:fld id="{5ABA3254-B489-4843-B477-2A714F347B69}" type="datetimeFigureOut">
               <a:rPr lang="en-US" smtClean="0"/>
-              <a:t>6/12/19</a:t>
+              <a:t>6/17/19</a:t>
             </a:fld>
             <a:endParaRPr lang="en-US"/>
           </a:p>
@@ -479,7 +479,7 @@
           <p:cNvPr id="5" name="Footer Placeholder 4">
             <a:extLst>
               <a:ext uri="{FF2B5EF4-FFF2-40B4-BE49-F238E27FC236}">
-                <a16:creationId xmlns:a16="http://schemas.microsoft.com/office/drawing/2014/main" id="{A2CCDABE-EC2B-B747-9BE5-46F6816B0F9B}"/>
+                <a16:creationId xmlns:a16="http://schemas.microsoft.com/office/drawing/2014/main" xmlns="" id="{A2CCDABE-EC2B-B747-9BE5-46F6816B0F9B}"/>
               </a:ext>
             </a:extLst>
           </p:cNvPr>
@@ -504,7 +504,7 @@
           <p:cNvPr id="6" name="Slide Number Placeholder 5">
             <a:extLst>
               <a:ext uri="{FF2B5EF4-FFF2-40B4-BE49-F238E27FC236}">
-                <a16:creationId xmlns:a16="http://schemas.microsoft.com/office/drawing/2014/main" id="{24CD0E72-F18D-1E4F-8726-E76B4ECDF014}"/>
+                <a16:creationId xmlns:a16="http://schemas.microsoft.com/office/drawing/2014/main" xmlns="" id="{24CD0E72-F18D-1E4F-8726-E76B4ECDF014}"/>
               </a:ext>
             </a:extLst>
           </p:cNvPr>
@@ -563,7 +563,7 @@
           <p:cNvPr id="2" name="Vertical Title 1">
             <a:extLst>
               <a:ext uri="{FF2B5EF4-FFF2-40B4-BE49-F238E27FC236}">
-                <a16:creationId xmlns:a16="http://schemas.microsoft.com/office/drawing/2014/main" id="{380A5EAA-1F4A-BF44-B59C-204C86E9E4CC}"/>
+                <a16:creationId xmlns:a16="http://schemas.microsoft.com/office/drawing/2014/main" xmlns="" id="{380A5EAA-1F4A-BF44-B59C-204C86E9E4CC}"/>
               </a:ext>
             </a:extLst>
           </p:cNvPr>
@@ -596,7 +596,7 @@
           <p:cNvPr id="3" name="Vertical Text Placeholder 2">
             <a:extLst>
               <a:ext uri="{FF2B5EF4-FFF2-40B4-BE49-F238E27FC236}">
-                <a16:creationId xmlns:a16="http://schemas.microsoft.com/office/drawing/2014/main" id="{56F60313-2A5F-954A-905A-0EB700981D2C}"/>
+                <a16:creationId xmlns:a16="http://schemas.microsoft.com/office/drawing/2014/main" xmlns="" id="{56F60313-2A5F-954A-905A-0EB700981D2C}"/>
               </a:ext>
             </a:extLst>
           </p:cNvPr>
@@ -658,7 +658,7 @@
           <p:cNvPr id="4" name="Date Placeholder 3">
             <a:extLst>
               <a:ext uri="{FF2B5EF4-FFF2-40B4-BE49-F238E27FC236}">
-                <a16:creationId xmlns:a16="http://schemas.microsoft.com/office/drawing/2014/main" id="{B07BDBEA-6CB2-A44D-BFF0-1B3A66E16147}"/>
+                <a16:creationId xmlns:a16="http://schemas.microsoft.com/office/drawing/2014/main" xmlns="" id="{B07BDBEA-6CB2-A44D-BFF0-1B3A66E16147}"/>
               </a:ext>
             </a:extLst>
           </p:cNvPr>
@@ -676,7 +676,7 @@
           <a:p>
             <a:fld id="{5ABA3254-B489-4843-B477-2A714F347B69}" type="datetimeFigureOut">
               <a:rPr lang="en-US" smtClean="0"/>
-              <a:t>6/12/19</a:t>
+              <a:t>6/17/19</a:t>
             </a:fld>
             <a:endParaRPr lang="en-US"/>
           </a:p>
@@ -687,7 +687,7 @@
           <p:cNvPr id="5" name="Footer Placeholder 4">
             <a:extLst>
               <a:ext uri="{FF2B5EF4-FFF2-40B4-BE49-F238E27FC236}">
-                <a16:creationId xmlns:a16="http://schemas.microsoft.com/office/drawing/2014/main" id="{6797BECA-1882-A74C-B5A2-5BC2BC74C3A7}"/>
+                <a16:creationId xmlns:a16="http://schemas.microsoft.com/office/drawing/2014/main" xmlns="" id="{6797BECA-1882-A74C-B5A2-5BC2BC74C3A7}"/>
               </a:ext>
             </a:extLst>
           </p:cNvPr>
@@ -712,7 +712,7 @@
           <p:cNvPr id="6" name="Slide Number Placeholder 5">
             <a:extLst>
               <a:ext uri="{FF2B5EF4-FFF2-40B4-BE49-F238E27FC236}">
-                <a16:creationId xmlns:a16="http://schemas.microsoft.com/office/drawing/2014/main" id="{DDFA9C1B-1CAC-2F46-9840-CC9A6F5BFEFE}"/>
+                <a16:creationId xmlns:a16="http://schemas.microsoft.com/office/drawing/2014/main" xmlns="" id="{DDFA9C1B-1CAC-2F46-9840-CC9A6F5BFEFE}"/>
               </a:ext>
             </a:extLst>
           </p:cNvPr>
@@ -771,7 +771,7 @@
           <p:cNvPr id="2" name="Title 1">
             <a:extLst>
               <a:ext uri="{FF2B5EF4-FFF2-40B4-BE49-F238E27FC236}">
-                <a16:creationId xmlns:a16="http://schemas.microsoft.com/office/drawing/2014/main" id="{9DD8CC2F-A0AC-6F42-A5B3-6FAC91387D65}"/>
+                <a16:creationId xmlns:a16="http://schemas.microsoft.com/office/drawing/2014/main" xmlns="" id="{9DD8CC2F-A0AC-6F42-A5B3-6FAC91387D65}"/>
               </a:ext>
             </a:extLst>
           </p:cNvPr>
@@ -799,7 +799,7 @@
           <p:cNvPr id="3" name="Content Placeholder 2">
             <a:extLst>
               <a:ext uri="{FF2B5EF4-FFF2-40B4-BE49-F238E27FC236}">
-                <a16:creationId xmlns:a16="http://schemas.microsoft.com/office/drawing/2014/main" id="{CA40C265-F92B-7147-AD4F-5A57793F6C77}"/>
+                <a16:creationId xmlns:a16="http://schemas.microsoft.com/office/drawing/2014/main" xmlns="" id="{CA40C265-F92B-7147-AD4F-5A57793F6C77}"/>
               </a:ext>
             </a:extLst>
           </p:cNvPr>
@@ -856,7 +856,7 @@
           <p:cNvPr id="4" name="Date Placeholder 3">
             <a:extLst>
               <a:ext uri="{FF2B5EF4-FFF2-40B4-BE49-F238E27FC236}">
-                <a16:creationId xmlns:a16="http://schemas.microsoft.com/office/drawing/2014/main" id="{3D00B741-C2E1-5A49-BEB3-B0FA6EF24065}"/>
+                <a16:creationId xmlns:a16="http://schemas.microsoft.com/office/drawing/2014/main" xmlns="" id="{3D00B741-C2E1-5A49-BEB3-B0FA6EF24065}"/>
               </a:ext>
             </a:extLst>
           </p:cNvPr>
@@ -874,7 +874,7 @@
           <a:p>
             <a:fld id="{5ABA3254-B489-4843-B477-2A714F347B69}" type="datetimeFigureOut">
               <a:rPr lang="en-US" smtClean="0"/>
-              <a:t>6/12/19</a:t>
+              <a:t>6/17/19</a:t>
             </a:fld>
             <a:endParaRPr lang="en-US"/>
           </a:p>
@@ -885,7 +885,7 @@
           <p:cNvPr id="5" name="Footer Placeholder 4">
             <a:extLst>
               <a:ext uri="{FF2B5EF4-FFF2-40B4-BE49-F238E27FC236}">
-                <a16:creationId xmlns:a16="http://schemas.microsoft.com/office/drawing/2014/main" id="{ED68F50B-6DD6-2E45-B161-EB113F1C9DFB}"/>
+                <a16:creationId xmlns:a16="http://schemas.microsoft.com/office/drawing/2014/main" xmlns="" id="{ED68F50B-6DD6-2E45-B161-EB113F1C9DFB}"/>
               </a:ext>
             </a:extLst>
           </p:cNvPr>
@@ -910,7 +910,7 @@
           <p:cNvPr id="6" name="Slide Number Placeholder 5">
             <a:extLst>
               <a:ext uri="{FF2B5EF4-FFF2-40B4-BE49-F238E27FC236}">
-                <a16:creationId xmlns:a16="http://schemas.microsoft.com/office/drawing/2014/main" id="{BAF0CB84-0FC0-F74A-891D-D1DDFD88A7A8}"/>
+                <a16:creationId xmlns:a16="http://schemas.microsoft.com/office/drawing/2014/main" xmlns="" id="{BAF0CB84-0FC0-F74A-891D-D1DDFD88A7A8}"/>
               </a:ext>
             </a:extLst>
           </p:cNvPr>
@@ -969,7 +969,7 @@
           <p:cNvPr id="2" name="Title 1">
             <a:extLst>
               <a:ext uri="{FF2B5EF4-FFF2-40B4-BE49-F238E27FC236}">
-                <a16:creationId xmlns:a16="http://schemas.microsoft.com/office/drawing/2014/main" id="{30B5EA41-5FDE-2B45-87D8-38A821141707}"/>
+                <a16:creationId xmlns:a16="http://schemas.microsoft.com/office/drawing/2014/main" xmlns="" id="{30B5EA41-5FDE-2B45-87D8-38A821141707}"/>
               </a:ext>
             </a:extLst>
           </p:cNvPr>
@@ -1006,7 +1006,7 @@
           <p:cNvPr id="3" name="Text Placeholder 2">
             <a:extLst>
               <a:ext uri="{FF2B5EF4-FFF2-40B4-BE49-F238E27FC236}">
-                <a16:creationId xmlns:a16="http://schemas.microsoft.com/office/drawing/2014/main" id="{6411D638-A6E2-974C-82CE-4CCD812AE85B}"/>
+                <a16:creationId xmlns:a16="http://schemas.microsoft.com/office/drawing/2014/main" xmlns="" id="{6411D638-A6E2-974C-82CE-4CCD812AE85B}"/>
               </a:ext>
             </a:extLst>
           </p:cNvPr>
@@ -1131,7 +1131,7 @@
           <p:cNvPr id="4" name="Date Placeholder 3">
             <a:extLst>
               <a:ext uri="{FF2B5EF4-FFF2-40B4-BE49-F238E27FC236}">
-                <a16:creationId xmlns:a16="http://schemas.microsoft.com/office/drawing/2014/main" id="{89CB8E67-DD45-A34A-9774-1E9DA5AAF028}"/>
+                <a16:creationId xmlns:a16="http://schemas.microsoft.com/office/drawing/2014/main" xmlns="" id="{89CB8E67-DD45-A34A-9774-1E9DA5AAF028}"/>
               </a:ext>
             </a:extLst>
           </p:cNvPr>
@@ -1149,7 +1149,7 @@
           <a:p>
             <a:fld id="{5ABA3254-B489-4843-B477-2A714F347B69}" type="datetimeFigureOut">
               <a:rPr lang="en-US" smtClean="0"/>
-              <a:t>6/12/19</a:t>
+              <a:t>6/17/19</a:t>
             </a:fld>
             <a:endParaRPr lang="en-US"/>
           </a:p>
@@ -1160,7 +1160,7 @@
           <p:cNvPr id="5" name="Footer Placeholder 4">
             <a:extLst>
               <a:ext uri="{FF2B5EF4-FFF2-40B4-BE49-F238E27FC236}">
-                <a16:creationId xmlns:a16="http://schemas.microsoft.com/office/drawing/2014/main" id="{D5DF1D53-0B16-A14E-897F-2CEA940F8781}"/>
+                <a16:creationId xmlns:a16="http://schemas.microsoft.com/office/drawing/2014/main" xmlns="" id="{D5DF1D53-0B16-A14E-897F-2CEA940F8781}"/>
               </a:ext>
             </a:extLst>
           </p:cNvPr>
@@ -1185,7 +1185,7 @@
           <p:cNvPr id="6" name="Slide Number Placeholder 5">
             <a:extLst>
               <a:ext uri="{FF2B5EF4-FFF2-40B4-BE49-F238E27FC236}">
-                <a16:creationId xmlns:a16="http://schemas.microsoft.com/office/drawing/2014/main" id="{FD1E3BEB-AB7E-CE48-A381-8A8B12C87575}"/>
+                <a16:creationId xmlns:a16="http://schemas.microsoft.com/office/drawing/2014/main" xmlns="" id="{FD1E3BEB-AB7E-CE48-A381-8A8B12C87575}"/>
               </a:ext>
             </a:extLst>
           </p:cNvPr>
@@ -1244,7 +1244,7 @@
           <p:cNvPr id="2" name="Title 1">
             <a:extLst>
               <a:ext uri="{FF2B5EF4-FFF2-40B4-BE49-F238E27FC236}">
-                <a16:creationId xmlns:a16="http://schemas.microsoft.com/office/drawing/2014/main" id="{2C25064D-E824-6843-9892-42DF23B13657}"/>
+                <a16:creationId xmlns:a16="http://schemas.microsoft.com/office/drawing/2014/main" xmlns="" id="{2C25064D-E824-6843-9892-42DF23B13657}"/>
               </a:ext>
             </a:extLst>
           </p:cNvPr>
@@ -1272,7 +1272,7 @@
           <p:cNvPr id="3" name="Content Placeholder 2">
             <a:extLst>
               <a:ext uri="{FF2B5EF4-FFF2-40B4-BE49-F238E27FC236}">
-                <a16:creationId xmlns:a16="http://schemas.microsoft.com/office/drawing/2014/main" id="{C6863E1A-3EDA-464D-9DD0-A92E62639992}"/>
+                <a16:creationId xmlns:a16="http://schemas.microsoft.com/office/drawing/2014/main" xmlns="" id="{C6863E1A-3EDA-464D-9DD0-A92E62639992}"/>
               </a:ext>
             </a:extLst>
           </p:cNvPr>
@@ -1334,7 +1334,7 @@
           <p:cNvPr id="4" name="Content Placeholder 3">
             <a:extLst>
               <a:ext uri="{FF2B5EF4-FFF2-40B4-BE49-F238E27FC236}">
-                <a16:creationId xmlns:a16="http://schemas.microsoft.com/office/drawing/2014/main" id="{DD4F140C-652B-F14B-970B-7585B3C35E24}"/>
+                <a16:creationId xmlns:a16="http://schemas.microsoft.com/office/drawing/2014/main" xmlns="" id="{DD4F140C-652B-F14B-970B-7585B3C35E24}"/>
               </a:ext>
             </a:extLst>
           </p:cNvPr>
@@ -1396,7 +1396,7 @@
           <p:cNvPr id="5" name="Date Placeholder 4">
             <a:extLst>
               <a:ext uri="{FF2B5EF4-FFF2-40B4-BE49-F238E27FC236}">
-                <a16:creationId xmlns:a16="http://schemas.microsoft.com/office/drawing/2014/main" id="{E904FA2D-24B9-4145-B8EF-79CF8975848B}"/>
+                <a16:creationId xmlns:a16="http://schemas.microsoft.com/office/drawing/2014/main" xmlns="" id="{E904FA2D-24B9-4145-B8EF-79CF8975848B}"/>
               </a:ext>
             </a:extLst>
           </p:cNvPr>
@@ -1414,7 +1414,7 @@
           <a:p>
             <a:fld id="{5ABA3254-B489-4843-B477-2A714F347B69}" type="datetimeFigureOut">
               <a:rPr lang="en-US" smtClean="0"/>
-              <a:t>6/12/19</a:t>
+              <a:t>6/17/19</a:t>
             </a:fld>
             <a:endParaRPr lang="en-US"/>
           </a:p>
@@ -1425,7 +1425,7 @@
           <p:cNvPr id="6" name="Footer Placeholder 5">
             <a:extLst>
               <a:ext uri="{FF2B5EF4-FFF2-40B4-BE49-F238E27FC236}">
-                <a16:creationId xmlns:a16="http://schemas.microsoft.com/office/drawing/2014/main" id="{B92D6AA4-CF1E-3849-ACD9-8A35130F1D5F}"/>
+                <a16:creationId xmlns:a16="http://schemas.microsoft.com/office/drawing/2014/main" xmlns="" id="{B92D6AA4-CF1E-3849-ACD9-8A35130F1D5F}"/>
               </a:ext>
             </a:extLst>
           </p:cNvPr>
@@ -1450,7 +1450,7 @@
           <p:cNvPr id="7" name="Slide Number Placeholder 6">
             <a:extLst>
               <a:ext uri="{FF2B5EF4-FFF2-40B4-BE49-F238E27FC236}">
-                <a16:creationId xmlns:a16="http://schemas.microsoft.com/office/drawing/2014/main" id="{9CE965F4-3ED3-2546-9DE5-BEA3CD9C50BA}"/>
+                <a16:creationId xmlns:a16="http://schemas.microsoft.com/office/drawing/2014/main" xmlns="" id="{9CE965F4-3ED3-2546-9DE5-BEA3CD9C50BA}"/>
               </a:ext>
             </a:extLst>
           </p:cNvPr>
@@ -1509,7 +1509,7 @@
           <p:cNvPr id="2" name="Title 1">
             <a:extLst>
               <a:ext uri="{FF2B5EF4-FFF2-40B4-BE49-F238E27FC236}">
-                <a16:creationId xmlns:a16="http://schemas.microsoft.com/office/drawing/2014/main" id="{EFA81E5A-B83A-9743-8AD1-16DF33DDB538}"/>
+                <a16:creationId xmlns:a16="http://schemas.microsoft.com/office/drawing/2014/main" xmlns="" id="{EFA81E5A-B83A-9743-8AD1-16DF33DDB538}"/>
               </a:ext>
             </a:extLst>
           </p:cNvPr>
@@ -1542,7 +1542,7 @@
           <p:cNvPr id="3" name="Text Placeholder 2">
             <a:extLst>
               <a:ext uri="{FF2B5EF4-FFF2-40B4-BE49-F238E27FC236}">
-                <a16:creationId xmlns:a16="http://schemas.microsoft.com/office/drawing/2014/main" id="{AB3A7B6A-FF95-6947-A72B-B35505A352A5}"/>
+                <a16:creationId xmlns:a16="http://schemas.microsoft.com/office/drawing/2014/main" xmlns="" id="{AB3A7B6A-FF95-6947-A72B-B35505A352A5}"/>
               </a:ext>
             </a:extLst>
           </p:cNvPr>
@@ -1613,7 +1613,7 @@
           <p:cNvPr id="4" name="Content Placeholder 3">
             <a:extLst>
               <a:ext uri="{FF2B5EF4-FFF2-40B4-BE49-F238E27FC236}">
-                <a16:creationId xmlns:a16="http://schemas.microsoft.com/office/drawing/2014/main" id="{1958C3B1-BA94-9F4C-8A42-B8D9A4E8DC30}"/>
+                <a16:creationId xmlns:a16="http://schemas.microsoft.com/office/drawing/2014/main" xmlns="" id="{1958C3B1-BA94-9F4C-8A42-B8D9A4E8DC30}"/>
               </a:ext>
             </a:extLst>
           </p:cNvPr>
@@ -1675,7 +1675,7 @@
           <p:cNvPr id="5" name="Text Placeholder 4">
             <a:extLst>
               <a:ext uri="{FF2B5EF4-FFF2-40B4-BE49-F238E27FC236}">
-                <a16:creationId xmlns:a16="http://schemas.microsoft.com/office/drawing/2014/main" id="{C8D451D4-A9CE-4044-81F1-27E9472B572E}"/>
+                <a16:creationId xmlns:a16="http://schemas.microsoft.com/office/drawing/2014/main" xmlns="" id="{C8D451D4-A9CE-4044-81F1-27E9472B572E}"/>
               </a:ext>
             </a:extLst>
           </p:cNvPr>
@@ -1746,7 +1746,7 @@
           <p:cNvPr id="6" name="Content Placeholder 5">
             <a:extLst>
               <a:ext uri="{FF2B5EF4-FFF2-40B4-BE49-F238E27FC236}">
-                <a16:creationId xmlns:a16="http://schemas.microsoft.com/office/drawing/2014/main" id="{88630A18-ACD9-BF4F-BE9D-65608DB1A94F}"/>
+                <a16:creationId xmlns:a16="http://schemas.microsoft.com/office/drawing/2014/main" xmlns="" id="{88630A18-ACD9-BF4F-BE9D-65608DB1A94F}"/>
               </a:ext>
             </a:extLst>
           </p:cNvPr>
@@ -1808,7 +1808,7 @@
           <p:cNvPr id="7" name="Date Placeholder 6">
             <a:extLst>
               <a:ext uri="{FF2B5EF4-FFF2-40B4-BE49-F238E27FC236}">
-                <a16:creationId xmlns:a16="http://schemas.microsoft.com/office/drawing/2014/main" id="{A98EF4F2-723F-AB4A-8B8D-BE4F356F9636}"/>
+                <a16:creationId xmlns:a16="http://schemas.microsoft.com/office/drawing/2014/main" xmlns="" id="{A98EF4F2-723F-AB4A-8B8D-BE4F356F9636}"/>
               </a:ext>
             </a:extLst>
           </p:cNvPr>
@@ -1826,7 +1826,7 @@
           <a:p>
             <a:fld id="{5ABA3254-B489-4843-B477-2A714F347B69}" type="datetimeFigureOut">
               <a:rPr lang="en-US" smtClean="0"/>
-              <a:t>6/12/19</a:t>
+              <a:t>6/17/19</a:t>
             </a:fld>
             <a:endParaRPr lang="en-US"/>
           </a:p>
@@ -1837,7 +1837,7 @@
           <p:cNvPr id="8" name="Footer Placeholder 7">
             <a:extLst>
               <a:ext uri="{FF2B5EF4-FFF2-40B4-BE49-F238E27FC236}">
-                <a16:creationId xmlns:a16="http://schemas.microsoft.com/office/drawing/2014/main" id="{53A33998-EC90-8E49-9762-A9E3CD399C5F}"/>
+                <a16:creationId xmlns:a16="http://schemas.microsoft.com/office/drawing/2014/main" xmlns="" id="{53A33998-EC90-8E49-9762-A9E3CD399C5F}"/>
               </a:ext>
             </a:extLst>
           </p:cNvPr>
@@ -1862,7 +1862,7 @@
           <p:cNvPr id="9" name="Slide Number Placeholder 8">
             <a:extLst>
               <a:ext uri="{FF2B5EF4-FFF2-40B4-BE49-F238E27FC236}">
-                <a16:creationId xmlns:a16="http://schemas.microsoft.com/office/drawing/2014/main" id="{E0791420-CCEB-6641-98A0-805AB5F65B9C}"/>
+                <a16:creationId xmlns:a16="http://schemas.microsoft.com/office/drawing/2014/main" xmlns="" id="{E0791420-CCEB-6641-98A0-805AB5F65B9C}"/>
               </a:ext>
             </a:extLst>
           </p:cNvPr>
@@ -1921,7 +1921,7 @@
           <p:cNvPr id="2" name="Title 1">
             <a:extLst>
               <a:ext uri="{FF2B5EF4-FFF2-40B4-BE49-F238E27FC236}">
-                <a16:creationId xmlns:a16="http://schemas.microsoft.com/office/drawing/2014/main" id="{1763BCAC-73D9-1744-8C70-C8CBAE55D42C}"/>
+                <a16:creationId xmlns:a16="http://schemas.microsoft.com/office/drawing/2014/main" xmlns="" id="{1763BCAC-73D9-1744-8C70-C8CBAE55D42C}"/>
               </a:ext>
             </a:extLst>
           </p:cNvPr>
@@ -1949,7 +1949,7 @@
           <p:cNvPr id="3" name="Date Placeholder 2">
             <a:extLst>
               <a:ext uri="{FF2B5EF4-FFF2-40B4-BE49-F238E27FC236}">
-                <a16:creationId xmlns:a16="http://schemas.microsoft.com/office/drawing/2014/main" id="{A6D72BCF-51EA-CC43-A12C-74746F85A8E3}"/>
+                <a16:creationId xmlns:a16="http://schemas.microsoft.com/office/drawing/2014/main" xmlns="" id="{A6D72BCF-51EA-CC43-A12C-74746F85A8E3}"/>
               </a:ext>
             </a:extLst>
           </p:cNvPr>
@@ -1967,7 +1967,7 @@
           <a:p>
             <a:fld id="{5ABA3254-B489-4843-B477-2A714F347B69}" type="datetimeFigureOut">
               <a:rPr lang="en-US" smtClean="0"/>
-              <a:t>6/12/19</a:t>
+              <a:t>6/17/19</a:t>
             </a:fld>
             <a:endParaRPr lang="en-US"/>
           </a:p>
@@ -1978,7 +1978,7 @@
           <p:cNvPr id="4" name="Footer Placeholder 3">
             <a:extLst>
               <a:ext uri="{FF2B5EF4-FFF2-40B4-BE49-F238E27FC236}">
-                <a16:creationId xmlns:a16="http://schemas.microsoft.com/office/drawing/2014/main" id="{6259A4F2-9E96-1246-B33D-2EB0C5ABFE6C}"/>
+                <a16:creationId xmlns:a16="http://schemas.microsoft.com/office/drawing/2014/main" xmlns="" id="{6259A4F2-9E96-1246-B33D-2EB0C5ABFE6C}"/>
               </a:ext>
             </a:extLst>
           </p:cNvPr>
@@ -2003,7 +2003,7 @@
           <p:cNvPr id="5" name="Slide Number Placeholder 4">
             <a:extLst>
               <a:ext uri="{FF2B5EF4-FFF2-40B4-BE49-F238E27FC236}">
-                <a16:creationId xmlns:a16="http://schemas.microsoft.com/office/drawing/2014/main" id="{4BECC60F-C85C-F742-88C7-71DB76FE6476}"/>
+                <a16:creationId xmlns:a16="http://schemas.microsoft.com/office/drawing/2014/main" xmlns="" id="{4BECC60F-C85C-F742-88C7-71DB76FE6476}"/>
               </a:ext>
             </a:extLst>
           </p:cNvPr>
@@ -2062,7 +2062,7 @@
           <p:cNvPr id="2" name="Date Placeholder 1">
             <a:extLst>
               <a:ext uri="{FF2B5EF4-FFF2-40B4-BE49-F238E27FC236}">
-                <a16:creationId xmlns:a16="http://schemas.microsoft.com/office/drawing/2014/main" id="{634522C3-8AB8-324D-9C20-A229A61C830A}"/>
+                <a16:creationId xmlns:a16="http://schemas.microsoft.com/office/drawing/2014/main" xmlns="" id="{634522C3-8AB8-324D-9C20-A229A61C830A}"/>
               </a:ext>
             </a:extLst>
           </p:cNvPr>
@@ -2080,7 +2080,7 @@
           <a:p>
             <a:fld id="{5ABA3254-B489-4843-B477-2A714F347B69}" type="datetimeFigureOut">
               <a:rPr lang="en-US" smtClean="0"/>
-              <a:t>6/12/19</a:t>
+              <a:t>6/17/19</a:t>
             </a:fld>
             <a:endParaRPr lang="en-US"/>
           </a:p>
@@ -2091,7 +2091,7 @@
           <p:cNvPr id="3" name="Footer Placeholder 2">
             <a:extLst>
               <a:ext uri="{FF2B5EF4-FFF2-40B4-BE49-F238E27FC236}">
-                <a16:creationId xmlns:a16="http://schemas.microsoft.com/office/drawing/2014/main" id="{CB311891-0D5F-FF4C-BD44-8D275A59319E}"/>
+                <a16:creationId xmlns:a16="http://schemas.microsoft.com/office/drawing/2014/main" xmlns="" id="{CB311891-0D5F-FF4C-BD44-8D275A59319E}"/>
               </a:ext>
             </a:extLst>
           </p:cNvPr>
@@ -2116,7 +2116,7 @@
           <p:cNvPr id="4" name="Slide Number Placeholder 3">
             <a:extLst>
               <a:ext uri="{FF2B5EF4-FFF2-40B4-BE49-F238E27FC236}">
-                <a16:creationId xmlns:a16="http://schemas.microsoft.com/office/drawing/2014/main" id="{14A1D56F-8F34-5048-BD62-57BC3DF62284}"/>
+                <a16:creationId xmlns:a16="http://schemas.microsoft.com/office/drawing/2014/main" xmlns="" id="{14A1D56F-8F34-5048-BD62-57BC3DF62284}"/>
               </a:ext>
             </a:extLst>
           </p:cNvPr>
@@ -2175,7 +2175,7 @@
           <p:cNvPr id="2" name="Title 1">
             <a:extLst>
               <a:ext uri="{FF2B5EF4-FFF2-40B4-BE49-F238E27FC236}">
-                <a16:creationId xmlns:a16="http://schemas.microsoft.com/office/drawing/2014/main" id="{2490868E-B30C-F84F-818F-5D26F0A01086}"/>
+                <a16:creationId xmlns:a16="http://schemas.microsoft.com/office/drawing/2014/main" xmlns="" id="{2490868E-B30C-F84F-818F-5D26F0A01086}"/>
               </a:ext>
             </a:extLst>
           </p:cNvPr>
@@ -2212,7 +2212,7 @@
           <p:cNvPr id="3" name="Content Placeholder 2">
             <a:extLst>
               <a:ext uri="{FF2B5EF4-FFF2-40B4-BE49-F238E27FC236}">
-                <a16:creationId xmlns:a16="http://schemas.microsoft.com/office/drawing/2014/main" id="{8396DD86-5C93-4042-8D78-18D805AE43CC}"/>
+                <a16:creationId xmlns:a16="http://schemas.microsoft.com/office/drawing/2014/main" xmlns="" id="{8396DD86-5C93-4042-8D78-18D805AE43CC}"/>
               </a:ext>
             </a:extLst>
           </p:cNvPr>
@@ -2302,7 +2302,7 @@
           <p:cNvPr id="4" name="Text Placeholder 3">
             <a:extLst>
               <a:ext uri="{FF2B5EF4-FFF2-40B4-BE49-F238E27FC236}">
-                <a16:creationId xmlns:a16="http://schemas.microsoft.com/office/drawing/2014/main" id="{E1895CFD-5D68-F149-A036-284C0C636263}"/>
+                <a16:creationId xmlns:a16="http://schemas.microsoft.com/office/drawing/2014/main" xmlns="" id="{E1895CFD-5D68-F149-A036-284C0C636263}"/>
               </a:ext>
             </a:extLst>
           </p:cNvPr>
@@ -2373,7 +2373,7 @@
           <p:cNvPr id="5" name="Date Placeholder 4">
             <a:extLst>
               <a:ext uri="{FF2B5EF4-FFF2-40B4-BE49-F238E27FC236}">
-                <a16:creationId xmlns:a16="http://schemas.microsoft.com/office/drawing/2014/main" id="{2F10D2B9-53A3-6C4D-9421-95BC264EFE03}"/>
+                <a16:creationId xmlns:a16="http://schemas.microsoft.com/office/drawing/2014/main" xmlns="" id="{2F10D2B9-53A3-6C4D-9421-95BC264EFE03}"/>
               </a:ext>
             </a:extLst>
           </p:cNvPr>
@@ -2391,7 +2391,7 @@
           <a:p>
             <a:fld id="{5ABA3254-B489-4843-B477-2A714F347B69}" type="datetimeFigureOut">
               <a:rPr lang="en-US" smtClean="0"/>
-              <a:t>6/12/19</a:t>
+              <a:t>6/17/19</a:t>
             </a:fld>
             <a:endParaRPr lang="en-US"/>
           </a:p>
@@ -2402,7 +2402,7 @@
           <p:cNvPr id="6" name="Footer Placeholder 5">
             <a:extLst>
               <a:ext uri="{FF2B5EF4-FFF2-40B4-BE49-F238E27FC236}">
-                <a16:creationId xmlns:a16="http://schemas.microsoft.com/office/drawing/2014/main" id="{C21EDC9F-D44F-D54D-82EC-336BDB181C01}"/>
+                <a16:creationId xmlns:a16="http://schemas.microsoft.com/office/drawing/2014/main" xmlns="" id="{C21EDC9F-D44F-D54D-82EC-336BDB181C01}"/>
               </a:ext>
             </a:extLst>
           </p:cNvPr>
@@ -2427,7 +2427,7 @@
           <p:cNvPr id="7" name="Slide Number Placeholder 6">
             <a:extLst>
               <a:ext uri="{FF2B5EF4-FFF2-40B4-BE49-F238E27FC236}">
-                <a16:creationId xmlns:a16="http://schemas.microsoft.com/office/drawing/2014/main" id="{C049BCEB-B9D7-7A4F-A90A-D8999A62C201}"/>
+                <a16:creationId xmlns:a16="http://schemas.microsoft.com/office/drawing/2014/main" xmlns="" id="{C049BCEB-B9D7-7A4F-A90A-D8999A62C201}"/>
               </a:ext>
             </a:extLst>
           </p:cNvPr>
@@ -2486,7 +2486,7 @@
           <p:cNvPr id="2" name="Title 1">
             <a:extLst>
               <a:ext uri="{FF2B5EF4-FFF2-40B4-BE49-F238E27FC236}">
-                <a16:creationId xmlns:a16="http://schemas.microsoft.com/office/drawing/2014/main" id="{D84654FD-9FBF-B24E-9B95-0FDF71771D10}"/>
+                <a16:creationId xmlns:a16="http://schemas.microsoft.com/office/drawing/2014/main" xmlns="" id="{D84654FD-9FBF-B24E-9B95-0FDF71771D10}"/>
               </a:ext>
             </a:extLst>
           </p:cNvPr>
@@ -2523,7 +2523,7 @@
           <p:cNvPr id="3" name="Picture Placeholder 2">
             <a:extLst>
               <a:ext uri="{FF2B5EF4-FFF2-40B4-BE49-F238E27FC236}">
-                <a16:creationId xmlns:a16="http://schemas.microsoft.com/office/drawing/2014/main" id="{7673914A-7239-6342-A04F-56C3DE95F837}"/>
+                <a16:creationId xmlns:a16="http://schemas.microsoft.com/office/drawing/2014/main" xmlns="" id="{7673914A-7239-6342-A04F-56C3DE95F837}"/>
               </a:ext>
             </a:extLst>
           </p:cNvPr>
@@ -2590,7 +2590,7 @@
           <p:cNvPr id="4" name="Text Placeholder 3">
             <a:extLst>
               <a:ext uri="{FF2B5EF4-FFF2-40B4-BE49-F238E27FC236}">
-                <a16:creationId xmlns:a16="http://schemas.microsoft.com/office/drawing/2014/main" id="{6F6CAD0E-F4C6-454E-9D1B-3CFA6B32A7A1}"/>
+                <a16:creationId xmlns:a16="http://schemas.microsoft.com/office/drawing/2014/main" xmlns="" id="{6F6CAD0E-F4C6-454E-9D1B-3CFA6B32A7A1}"/>
               </a:ext>
             </a:extLst>
           </p:cNvPr>
@@ -2661,7 +2661,7 @@
           <p:cNvPr id="5" name="Date Placeholder 4">
             <a:extLst>
               <a:ext uri="{FF2B5EF4-FFF2-40B4-BE49-F238E27FC236}">
-                <a16:creationId xmlns:a16="http://schemas.microsoft.com/office/drawing/2014/main" id="{F2B5156A-22C6-9146-A330-B1A0EAB948B4}"/>
+                <a16:creationId xmlns:a16="http://schemas.microsoft.com/office/drawing/2014/main" xmlns="" id="{F2B5156A-22C6-9146-A330-B1A0EAB948B4}"/>
               </a:ext>
             </a:extLst>
           </p:cNvPr>
@@ -2679,7 +2679,7 @@
           <a:p>
             <a:fld id="{5ABA3254-B489-4843-B477-2A714F347B69}" type="datetimeFigureOut">
               <a:rPr lang="en-US" smtClean="0"/>
-              <a:t>6/12/19</a:t>
+              <a:t>6/17/19</a:t>
             </a:fld>
             <a:endParaRPr lang="en-US"/>
           </a:p>
@@ -2690,7 +2690,7 @@
           <p:cNvPr id="6" name="Footer Placeholder 5">
             <a:extLst>
               <a:ext uri="{FF2B5EF4-FFF2-40B4-BE49-F238E27FC236}">
-                <a16:creationId xmlns:a16="http://schemas.microsoft.com/office/drawing/2014/main" id="{7CB0B758-C711-3342-8F3F-0557350A06AD}"/>
+                <a16:creationId xmlns:a16="http://schemas.microsoft.com/office/drawing/2014/main" xmlns="" id="{7CB0B758-C711-3342-8F3F-0557350A06AD}"/>
               </a:ext>
             </a:extLst>
           </p:cNvPr>
@@ -2715,7 +2715,7 @@
           <p:cNvPr id="7" name="Slide Number Placeholder 6">
             <a:extLst>
               <a:ext uri="{FF2B5EF4-FFF2-40B4-BE49-F238E27FC236}">
-                <a16:creationId xmlns:a16="http://schemas.microsoft.com/office/drawing/2014/main" id="{661C1686-D4FC-E249-931B-4551D84A9607}"/>
+                <a16:creationId xmlns:a16="http://schemas.microsoft.com/office/drawing/2014/main" xmlns="" id="{661C1686-D4FC-E249-931B-4551D84A9607}"/>
               </a:ext>
             </a:extLst>
           </p:cNvPr>
@@ -2779,7 +2779,7 @@
           <p:cNvPr id="2" name="Title Placeholder 1">
             <a:extLst>
               <a:ext uri="{FF2B5EF4-FFF2-40B4-BE49-F238E27FC236}">
-                <a16:creationId xmlns:a16="http://schemas.microsoft.com/office/drawing/2014/main" id="{002D196D-98E6-A54E-B2DA-4879687B9EC4}"/>
+                <a16:creationId xmlns:a16="http://schemas.microsoft.com/office/drawing/2014/main" xmlns="" id="{002D196D-98E6-A54E-B2DA-4879687B9EC4}"/>
               </a:ext>
             </a:extLst>
           </p:cNvPr>
@@ -2817,7 +2817,7 @@
           <p:cNvPr id="3" name="Text Placeholder 2">
             <a:extLst>
               <a:ext uri="{FF2B5EF4-FFF2-40B4-BE49-F238E27FC236}">
-                <a16:creationId xmlns:a16="http://schemas.microsoft.com/office/drawing/2014/main" id="{E64802B9-6595-E74F-833A-6683C3A86852}"/>
+                <a16:creationId xmlns:a16="http://schemas.microsoft.com/office/drawing/2014/main" xmlns="" id="{E64802B9-6595-E74F-833A-6683C3A86852}"/>
               </a:ext>
             </a:extLst>
           </p:cNvPr>
@@ -2884,7 +2884,7 @@
           <p:cNvPr id="4" name="Date Placeholder 3">
             <a:extLst>
               <a:ext uri="{FF2B5EF4-FFF2-40B4-BE49-F238E27FC236}">
-                <a16:creationId xmlns:a16="http://schemas.microsoft.com/office/drawing/2014/main" id="{E510DE16-AAAD-8847-A304-AEE715D19096}"/>
+                <a16:creationId xmlns:a16="http://schemas.microsoft.com/office/drawing/2014/main" xmlns="" id="{E510DE16-AAAD-8847-A304-AEE715D19096}"/>
               </a:ext>
             </a:extLst>
           </p:cNvPr>
@@ -2920,7 +2920,7 @@
           <a:p>
             <a:fld id="{5ABA3254-B489-4843-B477-2A714F347B69}" type="datetimeFigureOut">
               <a:rPr lang="en-US" smtClean="0"/>
-              <a:t>6/12/19</a:t>
+              <a:t>6/17/19</a:t>
             </a:fld>
             <a:endParaRPr lang="en-US"/>
           </a:p>
@@ -2931,7 +2931,7 @@
           <p:cNvPr id="5" name="Footer Placeholder 4">
             <a:extLst>
               <a:ext uri="{FF2B5EF4-FFF2-40B4-BE49-F238E27FC236}">
-                <a16:creationId xmlns:a16="http://schemas.microsoft.com/office/drawing/2014/main" id="{72908C26-1615-FF49-8AFA-9BFD6C3A7DDF}"/>
+                <a16:creationId xmlns:a16="http://schemas.microsoft.com/office/drawing/2014/main" xmlns="" id="{72908C26-1615-FF49-8AFA-9BFD6C3A7DDF}"/>
               </a:ext>
             </a:extLst>
           </p:cNvPr>
@@ -2974,7 +2974,7 @@
           <p:cNvPr id="6" name="Slide Number Placeholder 5">
             <a:extLst>
               <a:ext uri="{FF2B5EF4-FFF2-40B4-BE49-F238E27FC236}">
-                <a16:creationId xmlns:a16="http://schemas.microsoft.com/office/drawing/2014/main" id="{16AEB5C6-AD59-C64B-831F-3C145495F6F9}"/>
+                <a16:creationId xmlns:a16="http://schemas.microsoft.com/office/drawing/2014/main" xmlns="" id="{16AEB5C6-AD59-C64B-831F-3C145495F6F9}"/>
               </a:ext>
             </a:extLst>
           </p:cNvPr>
@@ -3342,7 +3342,7 @@
           <p:cNvPr id="2" name="Title 1">
             <a:extLst>
               <a:ext uri="{FF2B5EF4-FFF2-40B4-BE49-F238E27FC236}">
-                <a16:creationId xmlns:a16="http://schemas.microsoft.com/office/drawing/2014/main" id="{63BD5425-3FB8-0B4A-8AC0-F36FA9F68A76}"/>
+                <a16:creationId xmlns:a16="http://schemas.microsoft.com/office/drawing/2014/main" xmlns="" id="{63BD5425-3FB8-0B4A-8AC0-F36FA9F68A76}"/>
               </a:ext>
             </a:extLst>
           </p:cNvPr>
@@ -3402,7 +3402,7 @@
           <p:cNvPr id="3" name="Subtitle 2">
             <a:extLst>
               <a:ext uri="{FF2B5EF4-FFF2-40B4-BE49-F238E27FC236}">
-                <a16:creationId xmlns:a16="http://schemas.microsoft.com/office/drawing/2014/main" id="{DEE00755-EA17-3846-AAEC-8098B94487E9}"/>
+                <a16:creationId xmlns:a16="http://schemas.microsoft.com/office/drawing/2014/main" xmlns="" id="{DEE00755-EA17-3846-AAEC-8098B94487E9}"/>
               </a:ext>
             </a:extLst>
           </p:cNvPr>
@@ -3470,7 +3470,7 @@
           <p:cNvPr id="2" name="Title 1">
             <a:extLst>
               <a:ext uri="{FF2B5EF4-FFF2-40B4-BE49-F238E27FC236}">
-                <a16:creationId xmlns:a16="http://schemas.microsoft.com/office/drawing/2014/main" id="{7BE77B59-C9EF-874C-9CFE-F5B1073F2767}"/>
+                <a16:creationId xmlns:a16="http://schemas.microsoft.com/office/drawing/2014/main" xmlns="" id="{7BE77B59-C9EF-874C-9CFE-F5B1073F2767}"/>
               </a:ext>
             </a:extLst>
           </p:cNvPr>
@@ -3526,6 +3526,30 @@
           </a:p>
         </p:txBody>
       </p:sp>
+      <p:pic>
+        <p:nvPicPr>
+          <p:cNvPr id="3" name="Picture 2"/>
+          <p:cNvPicPr>
+            <a:picLocks noChangeAspect="1"/>
+          </p:cNvPicPr>
+          <p:nvPr/>
+        </p:nvPicPr>
+        <p:blipFill>
+          <a:blip r:embed="rId2"/>
+          <a:stretch>
+            <a:fillRect/>
+          </a:stretch>
+        </p:blipFill>
+        <p:spPr>
+          <a:xfrm>
+            <a:off x="3771900" y="1690688"/>
+            <a:ext cx="3343442" cy="4932947"/>
+          </a:xfrm>
+          <a:prstGeom prst="rect">
+            <a:avLst/>
+          </a:prstGeom>
+        </p:spPr>
+      </p:pic>
     </p:spTree>
     <p:extLst>
       <p:ext uri="{BB962C8B-B14F-4D97-AF65-F5344CB8AC3E}">
@@ -3561,7 +3585,7 @@
           <p:cNvPr id="2" name="Title 1">
             <a:extLst>
               <a:ext uri="{FF2B5EF4-FFF2-40B4-BE49-F238E27FC236}">
-                <a16:creationId xmlns:a16="http://schemas.microsoft.com/office/drawing/2014/main" id="{7BE77B59-C9EF-874C-9CFE-F5B1073F2767}"/>
+                <a16:creationId xmlns:a16="http://schemas.microsoft.com/office/drawing/2014/main" xmlns="" id="{7BE77B59-C9EF-874C-9CFE-F5B1073F2767}"/>
               </a:ext>
             </a:extLst>
           </p:cNvPr>
@@ -3617,6 +3641,30 @@
           </a:p>
         </p:txBody>
       </p:sp>
+      <p:pic>
+        <p:nvPicPr>
+          <p:cNvPr id="3" name="Picture 2"/>
+          <p:cNvPicPr>
+            <a:picLocks noChangeAspect="1"/>
+          </p:cNvPicPr>
+          <p:nvPr/>
+        </p:nvPicPr>
+        <p:blipFill>
+          <a:blip r:embed="rId2"/>
+          <a:stretch>
+            <a:fillRect/>
+          </a:stretch>
+        </p:blipFill>
+        <p:spPr>
+          <a:xfrm>
+            <a:off x="2659312" y="1525886"/>
+            <a:ext cx="5919203" cy="5127577"/>
+          </a:xfrm>
+          <a:prstGeom prst="rect">
+            <a:avLst/>
+          </a:prstGeom>
+        </p:spPr>
+      </p:pic>
     </p:spTree>
     <p:extLst>
       <p:ext uri="{BB962C8B-B14F-4D97-AF65-F5344CB8AC3E}">
@@ -3652,7 +3700,7 @@
           <p:cNvPr id="2" name="Title 1">
             <a:extLst>
               <a:ext uri="{FF2B5EF4-FFF2-40B4-BE49-F238E27FC236}">
-                <a16:creationId xmlns:a16="http://schemas.microsoft.com/office/drawing/2014/main" id="{7BE77B59-C9EF-874C-9CFE-F5B1073F2767}"/>
+                <a16:creationId xmlns:a16="http://schemas.microsoft.com/office/drawing/2014/main" xmlns="" id="{7BE77B59-C9EF-874C-9CFE-F5B1073F2767}"/>
               </a:ext>
             </a:extLst>
           </p:cNvPr>
@@ -3684,6 +3732,36 @@
           </a:p>
         </p:txBody>
       </p:sp>
+      <p:pic>
+        <p:nvPicPr>
+          <p:cNvPr id="3" name="Picture 2"/>
+          <p:cNvPicPr>
+            <a:picLocks noChangeAspect="1"/>
+          </p:cNvPicPr>
+          <p:nvPr/>
+        </p:nvPicPr>
+        <p:blipFill>
+          <a:blip r:embed="rId2">
+            <a:extLst>
+              <a:ext uri="{28A0092B-C50C-407E-A947-70E740481C1C}">
+                <a14:useLocalDpi xmlns:a14="http://schemas.microsoft.com/office/drawing/2010/main" val="0"/>
+              </a:ext>
+            </a:extLst>
+          </a:blip>
+          <a:stretch>
+            <a:fillRect/>
+          </a:stretch>
+        </p:blipFill>
+        <p:spPr>
+          <a:xfrm>
+            <a:off x="1900989" y="1551460"/>
+            <a:ext cx="8952545" cy="5222318"/>
+          </a:xfrm>
+          <a:prstGeom prst="rect">
+            <a:avLst/>
+          </a:prstGeom>
+        </p:spPr>
+      </p:pic>
     </p:spTree>
     <p:extLst>
       <p:ext uri="{BB962C8B-B14F-4D97-AF65-F5344CB8AC3E}">
@@ -3719,7 +3797,7 @@
           <p:cNvPr id="2" name="Title 1">
             <a:extLst>
               <a:ext uri="{FF2B5EF4-FFF2-40B4-BE49-F238E27FC236}">
-                <a16:creationId xmlns:a16="http://schemas.microsoft.com/office/drawing/2014/main" id="{64067F77-7212-E943-8345-85E061F68C35}"/>
+                <a16:creationId xmlns:a16="http://schemas.microsoft.com/office/drawing/2014/main" xmlns="" id="{64067F77-7212-E943-8345-85E061F68C35}"/>
               </a:ext>
             </a:extLst>
           </p:cNvPr>
@@ -3749,7 +3827,7 @@
           <p:cNvPr id="3" name="Content Placeholder 2">
             <a:extLst>
               <a:ext uri="{FF2B5EF4-FFF2-40B4-BE49-F238E27FC236}">
-                <a16:creationId xmlns:a16="http://schemas.microsoft.com/office/drawing/2014/main" id="{D4653BC0-327A-AE4F-9666-FB01EEC583DA}"/>
+                <a16:creationId xmlns:a16="http://schemas.microsoft.com/office/drawing/2014/main" xmlns="" id="{D4653BC0-327A-AE4F-9666-FB01EEC583DA}"/>
               </a:ext>
             </a:extLst>
           </p:cNvPr>
@@ -3797,16 +3875,16 @@
               <a:t>TPCs fit for constant temperatures using unimodal, </a:t>
             </a:r>
             <a:r>
-              <a:rPr lang="en-US" dirty="0" err="1">
+              <a:rPr lang="en-US" dirty="0" smtClean="0">
                 <a:latin typeface="Avenir Roman" panose="02000503020000020003" pitchFamily="2" charset="0"/>
               </a:rPr>
-              <a:t>assymetrical</a:t>
+              <a:t>asymmetrical </a:t>
             </a:r>
             <a:r>
               <a:rPr lang="en-US" dirty="0">
                 <a:latin typeface="Avenir Roman" panose="02000503020000020003" pitchFamily="2" charset="0"/>
               </a:rPr>
-              <a:t> Norberg thermal response function</a:t>
+              <a:t>Norberg thermal response function</a:t>
             </a:r>
           </a:p>
           <a:p>
@@ -3876,7 +3954,7 @@
           <p:cNvPr id="2" name="Title 1">
             <a:extLst>
               <a:ext uri="{FF2B5EF4-FFF2-40B4-BE49-F238E27FC236}">
-                <a16:creationId xmlns:a16="http://schemas.microsoft.com/office/drawing/2014/main" id="{F232A15B-7E0E-7F45-826A-32F84258350A}"/>
+                <a16:creationId xmlns:a16="http://schemas.microsoft.com/office/drawing/2014/main" xmlns="" id="{F232A15B-7E0E-7F45-826A-32F84258350A}"/>
               </a:ext>
             </a:extLst>
           </p:cNvPr>
@@ -3906,7 +3984,7 @@
           <p:cNvPr id="5" name="Table 4">
             <a:extLst>
               <a:ext uri="{FF2B5EF4-FFF2-40B4-BE49-F238E27FC236}">
-                <a16:creationId xmlns:a16="http://schemas.microsoft.com/office/drawing/2014/main" id="{8B16474B-2249-2445-90B2-6604150C656F}"/>
+                <a16:creationId xmlns:a16="http://schemas.microsoft.com/office/drawing/2014/main" xmlns="" id="{8B16474B-2249-2445-90B2-6604150C656F}"/>
               </a:ext>
             </a:extLst>
           </p:cNvPr>
@@ -3933,35 +4011,35 @@
                 <a:gridCol w="791437">
                   <a:extLst>
                     <a:ext uri="{9D8B030D-6E8A-4147-A177-3AD203B41FA5}">
-                      <a16:colId xmlns:a16="http://schemas.microsoft.com/office/drawing/2014/main" val="721282862"/>
+                      <a16:colId xmlns:a16="http://schemas.microsoft.com/office/drawing/2014/main" xmlns="" val="721282862"/>
                     </a:ext>
                   </a:extLst>
                 </a:gridCol>
                 <a:gridCol w="2153281">
                   <a:extLst>
                     <a:ext uri="{9D8B030D-6E8A-4147-A177-3AD203B41FA5}">
-                      <a16:colId xmlns:a16="http://schemas.microsoft.com/office/drawing/2014/main" val="3001805368"/>
+                      <a16:colId xmlns:a16="http://schemas.microsoft.com/office/drawing/2014/main" xmlns="" val="3001805368"/>
                     </a:ext>
                   </a:extLst>
                 </a:gridCol>
                 <a:gridCol w="1012469">
                   <a:extLst>
                     <a:ext uri="{9D8B030D-6E8A-4147-A177-3AD203B41FA5}">
-                      <a16:colId xmlns:a16="http://schemas.microsoft.com/office/drawing/2014/main" val="2301873144"/>
+                      <a16:colId xmlns:a16="http://schemas.microsoft.com/office/drawing/2014/main" xmlns="" val="2301873144"/>
                     </a:ext>
                   </a:extLst>
                 </a:gridCol>
                 <a:gridCol w="2210321">
                   <a:extLst>
                     <a:ext uri="{9D8B030D-6E8A-4147-A177-3AD203B41FA5}">
-                      <a16:colId xmlns:a16="http://schemas.microsoft.com/office/drawing/2014/main" val="517092290"/>
+                      <a16:colId xmlns:a16="http://schemas.microsoft.com/office/drawing/2014/main" xmlns="" val="517092290"/>
                     </a:ext>
                   </a:extLst>
                 </a:gridCol>
                 <a:gridCol w="4548982">
                   <a:extLst>
                     <a:ext uri="{9D8B030D-6E8A-4147-A177-3AD203B41FA5}">
-                      <a16:colId xmlns:a16="http://schemas.microsoft.com/office/drawing/2014/main" val="3447438682"/>
+                      <a16:colId xmlns:a16="http://schemas.microsoft.com/office/drawing/2014/main" xmlns="" val="3447438682"/>
                     </a:ext>
                   </a:extLst>
                 </a:gridCol>
@@ -4254,7 +4332,7 @@
                 </a:tc>
                 <a:extLst>
                   <a:ext uri="{0D108BD9-81ED-4DB2-BD59-A6C34878D82A}">
-                    <a16:rowId xmlns:a16="http://schemas.microsoft.com/office/drawing/2014/main" val="2578843249"/>
+                    <a16:rowId xmlns:a16="http://schemas.microsoft.com/office/drawing/2014/main" xmlns="" val="2578843249"/>
                   </a:ext>
                 </a:extLst>
               </a:tr>
@@ -4576,7 +4654,7 @@
                 </a:tc>
                 <a:extLst>
                   <a:ext uri="{0D108BD9-81ED-4DB2-BD59-A6C34878D82A}">
-                    <a16:rowId xmlns:a16="http://schemas.microsoft.com/office/drawing/2014/main" val="366754895"/>
+                    <a16:rowId xmlns:a16="http://schemas.microsoft.com/office/drawing/2014/main" xmlns="" val="366754895"/>
                   </a:ext>
                 </a:extLst>
               </a:tr>
@@ -4878,7 +4956,7 @@
                 </a:tc>
                 <a:extLst>
                   <a:ext uri="{0D108BD9-81ED-4DB2-BD59-A6C34878D82A}">
-                    <a16:rowId xmlns:a16="http://schemas.microsoft.com/office/drawing/2014/main" val="1614122174"/>
+                    <a16:rowId xmlns:a16="http://schemas.microsoft.com/office/drawing/2014/main" xmlns="" val="1614122174"/>
                   </a:ext>
                 </a:extLst>
               </a:tr>
@@ -5190,7 +5268,7 @@
                 </a:tc>
                 <a:extLst>
                   <a:ext uri="{0D108BD9-81ED-4DB2-BD59-A6C34878D82A}">
-                    <a16:rowId xmlns:a16="http://schemas.microsoft.com/office/drawing/2014/main" val="914636203"/>
+                    <a16:rowId xmlns:a16="http://schemas.microsoft.com/office/drawing/2014/main" xmlns="" val="914636203"/>
                   </a:ext>
                 </a:extLst>
               </a:tr>
@@ -5512,7 +5590,7 @@
                 </a:tc>
                 <a:extLst>
                   <a:ext uri="{0D108BD9-81ED-4DB2-BD59-A6C34878D82A}">
-                    <a16:rowId xmlns:a16="http://schemas.microsoft.com/office/drawing/2014/main" val="1170874403"/>
+                    <a16:rowId xmlns:a16="http://schemas.microsoft.com/office/drawing/2014/main" xmlns="" val="1170874403"/>
                   </a:ext>
                 </a:extLst>
               </a:tr>
@@ -5814,7 +5892,7 @@
                 </a:tc>
                 <a:extLst>
                   <a:ext uri="{0D108BD9-81ED-4DB2-BD59-A6C34878D82A}">
-                    <a16:rowId xmlns:a16="http://schemas.microsoft.com/office/drawing/2014/main" val="730372348"/>
+                    <a16:rowId xmlns:a16="http://schemas.microsoft.com/office/drawing/2014/main" xmlns="" val="730372348"/>
                   </a:ext>
                 </a:extLst>
               </a:tr>
@@ -5857,7 +5935,7 @@
           <p:cNvPr id="2" name="Title 1">
             <a:extLst>
               <a:ext uri="{FF2B5EF4-FFF2-40B4-BE49-F238E27FC236}">
-                <a16:creationId xmlns:a16="http://schemas.microsoft.com/office/drawing/2014/main" id="{F232A15B-7E0E-7F45-826A-32F84258350A}"/>
+                <a16:creationId xmlns:a16="http://schemas.microsoft.com/office/drawing/2014/main" xmlns="" id="{F232A15B-7E0E-7F45-826A-32F84258350A}"/>
               </a:ext>
             </a:extLst>
           </p:cNvPr>
@@ -5924,7 +6002,7 @@
           <p:cNvPr id="5" name="Table 4">
             <a:extLst>
               <a:ext uri="{FF2B5EF4-FFF2-40B4-BE49-F238E27FC236}">
-                <a16:creationId xmlns:a16="http://schemas.microsoft.com/office/drawing/2014/main" id="{8B16474B-2249-2445-90B2-6604150C656F}"/>
+                <a16:creationId xmlns:a16="http://schemas.microsoft.com/office/drawing/2014/main" xmlns="" id="{8B16474B-2249-2445-90B2-6604150C656F}"/>
               </a:ext>
             </a:extLst>
           </p:cNvPr>
@@ -5951,35 +6029,35 @@
                 <a:gridCol w="791437">
                   <a:extLst>
                     <a:ext uri="{9D8B030D-6E8A-4147-A177-3AD203B41FA5}">
-                      <a16:colId xmlns:a16="http://schemas.microsoft.com/office/drawing/2014/main" val="721282862"/>
+                      <a16:colId xmlns:a16="http://schemas.microsoft.com/office/drawing/2014/main" xmlns="" val="721282862"/>
                     </a:ext>
                   </a:extLst>
                 </a:gridCol>
                 <a:gridCol w="2153281">
                   <a:extLst>
                     <a:ext uri="{9D8B030D-6E8A-4147-A177-3AD203B41FA5}">
-                      <a16:colId xmlns:a16="http://schemas.microsoft.com/office/drawing/2014/main" val="3001805368"/>
+                      <a16:colId xmlns:a16="http://schemas.microsoft.com/office/drawing/2014/main" xmlns="" val="3001805368"/>
                     </a:ext>
                   </a:extLst>
                 </a:gridCol>
                 <a:gridCol w="1012469">
                   <a:extLst>
                     <a:ext uri="{9D8B030D-6E8A-4147-A177-3AD203B41FA5}">
-                      <a16:colId xmlns:a16="http://schemas.microsoft.com/office/drawing/2014/main" val="2301873144"/>
+                      <a16:colId xmlns:a16="http://schemas.microsoft.com/office/drawing/2014/main" xmlns="" val="2301873144"/>
                     </a:ext>
                   </a:extLst>
                 </a:gridCol>
                 <a:gridCol w="1847867">
                   <a:extLst>
                     <a:ext uri="{9D8B030D-6E8A-4147-A177-3AD203B41FA5}">
-                      <a16:colId xmlns:a16="http://schemas.microsoft.com/office/drawing/2014/main" val="517092290"/>
+                      <a16:colId xmlns:a16="http://schemas.microsoft.com/office/drawing/2014/main" xmlns="" val="517092290"/>
                     </a:ext>
                   </a:extLst>
                 </a:gridCol>
                 <a:gridCol w="4911436">
                   <a:extLst>
                     <a:ext uri="{9D8B030D-6E8A-4147-A177-3AD203B41FA5}">
-                      <a16:colId xmlns:a16="http://schemas.microsoft.com/office/drawing/2014/main" val="3447438682"/>
+                      <a16:colId xmlns:a16="http://schemas.microsoft.com/office/drawing/2014/main" xmlns="" val="3447438682"/>
                     </a:ext>
                   </a:extLst>
                 </a:gridCol>
@@ -6272,7 +6350,7 @@
                 </a:tc>
                 <a:extLst>
                   <a:ext uri="{0D108BD9-81ED-4DB2-BD59-A6C34878D82A}">
-                    <a16:rowId xmlns:a16="http://schemas.microsoft.com/office/drawing/2014/main" val="2578843249"/>
+                    <a16:rowId xmlns:a16="http://schemas.microsoft.com/office/drawing/2014/main" xmlns="" val="2578843249"/>
                   </a:ext>
                 </a:extLst>
               </a:tr>
@@ -6587,7 +6665,7 @@
                 </a:tc>
                 <a:extLst>
                   <a:ext uri="{0D108BD9-81ED-4DB2-BD59-A6C34878D82A}">
-                    <a16:rowId xmlns:a16="http://schemas.microsoft.com/office/drawing/2014/main" val="3939893265"/>
+                    <a16:rowId xmlns:a16="http://schemas.microsoft.com/office/drawing/2014/main" xmlns="" val="3939893265"/>
                   </a:ext>
                 </a:extLst>
               </a:tr>
@@ -6918,7 +6996,7 @@
                 </a:tc>
                 <a:extLst>
                   <a:ext uri="{0D108BD9-81ED-4DB2-BD59-A6C34878D82A}">
-                    <a16:rowId xmlns:a16="http://schemas.microsoft.com/office/drawing/2014/main" val="1277479714"/>
+                    <a16:rowId xmlns:a16="http://schemas.microsoft.com/office/drawing/2014/main" xmlns="" val="1277479714"/>
                   </a:ext>
                 </a:extLst>
               </a:tr>
@@ -7243,7 +7321,7 @@
                 </a:tc>
                 <a:extLst>
                   <a:ext uri="{0D108BD9-81ED-4DB2-BD59-A6C34878D82A}">
-                    <a16:rowId xmlns:a16="http://schemas.microsoft.com/office/drawing/2014/main" val="3227560998"/>
+                    <a16:rowId xmlns:a16="http://schemas.microsoft.com/office/drawing/2014/main" xmlns="" val="3227560998"/>
                   </a:ext>
                 </a:extLst>
               </a:tr>
@@ -7286,7 +7364,7 @@
           <p:cNvPr id="2" name="Title 1">
             <a:extLst>
               <a:ext uri="{FF2B5EF4-FFF2-40B4-BE49-F238E27FC236}">
-                <a16:creationId xmlns:a16="http://schemas.microsoft.com/office/drawing/2014/main" id="{F232A15B-7E0E-7F45-826A-32F84258350A}"/>
+                <a16:creationId xmlns:a16="http://schemas.microsoft.com/office/drawing/2014/main" xmlns="" id="{F232A15B-7E0E-7F45-826A-32F84258350A}"/>
               </a:ext>
             </a:extLst>
           </p:cNvPr>
@@ -7319,7 +7397,7 @@
           <p:cNvPr id="3" name="Table 2">
             <a:extLst>
               <a:ext uri="{FF2B5EF4-FFF2-40B4-BE49-F238E27FC236}">
-                <a16:creationId xmlns:a16="http://schemas.microsoft.com/office/drawing/2014/main" id="{E38BBC37-EFFD-3A42-895C-3830178CEEFD}"/>
+                <a16:creationId xmlns:a16="http://schemas.microsoft.com/office/drawing/2014/main" xmlns="" id="{E38BBC37-EFFD-3A42-895C-3830178CEEFD}"/>
               </a:ext>
             </a:extLst>
           </p:cNvPr>
@@ -7346,35 +7424,35 @@
                 <a:gridCol w="791437">
                   <a:extLst>
                     <a:ext uri="{9D8B030D-6E8A-4147-A177-3AD203B41FA5}">
-                      <a16:colId xmlns:a16="http://schemas.microsoft.com/office/drawing/2014/main" val="2541977004"/>
+                      <a16:colId xmlns:a16="http://schemas.microsoft.com/office/drawing/2014/main" xmlns="" val="2541977004"/>
                     </a:ext>
                   </a:extLst>
                 </a:gridCol>
                 <a:gridCol w="2153281">
                   <a:extLst>
                     <a:ext uri="{9D8B030D-6E8A-4147-A177-3AD203B41FA5}">
-                      <a16:colId xmlns:a16="http://schemas.microsoft.com/office/drawing/2014/main" val="1318359110"/>
+                      <a16:colId xmlns:a16="http://schemas.microsoft.com/office/drawing/2014/main" xmlns="" val="1318359110"/>
                     </a:ext>
                   </a:extLst>
                 </a:gridCol>
                 <a:gridCol w="1012469">
                   <a:extLst>
                     <a:ext uri="{9D8B030D-6E8A-4147-A177-3AD203B41FA5}">
-                      <a16:colId xmlns:a16="http://schemas.microsoft.com/office/drawing/2014/main" val="3849265410"/>
+                      <a16:colId xmlns:a16="http://schemas.microsoft.com/office/drawing/2014/main" xmlns="" val="3849265410"/>
                     </a:ext>
                   </a:extLst>
                 </a:gridCol>
                 <a:gridCol w="2210321">
                   <a:extLst>
                     <a:ext uri="{9D8B030D-6E8A-4147-A177-3AD203B41FA5}">
-                      <a16:colId xmlns:a16="http://schemas.microsoft.com/office/drawing/2014/main" val="3917857248"/>
+                      <a16:colId xmlns:a16="http://schemas.microsoft.com/office/drawing/2014/main" xmlns="" val="3917857248"/>
                     </a:ext>
                   </a:extLst>
                 </a:gridCol>
                 <a:gridCol w="4548982">
                   <a:extLst>
                     <a:ext uri="{9D8B030D-6E8A-4147-A177-3AD203B41FA5}">
-                      <a16:colId xmlns:a16="http://schemas.microsoft.com/office/drawing/2014/main" val="3781954983"/>
+                      <a16:colId xmlns:a16="http://schemas.microsoft.com/office/drawing/2014/main" xmlns="" val="3781954983"/>
                     </a:ext>
                   </a:extLst>
                 </a:gridCol>
@@ -7667,7 +7745,7 @@
                 </a:tc>
                 <a:extLst>
                   <a:ext uri="{0D108BD9-81ED-4DB2-BD59-A6C34878D82A}">
-                    <a16:rowId xmlns:a16="http://schemas.microsoft.com/office/drawing/2014/main" val="49618595"/>
+                    <a16:rowId xmlns:a16="http://schemas.microsoft.com/office/drawing/2014/main" xmlns="" val="49618595"/>
                   </a:ext>
                 </a:extLst>
               </a:tr>
@@ -7959,7 +8037,7 @@
                 </a:tc>
                 <a:extLst>
                   <a:ext uri="{0D108BD9-81ED-4DB2-BD59-A6C34878D82A}">
-                    <a16:rowId xmlns:a16="http://schemas.microsoft.com/office/drawing/2014/main" val="1449004697"/>
+                    <a16:rowId xmlns:a16="http://schemas.microsoft.com/office/drawing/2014/main" xmlns="" val="1449004697"/>
                   </a:ext>
                 </a:extLst>
               </a:tr>
@@ -8265,7 +8343,7 @@
                 </a:tc>
                 <a:extLst>
                   <a:ext uri="{0D108BD9-81ED-4DB2-BD59-A6C34878D82A}">
-                    <a16:rowId xmlns:a16="http://schemas.microsoft.com/office/drawing/2014/main" val="2755544377"/>
+                    <a16:rowId xmlns:a16="http://schemas.microsoft.com/office/drawing/2014/main" xmlns="" val="2755544377"/>
                   </a:ext>
                 </a:extLst>
               </a:tr>
@@ -8571,7 +8649,7 @@
                 </a:tc>
                 <a:extLst>
                   <a:ext uri="{0D108BD9-81ED-4DB2-BD59-A6C34878D82A}">
-                    <a16:rowId xmlns:a16="http://schemas.microsoft.com/office/drawing/2014/main" val="1339203221"/>
+                    <a16:rowId xmlns:a16="http://schemas.microsoft.com/office/drawing/2014/main" xmlns="" val="1339203221"/>
                   </a:ext>
                 </a:extLst>
               </a:tr>
@@ -8877,7 +8955,7 @@
                 </a:tc>
                 <a:extLst>
                   <a:ext uri="{0D108BD9-81ED-4DB2-BD59-A6C34878D82A}">
-                    <a16:rowId xmlns:a16="http://schemas.microsoft.com/office/drawing/2014/main" val="3946650958"/>
+                    <a16:rowId xmlns:a16="http://schemas.microsoft.com/office/drawing/2014/main" xmlns="" val="3946650958"/>
                   </a:ext>
                 </a:extLst>
               </a:tr>
@@ -8920,7 +8998,7 @@
           <p:cNvPr id="2" name="Title 1">
             <a:extLst>
               <a:ext uri="{FF2B5EF4-FFF2-40B4-BE49-F238E27FC236}">
-                <a16:creationId xmlns:a16="http://schemas.microsoft.com/office/drawing/2014/main" id="{7BE77B59-C9EF-874C-9CFE-F5B1073F2767}"/>
+                <a16:creationId xmlns:a16="http://schemas.microsoft.com/office/drawing/2014/main" xmlns="" id="{7BE77B59-C9EF-874C-9CFE-F5B1073F2767}"/>
               </a:ext>
             </a:extLst>
           </p:cNvPr>
@@ -8952,6 +9030,29 @@
           </a:p>
         </p:txBody>
       </p:sp>
+      <p:pic>
+        <p:nvPicPr>
+          <p:cNvPr id="3" name="Picture 2"/>
+          <p:cNvPicPr>
+            <a:picLocks noChangeAspect="1"/>
+          </p:cNvPicPr>
+          <p:nvPr/>
+        </p:nvPicPr>
+        <p:blipFill rotWithShape="1">
+          <a:blip r:embed="rId2"/>
+          <a:srcRect t="4389"/>
+          <a:stretch/>
+        </p:blipFill>
+        <p:spPr>
+          <a:xfrm>
+            <a:off x="1415471" y="1466641"/>
+            <a:ext cx="9499600" cy="5391359"/>
+          </a:xfrm>
+          <a:prstGeom prst="rect">
+            <a:avLst/>
+          </a:prstGeom>
+        </p:spPr>
+      </p:pic>
     </p:spTree>
     <p:extLst>
       <p:ext uri="{BB962C8B-B14F-4D97-AF65-F5344CB8AC3E}">
@@ -8987,7 +9088,7 @@
           <p:cNvPr id="2" name="Title 1">
             <a:extLst>
               <a:ext uri="{FF2B5EF4-FFF2-40B4-BE49-F238E27FC236}">
-                <a16:creationId xmlns:a16="http://schemas.microsoft.com/office/drawing/2014/main" id="{7BE77B59-C9EF-874C-9CFE-F5B1073F2767}"/>
+                <a16:creationId xmlns:a16="http://schemas.microsoft.com/office/drawing/2014/main" xmlns="" id="{7BE77B59-C9EF-874C-9CFE-F5B1073F2767}"/>
               </a:ext>
             </a:extLst>
           </p:cNvPr>
@@ -9031,6 +9132,36 @@
           </a:p>
         </p:txBody>
       </p:sp>
+      <p:pic>
+        <p:nvPicPr>
+          <p:cNvPr id="3" name="Picture 2"/>
+          <p:cNvPicPr>
+            <a:picLocks noChangeAspect="1"/>
+          </p:cNvPicPr>
+          <p:nvPr/>
+        </p:nvPicPr>
+        <p:blipFill>
+          <a:blip r:embed="rId2">
+            <a:extLst>
+              <a:ext uri="{28A0092B-C50C-407E-A947-70E740481C1C}">
+                <a14:useLocalDpi xmlns:a14="http://schemas.microsoft.com/office/drawing/2010/main" val="0"/>
+              </a:ext>
+            </a:extLst>
+          </a:blip>
+          <a:stretch>
+            <a:fillRect/>
+          </a:stretch>
+        </p:blipFill>
+        <p:spPr>
+          <a:xfrm>
+            <a:off x="0" y="1397000"/>
+            <a:ext cx="12192000" cy="4064000"/>
+          </a:xfrm>
+          <a:prstGeom prst="rect">
+            <a:avLst/>
+          </a:prstGeom>
+        </p:spPr>
+      </p:pic>
     </p:spTree>
     <p:extLst>
       <p:ext uri="{BB962C8B-B14F-4D97-AF65-F5344CB8AC3E}">
@@ -9066,7 +9197,7 @@
           <p:cNvPr id="2" name="Title 1">
             <a:extLst>
               <a:ext uri="{FF2B5EF4-FFF2-40B4-BE49-F238E27FC236}">
-                <a16:creationId xmlns:a16="http://schemas.microsoft.com/office/drawing/2014/main" id="{7BE77B59-C9EF-874C-9CFE-F5B1073F2767}"/>
+                <a16:creationId xmlns:a16="http://schemas.microsoft.com/office/drawing/2014/main" xmlns="" id="{7BE77B59-C9EF-874C-9CFE-F5B1073F2767}"/>
               </a:ext>
             </a:extLst>
           </p:cNvPr>
@@ -9098,6 +9229,30 @@
           </a:p>
         </p:txBody>
       </p:sp>
+      <p:pic>
+        <p:nvPicPr>
+          <p:cNvPr id="5" name="Picture 4"/>
+          <p:cNvPicPr>
+            <a:picLocks noChangeAspect="1"/>
+          </p:cNvPicPr>
+          <p:nvPr/>
+        </p:nvPicPr>
+        <p:blipFill>
+          <a:blip r:embed="rId2"/>
+          <a:stretch>
+            <a:fillRect/>
+          </a:stretch>
+        </p:blipFill>
+        <p:spPr>
+          <a:xfrm>
+            <a:off x="1374028" y="2201779"/>
+            <a:ext cx="9177323" cy="3679323"/>
+          </a:xfrm>
+          <a:prstGeom prst="rect">
+            <a:avLst/>
+          </a:prstGeom>
+        </p:spPr>
+      </p:pic>
     </p:spTree>
     <p:extLst>
       <p:ext uri="{BB962C8B-B14F-4D97-AF65-F5344CB8AC3E}">
@@ -9133,7 +9288,7 @@
           <p:cNvPr id="2" name="Title 1">
             <a:extLst>
               <a:ext uri="{FF2B5EF4-FFF2-40B4-BE49-F238E27FC236}">
-                <a16:creationId xmlns:a16="http://schemas.microsoft.com/office/drawing/2014/main" id="{7BE77B59-C9EF-874C-9CFE-F5B1073F2767}"/>
+                <a16:creationId xmlns:a16="http://schemas.microsoft.com/office/drawing/2014/main" xmlns="" id="{7BE77B59-C9EF-874C-9CFE-F5B1073F2767}"/>
               </a:ext>
             </a:extLst>
           </p:cNvPr>
@@ -9165,6 +9320,30 @@
           </a:p>
         </p:txBody>
       </p:sp>
+      <p:pic>
+        <p:nvPicPr>
+          <p:cNvPr id="4" name="Picture 3"/>
+          <p:cNvPicPr>
+            <a:picLocks noChangeAspect="1"/>
+          </p:cNvPicPr>
+          <p:nvPr/>
+        </p:nvPicPr>
+        <p:blipFill>
+          <a:blip r:embed="rId2"/>
+          <a:stretch>
+            <a:fillRect/>
+          </a:stretch>
+        </p:blipFill>
+        <p:spPr>
+          <a:xfrm>
+            <a:off x="2767264" y="1575467"/>
+            <a:ext cx="5788192" cy="4580065"/>
+          </a:xfrm>
+          <a:prstGeom prst="rect">
+            <a:avLst/>
+          </a:prstGeom>
+        </p:spPr>
+      </p:pic>
     </p:spTree>
     <p:extLst>
       <p:ext uri="{BB962C8B-B14F-4D97-AF65-F5344CB8AC3E}">

</xml_diff>